<commit_message>
Updated presentation based on discussion
</commit_message>
<xml_diff>
--- a/Docs/Design.pptx
+++ b/Docs/Design.pptx
@@ -106,6 +106,11 @@
       </a:defRPr>
     </a:lvl9pPr>
   </p:defaultTextStyle>
+  <p:extLst>
+    <p:ext uri="{EFAFB233-063F-42B5-8137-9DF3F51BA10A}">
+      <p15:sldGuideLst xmlns:p15="http://schemas.microsoft.com/office/powerpoint/2012/main"/>
+    </p:ext>
+  </p:extLst>
 </p:presentation>
 </file>
 
@@ -258,7 +263,7 @@
           <a:p>
             <a:fld id="{D70168D3-9BA9-4B67-B593-8F465BBDFFE3}" type="datetimeFigureOut">
               <a:rPr lang="en-CA" smtClean="0"/>
-              <a:t>2020-11-27</a:t>
+              <a:t>2020-11-30</a:t>
             </a:fld>
             <a:endParaRPr lang="en-CA"/>
           </a:p>
@@ -458,7 +463,7 @@
           <a:p>
             <a:fld id="{D70168D3-9BA9-4B67-B593-8F465BBDFFE3}" type="datetimeFigureOut">
               <a:rPr lang="en-CA" smtClean="0"/>
-              <a:t>2020-11-27</a:t>
+              <a:t>2020-11-30</a:t>
             </a:fld>
             <a:endParaRPr lang="en-CA"/>
           </a:p>
@@ -668,7 +673,7 @@
           <a:p>
             <a:fld id="{D70168D3-9BA9-4B67-B593-8F465BBDFFE3}" type="datetimeFigureOut">
               <a:rPr lang="en-CA" smtClean="0"/>
-              <a:t>2020-11-27</a:t>
+              <a:t>2020-11-30</a:t>
             </a:fld>
             <a:endParaRPr lang="en-CA"/>
           </a:p>
@@ -868,7 +873,7 @@
           <a:p>
             <a:fld id="{D70168D3-9BA9-4B67-B593-8F465BBDFFE3}" type="datetimeFigureOut">
               <a:rPr lang="en-CA" smtClean="0"/>
-              <a:t>2020-11-27</a:t>
+              <a:t>2020-11-30</a:t>
             </a:fld>
             <a:endParaRPr lang="en-CA"/>
           </a:p>
@@ -1144,7 +1149,7 @@
           <a:p>
             <a:fld id="{D70168D3-9BA9-4B67-B593-8F465BBDFFE3}" type="datetimeFigureOut">
               <a:rPr lang="en-CA" smtClean="0"/>
-              <a:t>2020-11-27</a:t>
+              <a:t>2020-11-30</a:t>
             </a:fld>
             <a:endParaRPr lang="en-CA"/>
           </a:p>
@@ -1412,7 +1417,7 @@
           <a:p>
             <a:fld id="{D70168D3-9BA9-4B67-B593-8F465BBDFFE3}" type="datetimeFigureOut">
               <a:rPr lang="en-CA" smtClean="0"/>
-              <a:t>2020-11-27</a:t>
+              <a:t>2020-11-30</a:t>
             </a:fld>
             <a:endParaRPr lang="en-CA"/>
           </a:p>
@@ -1827,7 +1832,7 @@
           <a:p>
             <a:fld id="{D70168D3-9BA9-4B67-B593-8F465BBDFFE3}" type="datetimeFigureOut">
               <a:rPr lang="en-CA" smtClean="0"/>
-              <a:t>2020-11-27</a:t>
+              <a:t>2020-11-30</a:t>
             </a:fld>
             <a:endParaRPr lang="en-CA"/>
           </a:p>
@@ -1969,7 +1974,7 @@
           <a:p>
             <a:fld id="{D70168D3-9BA9-4B67-B593-8F465BBDFFE3}" type="datetimeFigureOut">
               <a:rPr lang="en-CA" smtClean="0"/>
-              <a:t>2020-11-27</a:t>
+              <a:t>2020-11-30</a:t>
             </a:fld>
             <a:endParaRPr lang="en-CA"/>
           </a:p>
@@ -2082,7 +2087,7 @@
           <a:p>
             <a:fld id="{D70168D3-9BA9-4B67-B593-8F465BBDFFE3}" type="datetimeFigureOut">
               <a:rPr lang="en-CA" smtClean="0"/>
-              <a:t>2020-11-27</a:t>
+              <a:t>2020-11-30</a:t>
             </a:fld>
             <a:endParaRPr lang="en-CA"/>
           </a:p>
@@ -2395,7 +2400,7 @@
           <a:p>
             <a:fld id="{D70168D3-9BA9-4B67-B593-8F465BBDFFE3}" type="datetimeFigureOut">
               <a:rPr lang="en-CA" smtClean="0"/>
-              <a:t>2020-11-27</a:t>
+              <a:t>2020-11-30</a:t>
             </a:fld>
             <a:endParaRPr lang="en-CA"/>
           </a:p>
@@ -2684,7 +2689,7 @@
           <a:p>
             <a:fld id="{D70168D3-9BA9-4B67-B593-8F465BBDFFE3}" type="datetimeFigureOut">
               <a:rPr lang="en-CA" smtClean="0"/>
-              <a:t>2020-11-27</a:t>
+              <a:t>2020-11-30</a:t>
             </a:fld>
             <a:endParaRPr lang="en-CA"/>
           </a:p>
@@ -2927,7 +2932,7 @@
           <a:p>
             <a:fld id="{D70168D3-9BA9-4B67-B593-8F465BBDFFE3}" type="datetimeFigureOut">
               <a:rPr lang="en-CA" smtClean="0"/>
-              <a:t>2020-11-27</a:t>
+              <a:t>2020-11-30</a:t>
             </a:fld>
             <a:endParaRPr lang="en-CA"/>
           </a:p>
@@ -3744,7 +3749,7 @@
                   <a:schemeClr val="tx1"/>
                 </a:solidFill>
               </a:rPr>
-              <a:t>(straight line inside fibula center)</a:t>
+              <a:t>(straight line on the surface of the fibula)</a:t>
             </a:r>
           </a:p>
           <a:p>
@@ -4079,7 +4084,7 @@
         </p:nvSpPr>
         <p:spPr>
           <a:xfrm>
-            <a:off x="4079571" y="1794516"/>
+            <a:off x="4064917" y="1801068"/>
             <a:ext cx="3234096" cy="1904652"/>
           </a:xfrm>
           <a:custGeom>
@@ -4262,7 +4267,7 @@
             <a:pPr algn="ctr"/>
             <a:r>
               <a:rPr lang="en-US" dirty="0"/>
-              <a:t>(curve inside the bone, centerline)</a:t>
+              <a:t>(curve outside the bone, surface)</a:t>
             </a:r>
           </a:p>
           <a:p>
@@ -4797,6 +4802,765 @@
           <a:p>
             <a:pPr algn="ctr"/>
             <a:endParaRPr lang="en-CA"/>
+          </a:p>
+        </p:txBody>
+      </p:sp>
+      <p:cxnSp>
+        <p:nvCxnSpPr>
+          <p:cNvPr id="3" name="Straight Arrow Connector 2">
+            <a:extLst>
+              <a:ext uri="{FF2B5EF4-FFF2-40B4-BE49-F238E27FC236}">
+                <a16:creationId xmlns:a16="http://schemas.microsoft.com/office/drawing/2014/main" id="{EDA97FD4-388E-40D8-A32A-BC25A61D681D}"/>
+              </a:ext>
+            </a:extLst>
+          </p:cNvPr>
+          <p:cNvCxnSpPr/>
+          <p:nvPr/>
+        </p:nvCxnSpPr>
+        <p:spPr>
+          <a:xfrm flipV="1">
+            <a:off x="8112722" y="4792006"/>
+            <a:ext cx="405636" cy="659024"/>
+          </a:xfrm>
+          <a:prstGeom prst="straightConnector1">
+            <a:avLst/>
+          </a:prstGeom>
+          <a:ln>
+            <a:tailEnd type="triangle"/>
+          </a:ln>
+        </p:spPr>
+        <p:style>
+          <a:lnRef idx="1">
+            <a:schemeClr val="accent1"/>
+          </a:lnRef>
+          <a:fillRef idx="0">
+            <a:schemeClr val="accent1"/>
+          </a:fillRef>
+          <a:effectRef idx="0">
+            <a:schemeClr val="accent1"/>
+          </a:effectRef>
+          <a:fontRef idx="minor">
+            <a:schemeClr val="tx1"/>
+          </a:fontRef>
+        </p:style>
+      </p:cxnSp>
+      <p:sp>
+        <p:nvSpPr>
+          <p:cNvPr id="24" name="Flowchart: Data 23">
+            <a:extLst>
+              <a:ext uri="{FF2B5EF4-FFF2-40B4-BE49-F238E27FC236}">
+                <a16:creationId xmlns:a16="http://schemas.microsoft.com/office/drawing/2014/main" id="{D598C644-12D2-43D7-881F-62FDA5F3D3A5}"/>
+              </a:ext>
+            </a:extLst>
+          </p:cNvPr>
+          <p:cNvSpPr/>
+          <p:nvPr/>
+        </p:nvSpPr>
+        <p:spPr>
+          <a:xfrm rot="1304837">
+            <a:off x="4673315" y="2723783"/>
+            <a:ext cx="596021" cy="1164392"/>
+          </a:xfrm>
+          <a:prstGeom prst="flowChartInputOutput">
+            <a:avLst/>
+          </a:prstGeom>
+          <a:solidFill>
+            <a:srgbClr val="FF9966">
+              <a:alpha val="50980"/>
+            </a:srgbClr>
+          </a:solidFill>
+          <a:ln w="57150">
+            <a:solidFill>
+              <a:schemeClr val="accent1">
+                <a:lumMod val="75000"/>
+              </a:schemeClr>
+            </a:solidFill>
+          </a:ln>
+        </p:spPr>
+        <p:style>
+          <a:lnRef idx="2">
+            <a:schemeClr val="accent1">
+              <a:shade val="50000"/>
+            </a:schemeClr>
+          </a:lnRef>
+          <a:fillRef idx="1">
+            <a:schemeClr val="accent1"/>
+          </a:fillRef>
+          <a:effectRef idx="0">
+            <a:schemeClr val="accent1"/>
+          </a:effectRef>
+          <a:fontRef idx="minor">
+            <a:schemeClr val="lt1"/>
+          </a:fontRef>
+        </p:style>
+        <p:txBody>
+          <a:bodyPr rtlCol="0" anchor="ctr"/>
+          <a:lstStyle/>
+          <a:p>
+            <a:pPr algn="ctr"/>
+            <a:endParaRPr lang="en-CA"/>
+          </a:p>
+        </p:txBody>
+      </p:sp>
+      <p:sp>
+        <p:nvSpPr>
+          <p:cNvPr id="25" name="Flowchart: Data 24">
+            <a:extLst>
+              <a:ext uri="{FF2B5EF4-FFF2-40B4-BE49-F238E27FC236}">
+                <a16:creationId xmlns:a16="http://schemas.microsoft.com/office/drawing/2014/main" id="{E2F44DDB-B8CB-4087-9F1C-D6F66F19C3FE}"/>
+              </a:ext>
+            </a:extLst>
+          </p:cNvPr>
+          <p:cNvSpPr/>
+          <p:nvPr/>
+        </p:nvSpPr>
+        <p:spPr>
+          <a:xfrm rot="1304837">
+            <a:off x="6371510" y="3075635"/>
+            <a:ext cx="596021" cy="1164392"/>
+          </a:xfrm>
+          <a:prstGeom prst="flowChartInputOutput">
+            <a:avLst/>
+          </a:prstGeom>
+          <a:solidFill>
+            <a:srgbClr val="FF9966">
+              <a:alpha val="50980"/>
+            </a:srgbClr>
+          </a:solidFill>
+          <a:ln w="57150">
+            <a:solidFill>
+              <a:schemeClr val="accent1">
+                <a:lumMod val="75000"/>
+              </a:schemeClr>
+            </a:solidFill>
+          </a:ln>
+        </p:spPr>
+        <p:style>
+          <a:lnRef idx="2">
+            <a:schemeClr val="accent1">
+              <a:shade val="50000"/>
+            </a:schemeClr>
+          </a:lnRef>
+          <a:fillRef idx="1">
+            <a:schemeClr val="accent1"/>
+          </a:fillRef>
+          <a:effectRef idx="0">
+            <a:schemeClr val="accent1"/>
+          </a:effectRef>
+          <a:fontRef idx="minor">
+            <a:schemeClr val="lt1"/>
+          </a:fontRef>
+        </p:style>
+        <p:txBody>
+          <a:bodyPr rtlCol="0" anchor="ctr"/>
+          <a:lstStyle/>
+          <a:p>
+            <a:pPr algn="ctr"/>
+            <a:endParaRPr lang="en-CA"/>
+          </a:p>
+        </p:txBody>
+      </p:sp>
+      <p:sp>
+        <p:nvSpPr>
+          <p:cNvPr id="26" name="Flowchart: Data 25">
+            <a:extLst>
+              <a:ext uri="{FF2B5EF4-FFF2-40B4-BE49-F238E27FC236}">
+                <a16:creationId xmlns:a16="http://schemas.microsoft.com/office/drawing/2014/main" id="{DCC6A0B4-2956-4E3C-9B18-136261B9941C}"/>
+              </a:ext>
+            </a:extLst>
+          </p:cNvPr>
+          <p:cNvSpPr/>
+          <p:nvPr/>
+        </p:nvSpPr>
+        <p:spPr>
+          <a:xfrm rot="626992">
+            <a:off x="5456950" y="2992229"/>
+            <a:ext cx="596021" cy="1164392"/>
+          </a:xfrm>
+          <a:prstGeom prst="flowChartInputOutput">
+            <a:avLst/>
+          </a:prstGeom>
+          <a:solidFill>
+            <a:srgbClr val="FF9966">
+              <a:alpha val="50980"/>
+            </a:srgbClr>
+          </a:solidFill>
+          <a:ln w="57150">
+            <a:solidFill>
+              <a:schemeClr val="accent1">
+                <a:lumMod val="75000"/>
+              </a:schemeClr>
+            </a:solidFill>
+          </a:ln>
+        </p:spPr>
+        <p:style>
+          <a:lnRef idx="2">
+            <a:schemeClr val="accent1">
+              <a:shade val="50000"/>
+            </a:schemeClr>
+          </a:lnRef>
+          <a:fillRef idx="1">
+            <a:schemeClr val="accent1"/>
+          </a:fillRef>
+          <a:effectRef idx="0">
+            <a:schemeClr val="accent1"/>
+          </a:effectRef>
+          <a:fontRef idx="minor">
+            <a:schemeClr val="lt1"/>
+          </a:fontRef>
+        </p:style>
+        <p:txBody>
+          <a:bodyPr rtlCol="0" anchor="ctr"/>
+          <a:lstStyle/>
+          <a:p>
+            <a:pPr algn="ctr"/>
+            <a:endParaRPr lang="en-CA"/>
+          </a:p>
+        </p:txBody>
+      </p:sp>
+      <p:sp>
+        <p:nvSpPr>
+          <p:cNvPr id="27" name="Flowchart: Data 26">
+            <a:extLst>
+              <a:ext uri="{FF2B5EF4-FFF2-40B4-BE49-F238E27FC236}">
+                <a16:creationId xmlns:a16="http://schemas.microsoft.com/office/drawing/2014/main" id="{522F8BB3-C158-4AA7-9E79-F062DF25849F}"/>
+              </a:ext>
+            </a:extLst>
+          </p:cNvPr>
+          <p:cNvSpPr/>
+          <p:nvPr/>
+        </p:nvSpPr>
+        <p:spPr>
+          <a:xfrm rot="13993089" flipH="1">
+            <a:off x="4098420" y="1893789"/>
+            <a:ext cx="494494" cy="1595506"/>
+          </a:xfrm>
+          <a:prstGeom prst="flowChartInputOutput">
+            <a:avLst/>
+          </a:prstGeom>
+          <a:solidFill>
+            <a:srgbClr val="FF9966">
+              <a:alpha val="50980"/>
+            </a:srgbClr>
+          </a:solidFill>
+          <a:ln w="57150">
+            <a:solidFill>
+              <a:schemeClr val="accent1">
+                <a:lumMod val="75000"/>
+              </a:schemeClr>
+            </a:solidFill>
+          </a:ln>
+        </p:spPr>
+        <p:style>
+          <a:lnRef idx="2">
+            <a:schemeClr val="accent1">
+              <a:shade val="50000"/>
+            </a:schemeClr>
+          </a:lnRef>
+          <a:fillRef idx="1">
+            <a:schemeClr val="accent1"/>
+          </a:fillRef>
+          <a:effectRef idx="0">
+            <a:schemeClr val="accent1"/>
+          </a:effectRef>
+          <a:fontRef idx="minor">
+            <a:schemeClr val="lt1"/>
+          </a:fontRef>
+        </p:style>
+        <p:txBody>
+          <a:bodyPr rtlCol="0" anchor="ctr"/>
+          <a:lstStyle/>
+          <a:p>
+            <a:pPr algn="ctr"/>
+            <a:endParaRPr lang="en-CA"/>
+          </a:p>
+        </p:txBody>
+      </p:sp>
+      <p:sp>
+        <p:nvSpPr>
+          <p:cNvPr id="4" name="TextBox 3">
+            <a:extLst>
+              <a:ext uri="{FF2B5EF4-FFF2-40B4-BE49-F238E27FC236}">
+                <a16:creationId xmlns:a16="http://schemas.microsoft.com/office/drawing/2014/main" id="{FBE90BB7-F5B0-4E3B-9BEF-4B3FC468DFBF}"/>
+              </a:ext>
+            </a:extLst>
+          </p:cNvPr>
+          <p:cNvSpPr txBox="1"/>
+          <p:nvPr/>
+        </p:nvSpPr>
+        <p:spPr>
+          <a:xfrm>
+            <a:off x="8802293" y="161181"/>
+            <a:ext cx="3105239" cy="3693319"/>
+          </a:xfrm>
+          <a:prstGeom prst="rect">
+            <a:avLst/>
+          </a:prstGeom>
+          <a:noFill/>
+        </p:spPr>
+        <p:txBody>
+          <a:bodyPr wrap="square" rtlCol="0">
+            <a:spAutoFit/>
+          </a:bodyPr>
+          <a:lstStyle/>
+          <a:p>
+            <a:r>
+              <a:rPr lang="en-US" dirty="0"/>
+              <a:t>Phase 1:</a:t>
+            </a:r>
+          </a:p>
+          <a:p>
+            <a:pPr marL="285750" indent="-285750">
+              <a:buFontTx/>
+              <a:buChar char="-"/>
+            </a:pPr>
+            <a:r>
+              <a:rPr lang="en-US" dirty="0"/>
+              <a:t>Segment mandible and fibula</a:t>
+            </a:r>
+          </a:p>
+          <a:p>
+            <a:pPr marL="285750" indent="-285750">
+              <a:buFontTx/>
+              <a:buChar char="-"/>
+            </a:pPr>
+            <a:r>
+              <a:rPr lang="en-US" dirty="0"/>
+              <a:t>Define </a:t>
+            </a:r>
+            <a:r>
+              <a:rPr lang="en-US" dirty="0" err="1"/>
+              <a:t>MandibleCurve</a:t>
+            </a:r>
+            <a:endParaRPr lang="en-US" dirty="0"/>
+          </a:p>
+          <a:p>
+            <a:pPr marL="285750" indent="-285750">
+              <a:buFontTx/>
+              <a:buChar char="-"/>
+            </a:pPr>
+            <a:r>
+              <a:rPr lang="en-US" dirty="0"/>
+              <a:t>Define </a:t>
+            </a:r>
+            <a:r>
+              <a:rPr lang="en-US" dirty="0" err="1"/>
+              <a:t>FibulaLine</a:t>
+            </a:r>
+            <a:r>
+              <a:rPr lang="en-US" dirty="0"/>
+              <a:t> axis and front direction</a:t>
+            </a:r>
+          </a:p>
+          <a:p>
+            <a:pPr marL="285750" indent="-285750">
+              <a:buFontTx/>
+              <a:buChar char="-"/>
+            </a:pPr>
+            <a:r>
+              <a:rPr lang="en-CA" dirty="0"/>
+              <a:t>Define 3-6 planes along the </a:t>
+            </a:r>
+            <a:r>
+              <a:rPr lang="en-CA" dirty="0" err="1"/>
+              <a:t>MandibleCurve</a:t>
+            </a:r>
+            <a:endParaRPr lang="en-CA" dirty="0"/>
+          </a:p>
+          <a:p>
+            <a:r>
+              <a:rPr lang="en-CA" dirty="0"/>
+              <a:t>Phase 2:</a:t>
+            </a:r>
+          </a:p>
+          <a:p>
+            <a:pPr marL="285750" indent="-285750">
+              <a:buFontTx/>
+              <a:buChar char="-"/>
+            </a:pPr>
+            <a:r>
+              <a:rPr lang="en-CA" dirty="0"/>
+              <a:t>Generate cutting guide</a:t>
+            </a:r>
+          </a:p>
+          <a:p>
+            <a:r>
+              <a:rPr lang="en-CA" dirty="0"/>
+              <a:t>Phase 3:</a:t>
+            </a:r>
+          </a:p>
+          <a:p>
+            <a:pPr marL="285750" indent="-285750">
+              <a:buFontTx/>
+              <a:buChar char="-"/>
+            </a:pPr>
+            <a:r>
+              <a:rPr lang="en-CA" dirty="0"/>
+              <a:t>Blood vessel visualization</a:t>
+            </a:r>
+          </a:p>
+          <a:p>
+            <a:endParaRPr lang="en-CA" dirty="0"/>
+          </a:p>
+        </p:txBody>
+      </p:sp>
+      <p:sp>
+        <p:nvSpPr>
+          <p:cNvPr id="30" name="TextBox 29">
+            <a:extLst>
+              <a:ext uri="{FF2B5EF4-FFF2-40B4-BE49-F238E27FC236}">
+                <a16:creationId xmlns:a16="http://schemas.microsoft.com/office/drawing/2014/main" id="{B9A8ECE0-8651-4424-B577-CFCCA4A451ED}"/>
+              </a:ext>
+            </a:extLst>
+          </p:cNvPr>
+          <p:cNvSpPr txBox="1"/>
+          <p:nvPr/>
+        </p:nvSpPr>
+        <p:spPr>
+          <a:xfrm>
+            <a:off x="4591774" y="1657182"/>
+            <a:ext cx="1032744" cy="369332"/>
+          </a:xfrm>
+          <a:prstGeom prst="rect">
+            <a:avLst/>
+          </a:prstGeom>
+          <a:noFill/>
+        </p:spPr>
+        <p:txBody>
+          <a:bodyPr wrap="square" rtlCol="0">
+            <a:spAutoFit/>
+          </a:bodyPr>
+          <a:lstStyle/>
+          <a:p>
+            <a:r>
+              <a:rPr lang="en-US" dirty="0"/>
+              <a:t>1</a:t>
+            </a:r>
+            <a:endParaRPr lang="en-CA" dirty="0"/>
+          </a:p>
+        </p:txBody>
+      </p:sp>
+      <p:sp>
+        <p:nvSpPr>
+          <p:cNvPr id="33" name="TextBox 32">
+            <a:extLst>
+              <a:ext uri="{FF2B5EF4-FFF2-40B4-BE49-F238E27FC236}">
+                <a16:creationId xmlns:a16="http://schemas.microsoft.com/office/drawing/2014/main" id="{F61E0FFA-2FEB-4201-AE9E-331405F41E40}"/>
+              </a:ext>
+            </a:extLst>
+          </p:cNvPr>
+          <p:cNvSpPr txBox="1"/>
+          <p:nvPr/>
+        </p:nvSpPr>
+        <p:spPr>
+          <a:xfrm>
+            <a:off x="3669225" y="3430969"/>
+            <a:ext cx="1032744" cy="369332"/>
+          </a:xfrm>
+          <a:prstGeom prst="rect">
+            <a:avLst/>
+          </a:prstGeom>
+          <a:noFill/>
+        </p:spPr>
+        <p:txBody>
+          <a:bodyPr wrap="square" rtlCol="0">
+            <a:spAutoFit/>
+          </a:bodyPr>
+          <a:lstStyle/>
+          <a:p>
+            <a:r>
+              <a:rPr lang="en-US" dirty="0"/>
+              <a:t>1</a:t>
+            </a:r>
+            <a:endParaRPr lang="en-CA" dirty="0"/>
+          </a:p>
+        </p:txBody>
+      </p:sp>
+      <p:sp>
+        <p:nvSpPr>
+          <p:cNvPr id="34" name="TextBox 33">
+            <a:extLst>
+              <a:ext uri="{FF2B5EF4-FFF2-40B4-BE49-F238E27FC236}">
+                <a16:creationId xmlns:a16="http://schemas.microsoft.com/office/drawing/2014/main" id="{00D93406-CF5A-4B99-A7FC-7614EE40F916}"/>
+              </a:ext>
+            </a:extLst>
+          </p:cNvPr>
+          <p:cNvSpPr txBox="1"/>
+          <p:nvPr/>
+        </p:nvSpPr>
+        <p:spPr>
+          <a:xfrm>
+            <a:off x="3964154" y="3748575"/>
+            <a:ext cx="1032744" cy="369332"/>
+          </a:xfrm>
+          <a:prstGeom prst="rect">
+            <a:avLst/>
+          </a:prstGeom>
+          <a:noFill/>
+        </p:spPr>
+        <p:txBody>
+          <a:bodyPr wrap="square" rtlCol="0">
+            <a:spAutoFit/>
+          </a:bodyPr>
+          <a:lstStyle/>
+          <a:p>
+            <a:r>
+              <a:rPr lang="en-US" dirty="0"/>
+              <a:t>2</a:t>
+            </a:r>
+            <a:endParaRPr lang="en-CA" dirty="0"/>
+          </a:p>
+        </p:txBody>
+      </p:sp>
+      <p:sp>
+        <p:nvSpPr>
+          <p:cNvPr id="35" name="TextBox 34">
+            <a:extLst>
+              <a:ext uri="{FF2B5EF4-FFF2-40B4-BE49-F238E27FC236}">
+                <a16:creationId xmlns:a16="http://schemas.microsoft.com/office/drawing/2014/main" id="{546137A8-3A86-40BB-8B7F-72A9B6D9FB2F}"/>
+              </a:ext>
+            </a:extLst>
+          </p:cNvPr>
+          <p:cNvSpPr txBox="1"/>
+          <p:nvPr/>
+        </p:nvSpPr>
+        <p:spPr>
+          <a:xfrm>
+            <a:off x="4748209" y="3956365"/>
+            <a:ext cx="1032744" cy="369332"/>
+          </a:xfrm>
+          <a:prstGeom prst="rect">
+            <a:avLst/>
+          </a:prstGeom>
+          <a:noFill/>
+        </p:spPr>
+        <p:txBody>
+          <a:bodyPr wrap="square" rtlCol="0">
+            <a:spAutoFit/>
+          </a:bodyPr>
+          <a:lstStyle/>
+          <a:p>
+            <a:r>
+              <a:rPr lang="en-US" dirty="0"/>
+              <a:t>2</a:t>
+            </a:r>
+            <a:endParaRPr lang="en-CA" dirty="0"/>
+          </a:p>
+        </p:txBody>
+      </p:sp>
+      <p:sp>
+        <p:nvSpPr>
+          <p:cNvPr id="37" name="TextBox 36">
+            <a:extLst>
+              <a:ext uri="{FF2B5EF4-FFF2-40B4-BE49-F238E27FC236}">
+                <a16:creationId xmlns:a16="http://schemas.microsoft.com/office/drawing/2014/main" id="{EF916AFB-B244-46A4-BFC2-DF758643DBBE}"/>
+              </a:ext>
+            </a:extLst>
+          </p:cNvPr>
+          <p:cNvSpPr txBox="1"/>
+          <p:nvPr/>
+        </p:nvSpPr>
+        <p:spPr>
+          <a:xfrm>
+            <a:off x="4923722" y="2380346"/>
+            <a:ext cx="1032744" cy="369332"/>
+          </a:xfrm>
+          <a:prstGeom prst="rect">
+            <a:avLst/>
+          </a:prstGeom>
+          <a:noFill/>
+        </p:spPr>
+        <p:txBody>
+          <a:bodyPr wrap="square" rtlCol="0">
+            <a:spAutoFit/>
+          </a:bodyPr>
+          <a:lstStyle/>
+          <a:p>
+            <a:r>
+              <a:rPr lang="en-US" dirty="0"/>
+              <a:t>2</a:t>
+            </a:r>
+            <a:endParaRPr lang="en-CA" dirty="0"/>
+          </a:p>
+        </p:txBody>
+      </p:sp>
+      <p:sp>
+        <p:nvSpPr>
+          <p:cNvPr id="41" name="TextBox 40">
+            <a:extLst>
+              <a:ext uri="{FF2B5EF4-FFF2-40B4-BE49-F238E27FC236}">
+                <a16:creationId xmlns:a16="http://schemas.microsoft.com/office/drawing/2014/main" id="{81ED8BB0-2185-463D-91D5-C6CD129493F1}"/>
+              </a:ext>
+            </a:extLst>
+          </p:cNvPr>
+          <p:cNvSpPr txBox="1"/>
+          <p:nvPr/>
+        </p:nvSpPr>
+        <p:spPr>
+          <a:xfrm>
+            <a:off x="5687485" y="2634338"/>
+            <a:ext cx="1032744" cy="369332"/>
+          </a:xfrm>
+          <a:prstGeom prst="rect">
+            <a:avLst/>
+          </a:prstGeom>
+          <a:noFill/>
+        </p:spPr>
+        <p:txBody>
+          <a:bodyPr wrap="square" rtlCol="0">
+            <a:spAutoFit/>
+          </a:bodyPr>
+          <a:lstStyle/>
+          <a:p>
+            <a:r>
+              <a:rPr lang="en-US" dirty="0"/>
+              <a:t>3</a:t>
+            </a:r>
+            <a:endParaRPr lang="en-CA" dirty="0"/>
+          </a:p>
+        </p:txBody>
+      </p:sp>
+      <p:sp>
+        <p:nvSpPr>
+          <p:cNvPr id="42" name="TextBox 41">
+            <a:extLst>
+              <a:ext uri="{FF2B5EF4-FFF2-40B4-BE49-F238E27FC236}">
+                <a16:creationId xmlns:a16="http://schemas.microsoft.com/office/drawing/2014/main" id="{B63793A0-B386-4ABF-B6BB-C2BD40727899}"/>
+              </a:ext>
+            </a:extLst>
+          </p:cNvPr>
+          <p:cNvSpPr txBox="1"/>
+          <p:nvPr/>
+        </p:nvSpPr>
+        <p:spPr>
+          <a:xfrm>
+            <a:off x="5162326" y="4117907"/>
+            <a:ext cx="1032744" cy="369332"/>
+          </a:xfrm>
+          <a:prstGeom prst="rect">
+            <a:avLst/>
+          </a:prstGeom>
+          <a:noFill/>
+        </p:spPr>
+        <p:txBody>
+          <a:bodyPr wrap="square" rtlCol="0">
+            <a:spAutoFit/>
+          </a:bodyPr>
+          <a:lstStyle/>
+          <a:p>
+            <a:r>
+              <a:rPr lang="en-US" dirty="0"/>
+              <a:t>3</a:t>
+            </a:r>
+            <a:endParaRPr lang="en-CA" dirty="0"/>
+          </a:p>
+        </p:txBody>
+      </p:sp>
+      <p:sp>
+        <p:nvSpPr>
+          <p:cNvPr id="43" name="TextBox 42">
+            <a:extLst>
+              <a:ext uri="{FF2B5EF4-FFF2-40B4-BE49-F238E27FC236}">
+                <a16:creationId xmlns:a16="http://schemas.microsoft.com/office/drawing/2014/main" id="{471C2FD7-E431-41E2-8F9F-FA25FC4FEE57}"/>
+              </a:ext>
+            </a:extLst>
+          </p:cNvPr>
+          <p:cNvSpPr txBox="1"/>
+          <p:nvPr/>
+        </p:nvSpPr>
+        <p:spPr>
+          <a:xfrm>
+            <a:off x="6091354" y="4378986"/>
+            <a:ext cx="1032744" cy="369332"/>
+          </a:xfrm>
+          <a:prstGeom prst="rect">
+            <a:avLst/>
+          </a:prstGeom>
+          <a:noFill/>
+        </p:spPr>
+        <p:txBody>
+          <a:bodyPr wrap="square" rtlCol="0">
+            <a:spAutoFit/>
+          </a:bodyPr>
+          <a:lstStyle/>
+          <a:p>
+            <a:r>
+              <a:rPr lang="en-US" dirty="0"/>
+              <a:t>3</a:t>
+            </a:r>
+            <a:endParaRPr lang="en-CA" dirty="0"/>
+          </a:p>
+        </p:txBody>
+      </p:sp>
+      <p:sp>
+        <p:nvSpPr>
+          <p:cNvPr id="45" name="TextBox 44">
+            <a:extLst>
+              <a:ext uri="{FF2B5EF4-FFF2-40B4-BE49-F238E27FC236}">
+                <a16:creationId xmlns:a16="http://schemas.microsoft.com/office/drawing/2014/main" id="{546D89E2-8A9D-4F3B-9807-D634BFEE7A96}"/>
+              </a:ext>
+            </a:extLst>
+          </p:cNvPr>
+          <p:cNvSpPr txBox="1"/>
+          <p:nvPr/>
+        </p:nvSpPr>
+        <p:spPr>
+          <a:xfrm>
+            <a:off x="6847180" y="2778863"/>
+            <a:ext cx="1032744" cy="369332"/>
+          </a:xfrm>
+          <a:prstGeom prst="rect">
+            <a:avLst/>
+          </a:prstGeom>
+          <a:noFill/>
+        </p:spPr>
+        <p:txBody>
+          <a:bodyPr wrap="square" rtlCol="0">
+            <a:spAutoFit/>
+          </a:bodyPr>
+          <a:lstStyle/>
+          <a:p>
+            <a:r>
+              <a:rPr lang="en-US" dirty="0"/>
+              <a:t>4</a:t>
+            </a:r>
+            <a:endParaRPr lang="en-CA" dirty="0"/>
+          </a:p>
+        </p:txBody>
+      </p:sp>
+      <p:sp>
+        <p:nvSpPr>
+          <p:cNvPr id="46" name="TextBox 45">
+            <a:extLst>
+              <a:ext uri="{FF2B5EF4-FFF2-40B4-BE49-F238E27FC236}">
+                <a16:creationId xmlns:a16="http://schemas.microsoft.com/office/drawing/2014/main" id="{7434E89F-A131-44FF-B6F9-063777CCF835}"/>
+              </a:ext>
+            </a:extLst>
+          </p:cNvPr>
+          <p:cNvSpPr txBox="1"/>
+          <p:nvPr/>
+        </p:nvSpPr>
+        <p:spPr>
+          <a:xfrm>
+            <a:off x="7230994" y="4247667"/>
+            <a:ext cx="1032744" cy="369332"/>
+          </a:xfrm>
+          <a:prstGeom prst="rect">
+            <a:avLst/>
+          </a:prstGeom>
+          <a:noFill/>
+        </p:spPr>
+        <p:txBody>
+          <a:bodyPr wrap="square" rtlCol="0">
+            <a:spAutoFit/>
+          </a:bodyPr>
+          <a:lstStyle/>
+          <a:p>
+            <a:r>
+              <a:rPr lang="en-US" dirty="0"/>
+              <a:t>4</a:t>
+            </a:r>
+            <a:endParaRPr lang="en-CA" dirty="0"/>
           </a:p>
         </p:txBody>
       </p:sp>

</xml_diff>

<commit_message>
add planes transformations image to the design document
</commit_message>
<xml_diff>
--- a/Docs/Design.pptx
+++ b/Docs/Design.pptx
@@ -8,6 +8,7 @@
     <p:sldId id="256" r:id="rId2"/>
     <p:sldId id="257" r:id="rId3"/>
     <p:sldId id="258" r:id="rId4"/>
+    <p:sldId id="259" r:id="rId5"/>
   </p:sldIdLst>
   <p:sldSz cx="12192000" cy="6858000"/>
   <p:notesSz cx="6858000" cy="9144000"/>
@@ -263,7 +264,7 @@
           <a:p>
             <a:fld id="{D70168D3-9BA9-4B67-B593-8F465BBDFFE3}" type="datetimeFigureOut">
               <a:rPr lang="en-CA" smtClean="0"/>
-              <a:t>2020-11-30</a:t>
+              <a:t>2020-12-10</a:t>
             </a:fld>
             <a:endParaRPr lang="en-CA"/>
           </a:p>
@@ -317,7 +318,7 @@
           <a:p>
             <a:fld id="{F7C9C457-2A57-48F1-B567-73EB210D3A2E}" type="slidenum">
               <a:rPr lang="en-CA" smtClean="0"/>
-              <a:t>‹#›</a:t>
+              <a:t>‹Nº›</a:t>
             </a:fld>
             <a:endParaRPr lang="en-CA"/>
           </a:p>
@@ -463,7 +464,7 @@
           <a:p>
             <a:fld id="{D70168D3-9BA9-4B67-B593-8F465BBDFFE3}" type="datetimeFigureOut">
               <a:rPr lang="en-CA" smtClean="0"/>
-              <a:t>2020-11-30</a:t>
+              <a:t>2020-12-10</a:t>
             </a:fld>
             <a:endParaRPr lang="en-CA"/>
           </a:p>
@@ -517,7 +518,7 @@
           <a:p>
             <a:fld id="{F7C9C457-2A57-48F1-B567-73EB210D3A2E}" type="slidenum">
               <a:rPr lang="en-CA" smtClean="0"/>
-              <a:t>‹#›</a:t>
+              <a:t>‹Nº›</a:t>
             </a:fld>
             <a:endParaRPr lang="en-CA"/>
           </a:p>
@@ -673,7 +674,7 @@
           <a:p>
             <a:fld id="{D70168D3-9BA9-4B67-B593-8F465BBDFFE3}" type="datetimeFigureOut">
               <a:rPr lang="en-CA" smtClean="0"/>
-              <a:t>2020-11-30</a:t>
+              <a:t>2020-12-10</a:t>
             </a:fld>
             <a:endParaRPr lang="en-CA"/>
           </a:p>
@@ -727,7 +728,7 @@
           <a:p>
             <a:fld id="{F7C9C457-2A57-48F1-B567-73EB210D3A2E}" type="slidenum">
               <a:rPr lang="en-CA" smtClean="0"/>
-              <a:t>‹#›</a:t>
+              <a:t>‹Nº›</a:t>
             </a:fld>
             <a:endParaRPr lang="en-CA"/>
           </a:p>
@@ -873,7 +874,7 @@
           <a:p>
             <a:fld id="{D70168D3-9BA9-4B67-B593-8F465BBDFFE3}" type="datetimeFigureOut">
               <a:rPr lang="en-CA" smtClean="0"/>
-              <a:t>2020-11-30</a:t>
+              <a:t>2020-12-10</a:t>
             </a:fld>
             <a:endParaRPr lang="en-CA"/>
           </a:p>
@@ -927,7 +928,7 @@
           <a:p>
             <a:fld id="{F7C9C457-2A57-48F1-B567-73EB210D3A2E}" type="slidenum">
               <a:rPr lang="en-CA" smtClean="0"/>
-              <a:t>‹#›</a:t>
+              <a:t>‹Nº›</a:t>
             </a:fld>
             <a:endParaRPr lang="en-CA"/>
           </a:p>
@@ -1149,7 +1150,7 @@
           <a:p>
             <a:fld id="{D70168D3-9BA9-4B67-B593-8F465BBDFFE3}" type="datetimeFigureOut">
               <a:rPr lang="en-CA" smtClean="0"/>
-              <a:t>2020-11-30</a:t>
+              <a:t>2020-12-10</a:t>
             </a:fld>
             <a:endParaRPr lang="en-CA"/>
           </a:p>
@@ -1203,7 +1204,7 @@
           <a:p>
             <a:fld id="{F7C9C457-2A57-48F1-B567-73EB210D3A2E}" type="slidenum">
               <a:rPr lang="en-CA" smtClean="0"/>
-              <a:t>‹#›</a:t>
+              <a:t>‹Nº›</a:t>
             </a:fld>
             <a:endParaRPr lang="en-CA"/>
           </a:p>
@@ -1417,7 +1418,7 @@
           <a:p>
             <a:fld id="{D70168D3-9BA9-4B67-B593-8F465BBDFFE3}" type="datetimeFigureOut">
               <a:rPr lang="en-CA" smtClean="0"/>
-              <a:t>2020-11-30</a:t>
+              <a:t>2020-12-10</a:t>
             </a:fld>
             <a:endParaRPr lang="en-CA"/>
           </a:p>
@@ -1471,7 +1472,7 @@
           <a:p>
             <a:fld id="{F7C9C457-2A57-48F1-B567-73EB210D3A2E}" type="slidenum">
               <a:rPr lang="en-CA" smtClean="0"/>
-              <a:t>‹#›</a:t>
+              <a:t>‹Nº›</a:t>
             </a:fld>
             <a:endParaRPr lang="en-CA"/>
           </a:p>
@@ -1832,7 +1833,7 @@
           <a:p>
             <a:fld id="{D70168D3-9BA9-4B67-B593-8F465BBDFFE3}" type="datetimeFigureOut">
               <a:rPr lang="en-CA" smtClean="0"/>
-              <a:t>2020-11-30</a:t>
+              <a:t>2020-12-10</a:t>
             </a:fld>
             <a:endParaRPr lang="en-CA"/>
           </a:p>
@@ -1886,7 +1887,7 @@
           <a:p>
             <a:fld id="{F7C9C457-2A57-48F1-B567-73EB210D3A2E}" type="slidenum">
               <a:rPr lang="en-CA" smtClean="0"/>
-              <a:t>‹#›</a:t>
+              <a:t>‹Nº›</a:t>
             </a:fld>
             <a:endParaRPr lang="en-CA"/>
           </a:p>
@@ -1974,7 +1975,7 @@
           <a:p>
             <a:fld id="{D70168D3-9BA9-4B67-B593-8F465BBDFFE3}" type="datetimeFigureOut">
               <a:rPr lang="en-CA" smtClean="0"/>
-              <a:t>2020-11-30</a:t>
+              <a:t>2020-12-10</a:t>
             </a:fld>
             <a:endParaRPr lang="en-CA"/>
           </a:p>
@@ -2028,7 +2029,7 @@
           <a:p>
             <a:fld id="{F7C9C457-2A57-48F1-B567-73EB210D3A2E}" type="slidenum">
               <a:rPr lang="en-CA" smtClean="0"/>
-              <a:t>‹#›</a:t>
+              <a:t>‹Nº›</a:t>
             </a:fld>
             <a:endParaRPr lang="en-CA"/>
           </a:p>
@@ -2087,7 +2088,7 @@
           <a:p>
             <a:fld id="{D70168D3-9BA9-4B67-B593-8F465BBDFFE3}" type="datetimeFigureOut">
               <a:rPr lang="en-CA" smtClean="0"/>
-              <a:t>2020-11-30</a:t>
+              <a:t>2020-12-10</a:t>
             </a:fld>
             <a:endParaRPr lang="en-CA"/>
           </a:p>
@@ -2141,7 +2142,7 @@
           <a:p>
             <a:fld id="{F7C9C457-2A57-48F1-B567-73EB210D3A2E}" type="slidenum">
               <a:rPr lang="en-CA" smtClean="0"/>
-              <a:t>‹#›</a:t>
+              <a:t>‹Nº›</a:t>
             </a:fld>
             <a:endParaRPr lang="en-CA"/>
           </a:p>
@@ -2400,7 +2401,7 @@
           <a:p>
             <a:fld id="{D70168D3-9BA9-4B67-B593-8F465BBDFFE3}" type="datetimeFigureOut">
               <a:rPr lang="en-CA" smtClean="0"/>
-              <a:t>2020-11-30</a:t>
+              <a:t>2020-12-10</a:t>
             </a:fld>
             <a:endParaRPr lang="en-CA"/>
           </a:p>
@@ -2454,7 +2455,7 @@
           <a:p>
             <a:fld id="{F7C9C457-2A57-48F1-B567-73EB210D3A2E}" type="slidenum">
               <a:rPr lang="en-CA" smtClean="0"/>
-              <a:t>‹#›</a:t>
+              <a:t>‹Nº›</a:t>
             </a:fld>
             <a:endParaRPr lang="en-CA"/>
           </a:p>
@@ -2689,7 +2690,7 @@
           <a:p>
             <a:fld id="{D70168D3-9BA9-4B67-B593-8F465BBDFFE3}" type="datetimeFigureOut">
               <a:rPr lang="en-CA" smtClean="0"/>
-              <a:t>2020-11-30</a:t>
+              <a:t>2020-12-10</a:t>
             </a:fld>
             <a:endParaRPr lang="en-CA"/>
           </a:p>
@@ -2743,7 +2744,7 @@
           <a:p>
             <a:fld id="{F7C9C457-2A57-48F1-B567-73EB210D3A2E}" type="slidenum">
               <a:rPr lang="en-CA" smtClean="0"/>
-              <a:t>‹#›</a:t>
+              <a:t>‹Nº›</a:t>
             </a:fld>
             <a:endParaRPr lang="en-CA"/>
           </a:p>
@@ -2932,7 +2933,7 @@
           <a:p>
             <a:fld id="{D70168D3-9BA9-4B67-B593-8F465BBDFFE3}" type="datetimeFigureOut">
               <a:rPr lang="en-CA" smtClean="0"/>
-              <a:t>2020-11-30</a:t>
+              <a:t>2020-12-10</a:t>
             </a:fld>
             <a:endParaRPr lang="en-CA"/>
           </a:p>
@@ -3022,7 +3023,7 @@
           <a:p>
             <a:fld id="{F7C9C457-2A57-48F1-B567-73EB210D3A2E}" type="slidenum">
               <a:rPr lang="en-CA" smtClean="0"/>
-              <a:t>‹#›</a:t>
+              <a:t>‹Nº›</a:t>
             </a:fld>
             <a:endParaRPr lang="en-CA"/>
           </a:p>
@@ -5654,6 +5655,66 @@
 </p:sld>
 </file>
 
+<file path=ppt/slides/slide4.xml><?xml version="1.0" encoding="utf-8"?>
+<p:sld xmlns:a="http://schemas.openxmlformats.org/drawingml/2006/main" xmlns:r="http://schemas.openxmlformats.org/officeDocument/2006/relationships" xmlns:p="http://schemas.openxmlformats.org/presentationml/2006/main">
+  <p:cSld>
+    <p:spTree>
+      <p:nvGrpSpPr>
+        <p:cNvPr id="1" name=""/>
+        <p:cNvGrpSpPr/>
+        <p:nvPr/>
+      </p:nvGrpSpPr>
+      <p:grpSpPr>
+        <a:xfrm>
+          <a:off x="0" y="0"/>
+          <a:ext cx="0" cy="0"/>
+          <a:chOff x="0" y="0"/>
+          <a:chExt cx="0" cy="0"/>
+        </a:xfrm>
+      </p:grpSpPr>
+      <p:pic>
+        <p:nvPicPr>
+          <p:cNvPr id="3" name="Imagen 2"/>
+          <p:cNvPicPr>
+            <a:picLocks noChangeAspect="1"/>
+          </p:cNvPicPr>
+          <p:nvPr/>
+        </p:nvPicPr>
+        <p:blipFill>
+          <a:blip r:embed="rId2">
+            <a:extLst>
+              <a:ext uri="{28A0092B-C50C-407E-A947-70E740481C1C}">
+                <a14:useLocalDpi xmlns:a14="http://schemas.microsoft.com/office/drawing/2010/main" val="0"/>
+              </a:ext>
+            </a:extLst>
+          </a:blip>
+          <a:stretch>
+            <a:fillRect/>
+          </a:stretch>
+        </p:blipFill>
+        <p:spPr>
+          <a:xfrm>
+            <a:off x="1682890" y="365125"/>
+            <a:ext cx="9030417" cy="6459044"/>
+          </a:xfrm>
+          <a:prstGeom prst="rect">
+            <a:avLst/>
+          </a:prstGeom>
+        </p:spPr>
+      </p:pic>
+    </p:spTree>
+    <p:extLst>
+      <p:ext uri="{BB962C8B-B14F-4D97-AF65-F5344CB8AC3E}">
+        <p14:creationId xmlns:p14="http://schemas.microsoft.com/office/powerpoint/2010/main" val="302570083"/>
+      </p:ext>
+    </p:extLst>
+  </p:cSld>
+  <p:clrMapOvr>
+    <a:masterClrMapping/>
+  </p:clrMapOvr>
+</p:sld>
+</file>
+
 <file path=ppt/theme/theme1.xml><?xml version="1.0" encoding="utf-8"?>
 <a:theme xmlns:a="http://schemas.openxmlformats.org/drawingml/2006/main" name="Office Theme">
   <a:themeElements>

</xml_diff>

<commit_message>
Add Fibula coordinate system to design.pptx
</commit_message>
<xml_diff>
--- a/Docs/Design.pptx
+++ b/Docs/Design.pptx
@@ -264,7 +264,7 @@
           <a:p>
             <a:fld id="{D70168D3-9BA9-4B67-B593-8F465BBDFFE3}" type="datetimeFigureOut">
               <a:rPr lang="en-CA" smtClean="0"/>
-              <a:t>2020-12-10</a:t>
+              <a:t>2020-12-11</a:t>
             </a:fld>
             <a:endParaRPr lang="en-CA"/>
           </a:p>
@@ -318,7 +318,7 @@
           <a:p>
             <a:fld id="{F7C9C457-2A57-48F1-B567-73EB210D3A2E}" type="slidenum">
               <a:rPr lang="en-CA" smtClean="0"/>
-              <a:t>‹Nº›</a:t>
+              <a:t>‹#›</a:t>
             </a:fld>
             <a:endParaRPr lang="en-CA"/>
           </a:p>
@@ -464,7 +464,7 @@
           <a:p>
             <a:fld id="{D70168D3-9BA9-4B67-B593-8F465BBDFFE3}" type="datetimeFigureOut">
               <a:rPr lang="en-CA" smtClean="0"/>
-              <a:t>2020-12-10</a:t>
+              <a:t>2020-12-11</a:t>
             </a:fld>
             <a:endParaRPr lang="en-CA"/>
           </a:p>
@@ -518,7 +518,7 @@
           <a:p>
             <a:fld id="{F7C9C457-2A57-48F1-B567-73EB210D3A2E}" type="slidenum">
               <a:rPr lang="en-CA" smtClean="0"/>
-              <a:t>‹Nº›</a:t>
+              <a:t>‹#›</a:t>
             </a:fld>
             <a:endParaRPr lang="en-CA"/>
           </a:p>
@@ -674,7 +674,7 @@
           <a:p>
             <a:fld id="{D70168D3-9BA9-4B67-B593-8F465BBDFFE3}" type="datetimeFigureOut">
               <a:rPr lang="en-CA" smtClean="0"/>
-              <a:t>2020-12-10</a:t>
+              <a:t>2020-12-11</a:t>
             </a:fld>
             <a:endParaRPr lang="en-CA"/>
           </a:p>
@@ -728,7 +728,7 @@
           <a:p>
             <a:fld id="{F7C9C457-2A57-48F1-B567-73EB210D3A2E}" type="slidenum">
               <a:rPr lang="en-CA" smtClean="0"/>
-              <a:t>‹Nº›</a:t>
+              <a:t>‹#›</a:t>
             </a:fld>
             <a:endParaRPr lang="en-CA"/>
           </a:p>
@@ -874,7 +874,7 @@
           <a:p>
             <a:fld id="{D70168D3-9BA9-4B67-B593-8F465BBDFFE3}" type="datetimeFigureOut">
               <a:rPr lang="en-CA" smtClean="0"/>
-              <a:t>2020-12-10</a:t>
+              <a:t>2020-12-11</a:t>
             </a:fld>
             <a:endParaRPr lang="en-CA"/>
           </a:p>
@@ -928,7 +928,7 @@
           <a:p>
             <a:fld id="{F7C9C457-2A57-48F1-B567-73EB210D3A2E}" type="slidenum">
               <a:rPr lang="en-CA" smtClean="0"/>
-              <a:t>‹Nº›</a:t>
+              <a:t>‹#›</a:t>
             </a:fld>
             <a:endParaRPr lang="en-CA"/>
           </a:p>
@@ -1150,7 +1150,7 @@
           <a:p>
             <a:fld id="{D70168D3-9BA9-4B67-B593-8F465BBDFFE3}" type="datetimeFigureOut">
               <a:rPr lang="en-CA" smtClean="0"/>
-              <a:t>2020-12-10</a:t>
+              <a:t>2020-12-11</a:t>
             </a:fld>
             <a:endParaRPr lang="en-CA"/>
           </a:p>
@@ -1204,7 +1204,7 @@
           <a:p>
             <a:fld id="{F7C9C457-2A57-48F1-B567-73EB210D3A2E}" type="slidenum">
               <a:rPr lang="en-CA" smtClean="0"/>
-              <a:t>‹Nº›</a:t>
+              <a:t>‹#›</a:t>
             </a:fld>
             <a:endParaRPr lang="en-CA"/>
           </a:p>
@@ -1418,7 +1418,7 @@
           <a:p>
             <a:fld id="{D70168D3-9BA9-4B67-B593-8F465BBDFFE3}" type="datetimeFigureOut">
               <a:rPr lang="en-CA" smtClean="0"/>
-              <a:t>2020-12-10</a:t>
+              <a:t>2020-12-11</a:t>
             </a:fld>
             <a:endParaRPr lang="en-CA"/>
           </a:p>
@@ -1472,7 +1472,7 @@
           <a:p>
             <a:fld id="{F7C9C457-2A57-48F1-B567-73EB210D3A2E}" type="slidenum">
               <a:rPr lang="en-CA" smtClean="0"/>
-              <a:t>‹Nº›</a:t>
+              <a:t>‹#›</a:t>
             </a:fld>
             <a:endParaRPr lang="en-CA"/>
           </a:p>
@@ -1833,7 +1833,7 @@
           <a:p>
             <a:fld id="{D70168D3-9BA9-4B67-B593-8F465BBDFFE3}" type="datetimeFigureOut">
               <a:rPr lang="en-CA" smtClean="0"/>
-              <a:t>2020-12-10</a:t>
+              <a:t>2020-12-11</a:t>
             </a:fld>
             <a:endParaRPr lang="en-CA"/>
           </a:p>
@@ -1887,7 +1887,7 @@
           <a:p>
             <a:fld id="{F7C9C457-2A57-48F1-B567-73EB210D3A2E}" type="slidenum">
               <a:rPr lang="en-CA" smtClean="0"/>
-              <a:t>‹Nº›</a:t>
+              <a:t>‹#›</a:t>
             </a:fld>
             <a:endParaRPr lang="en-CA"/>
           </a:p>
@@ -1975,7 +1975,7 @@
           <a:p>
             <a:fld id="{D70168D3-9BA9-4B67-B593-8F465BBDFFE3}" type="datetimeFigureOut">
               <a:rPr lang="en-CA" smtClean="0"/>
-              <a:t>2020-12-10</a:t>
+              <a:t>2020-12-11</a:t>
             </a:fld>
             <a:endParaRPr lang="en-CA"/>
           </a:p>
@@ -2029,7 +2029,7 @@
           <a:p>
             <a:fld id="{F7C9C457-2A57-48F1-B567-73EB210D3A2E}" type="slidenum">
               <a:rPr lang="en-CA" smtClean="0"/>
-              <a:t>‹Nº›</a:t>
+              <a:t>‹#›</a:t>
             </a:fld>
             <a:endParaRPr lang="en-CA"/>
           </a:p>
@@ -2088,7 +2088,7 @@
           <a:p>
             <a:fld id="{D70168D3-9BA9-4B67-B593-8F465BBDFFE3}" type="datetimeFigureOut">
               <a:rPr lang="en-CA" smtClean="0"/>
-              <a:t>2020-12-10</a:t>
+              <a:t>2020-12-11</a:t>
             </a:fld>
             <a:endParaRPr lang="en-CA"/>
           </a:p>
@@ -2142,7 +2142,7 @@
           <a:p>
             <a:fld id="{F7C9C457-2A57-48F1-B567-73EB210D3A2E}" type="slidenum">
               <a:rPr lang="en-CA" smtClean="0"/>
-              <a:t>‹Nº›</a:t>
+              <a:t>‹#›</a:t>
             </a:fld>
             <a:endParaRPr lang="en-CA"/>
           </a:p>
@@ -2401,7 +2401,7 @@
           <a:p>
             <a:fld id="{D70168D3-9BA9-4B67-B593-8F465BBDFFE3}" type="datetimeFigureOut">
               <a:rPr lang="en-CA" smtClean="0"/>
-              <a:t>2020-12-10</a:t>
+              <a:t>2020-12-11</a:t>
             </a:fld>
             <a:endParaRPr lang="en-CA"/>
           </a:p>
@@ -2455,7 +2455,7 @@
           <a:p>
             <a:fld id="{F7C9C457-2A57-48F1-B567-73EB210D3A2E}" type="slidenum">
               <a:rPr lang="en-CA" smtClean="0"/>
-              <a:t>‹Nº›</a:t>
+              <a:t>‹#›</a:t>
             </a:fld>
             <a:endParaRPr lang="en-CA"/>
           </a:p>
@@ -2690,7 +2690,7 @@
           <a:p>
             <a:fld id="{D70168D3-9BA9-4B67-B593-8F465BBDFFE3}" type="datetimeFigureOut">
               <a:rPr lang="en-CA" smtClean="0"/>
-              <a:t>2020-12-10</a:t>
+              <a:t>2020-12-11</a:t>
             </a:fld>
             <a:endParaRPr lang="en-CA"/>
           </a:p>
@@ -2744,7 +2744,7 @@
           <a:p>
             <a:fld id="{F7C9C457-2A57-48F1-B567-73EB210D3A2E}" type="slidenum">
               <a:rPr lang="en-CA" smtClean="0"/>
-              <a:t>‹Nº›</a:t>
+              <a:t>‹#›</a:t>
             </a:fld>
             <a:endParaRPr lang="en-CA"/>
           </a:p>
@@ -2933,7 +2933,7 @@
           <a:p>
             <a:fld id="{D70168D3-9BA9-4B67-B593-8F465BBDFFE3}" type="datetimeFigureOut">
               <a:rPr lang="en-CA" smtClean="0"/>
-              <a:t>2020-12-10</a:t>
+              <a:t>2020-12-11</a:t>
             </a:fld>
             <a:endParaRPr lang="en-CA"/>
           </a:p>
@@ -3023,7 +3023,7 @@
           <a:p>
             <a:fld id="{F7C9C457-2A57-48F1-B567-73EB210D3A2E}" type="slidenum">
               <a:rPr lang="en-CA" smtClean="0"/>
-              <a:t>‹Nº›</a:t>
+              <a:t>‹#›</a:t>
             </a:fld>
             <a:endParaRPr lang="en-CA"/>
           </a:p>
@@ -3493,13 +3493,13 @@
         </p:nvSpPr>
         <p:spPr>
           <a:xfrm>
-            <a:off x="696063" y="4379752"/>
+            <a:off x="6720229" y="6075375"/>
             <a:ext cx="2193185" cy="694394"/>
           </a:xfrm>
           <a:prstGeom prst="wedgeRectCallout">
             <a:avLst>
-              <a:gd name="adj1" fmla="val 76032"/>
-              <a:gd name="adj2" fmla="val -30569"/>
+              <a:gd name="adj1" fmla="val 16471"/>
+              <a:gd name="adj2" fmla="val -116708"/>
             </a:avLst>
           </a:prstGeom>
           <a:solidFill>
@@ -4806,45 +4806,6 @@
           </a:p>
         </p:txBody>
       </p:sp>
-      <p:cxnSp>
-        <p:nvCxnSpPr>
-          <p:cNvPr id="3" name="Straight Arrow Connector 2">
-            <a:extLst>
-              <a:ext uri="{FF2B5EF4-FFF2-40B4-BE49-F238E27FC236}">
-                <a16:creationId xmlns:a16="http://schemas.microsoft.com/office/drawing/2014/main" id="{EDA97FD4-388E-40D8-A32A-BC25A61D681D}"/>
-              </a:ext>
-            </a:extLst>
-          </p:cNvPr>
-          <p:cNvCxnSpPr/>
-          <p:nvPr/>
-        </p:nvCxnSpPr>
-        <p:spPr>
-          <a:xfrm flipV="1">
-            <a:off x="8112722" y="4792006"/>
-            <a:ext cx="405636" cy="659024"/>
-          </a:xfrm>
-          <a:prstGeom prst="straightConnector1">
-            <a:avLst/>
-          </a:prstGeom>
-          <a:ln>
-            <a:tailEnd type="triangle"/>
-          </a:ln>
-        </p:spPr>
-        <p:style>
-          <a:lnRef idx="1">
-            <a:schemeClr val="accent1"/>
-          </a:lnRef>
-          <a:fillRef idx="0">
-            <a:schemeClr val="accent1"/>
-          </a:fillRef>
-          <a:effectRef idx="0">
-            <a:schemeClr val="accent1"/>
-          </a:effectRef>
-          <a:fontRef idx="minor">
-            <a:schemeClr val="tx1"/>
-          </a:fontRef>
-        </p:style>
-      </p:cxnSp>
       <p:sp>
         <p:nvSpPr>
           <p:cNvPr id="24" name="Flowchart: Data 23">
@@ -5565,6 +5526,357 @@
           </a:p>
         </p:txBody>
       </p:sp>
+      <p:grpSp>
+        <p:nvGrpSpPr>
+          <p:cNvPr id="15" name="Group 14">
+            <a:extLst>
+              <a:ext uri="{FF2B5EF4-FFF2-40B4-BE49-F238E27FC236}">
+                <a16:creationId xmlns:a16="http://schemas.microsoft.com/office/drawing/2014/main" id="{88B7E665-0651-4D0F-8ABC-3C58AE2382B3}"/>
+              </a:ext>
+            </a:extLst>
+          </p:cNvPr>
+          <p:cNvGrpSpPr/>
+          <p:nvPr/>
+        </p:nvGrpSpPr>
+        <p:grpSpPr>
+          <a:xfrm>
+            <a:off x="2298715" y="3397350"/>
+            <a:ext cx="2235865" cy="1469882"/>
+            <a:chOff x="2298715" y="3397350"/>
+            <a:chExt cx="2235865" cy="1469882"/>
+          </a:xfrm>
+        </p:grpSpPr>
+        <p:cxnSp>
+          <p:nvCxnSpPr>
+            <p:cNvPr id="3" name="Straight Arrow Connector 2">
+              <a:extLst>
+                <a:ext uri="{FF2B5EF4-FFF2-40B4-BE49-F238E27FC236}">
+                  <a16:creationId xmlns:a16="http://schemas.microsoft.com/office/drawing/2014/main" id="{EDA97FD4-388E-40D8-A32A-BC25A61D681D}"/>
+                </a:ext>
+              </a:extLst>
+            </p:cNvPr>
+            <p:cNvCxnSpPr>
+              <a:cxnSpLocks/>
+            </p:cNvCxnSpPr>
+            <p:nvPr/>
+          </p:nvCxnSpPr>
+          <p:spPr>
+            <a:xfrm flipV="1">
+              <a:off x="3064436" y="3570874"/>
+              <a:ext cx="68247" cy="717683"/>
+            </a:xfrm>
+            <a:prstGeom prst="straightConnector1">
+              <a:avLst/>
+            </a:prstGeom>
+            <a:ln w="57150">
+              <a:solidFill>
+                <a:schemeClr val="accent6">
+                  <a:lumMod val="75000"/>
+                </a:schemeClr>
+              </a:solidFill>
+              <a:tailEnd type="triangle"/>
+            </a:ln>
+          </p:spPr>
+          <p:style>
+            <a:lnRef idx="1">
+              <a:schemeClr val="accent1"/>
+            </a:lnRef>
+            <a:fillRef idx="0">
+              <a:schemeClr val="accent1"/>
+            </a:fillRef>
+            <a:effectRef idx="0">
+              <a:schemeClr val="accent1"/>
+            </a:effectRef>
+            <a:fontRef idx="minor">
+              <a:schemeClr val="tx1"/>
+            </a:fontRef>
+          </p:style>
+        </p:cxnSp>
+        <p:cxnSp>
+          <p:nvCxnSpPr>
+            <p:cNvPr id="48" name="Straight Arrow Connector 47">
+              <a:extLst>
+                <a:ext uri="{FF2B5EF4-FFF2-40B4-BE49-F238E27FC236}">
+                  <a16:creationId xmlns:a16="http://schemas.microsoft.com/office/drawing/2014/main" id="{6147AA89-77A2-4390-90D9-BCB853971A7E}"/>
+                </a:ext>
+              </a:extLst>
+            </p:cNvPr>
+            <p:cNvCxnSpPr>
+              <a:cxnSpLocks/>
+            </p:cNvCxnSpPr>
+            <p:nvPr/>
+          </p:nvCxnSpPr>
+          <p:spPr>
+            <a:xfrm>
+              <a:off x="3041053" y="4302573"/>
+              <a:ext cx="760384" cy="156099"/>
+            </a:xfrm>
+            <a:prstGeom prst="straightConnector1">
+              <a:avLst/>
+            </a:prstGeom>
+            <a:ln w="57150">
+              <a:solidFill>
+                <a:schemeClr val="accent6">
+                  <a:lumMod val="75000"/>
+                </a:schemeClr>
+              </a:solidFill>
+              <a:tailEnd type="triangle"/>
+            </a:ln>
+          </p:spPr>
+          <p:style>
+            <a:lnRef idx="1">
+              <a:schemeClr val="accent1"/>
+            </a:lnRef>
+            <a:fillRef idx="0">
+              <a:schemeClr val="accent1"/>
+            </a:fillRef>
+            <a:effectRef idx="0">
+              <a:schemeClr val="accent1"/>
+            </a:effectRef>
+            <a:fontRef idx="minor">
+              <a:schemeClr val="tx1"/>
+            </a:fontRef>
+          </p:style>
+        </p:cxnSp>
+        <p:cxnSp>
+          <p:nvCxnSpPr>
+            <p:cNvPr id="49" name="Straight Arrow Connector 48">
+              <a:extLst>
+                <a:ext uri="{FF2B5EF4-FFF2-40B4-BE49-F238E27FC236}">
+                  <a16:creationId xmlns:a16="http://schemas.microsoft.com/office/drawing/2014/main" id="{81164CEC-C994-43F1-B3A6-204C57D4060F}"/>
+                </a:ext>
+              </a:extLst>
+            </p:cNvPr>
+            <p:cNvCxnSpPr>
+              <a:cxnSpLocks/>
+            </p:cNvCxnSpPr>
+            <p:nvPr/>
+          </p:nvCxnSpPr>
+          <p:spPr>
+            <a:xfrm flipH="1">
+              <a:off x="2521757" y="4302573"/>
+              <a:ext cx="553729" cy="271697"/>
+            </a:xfrm>
+            <a:prstGeom prst="straightConnector1">
+              <a:avLst/>
+            </a:prstGeom>
+            <a:ln w="57150">
+              <a:solidFill>
+                <a:schemeClr val="accent6">
+                  <a:lumMod val="75000"/>
+                </a:schemeClr>
+              </a:solidFill>
+              <a:tailEnd type="triangle"/>
+            </a:ln>
+          </p:spPr>
+          <p:style>
+            <a:lnRef idx="1">
+              <a:schemeClr val="accent1"/>
+            </a:lnRef>
+            <a:fillRef idx="0">
+              <a:schemeClr val="accent1"/>
+            </a:fillRef>
+            <a:effectRef idx="0">
+              <a:schemeClr val="accent1"/>
+            </a:effectRef>
+            <a:fontRef idx="minor">
+              <a:schemeClr val="tx1"/>
+            </a:fontRef>
+          </p:style>
+        </p:cxnSp>
+        <p:sp>
+          <p:nvSpPr>
+            <p:cNvPr id="51" name="TextBox 50">
+              <a:extLst>
+                <a:ext uri="{FF2B5EF4-FFF2-40B4-BE49-F238E27FC236}">
+                  <a16:creationId xmlns:a16="http://schemas.microsoft.com/office/drawing/2014/main" id="{B197CCBE-9C58-4BC0-9C20-8D20E171349D}"/>
+                </a:ext>
+              </a:extLst>
+            </p:cNvPr>
+            <p:cNvSpPr txBox="1"/>
+            <p:nvPr/>
+          </p:nvSpPr>
+          <p:spPr>
+            <a:xfrm>
+              <a:off x="2298715" y="3957963"/>
+              <a:ext cx="892184" cy="369332"/>
+            </a:xfrm>
+            <a:prstGeom prst="rect">
+              <a:avLst/>
+            </a:prstGeom>
+            <a:noFill/>
+          </p:spPr>
+          <p:txBody>
+            <a:bodyPr wrap="square" rtlCol="0">
+              <a:spAutoFit/>
+            </a:bodyPr>
+            <a:lstStyle/>
+            <a:p>
+              <a:r>
+                <a:rPr lang="en-US" b="1" i="1" dirty="0">
+                  <a:solidFill>
+                    <a:schemeClr val="accent6">
+                      <a:lumMod val="75000"/>
+                    </a:schemeClr>
+                  </a:solidFill>
+                </a:rPr>
+                <a:t>Fibula</a:t>
+              </a:r>
+              <a:endParaRPr lang="en-CA" b="1" i="1" dirty="0">
+                <a:solidFill>
+                  <a:schemeClr val="accent6">
+                    <a:lumMod val="75000"/>
+                  </a:schemeClr>
+                </a:solidFill>
+              </a:endParaRPr>
+            </a:p>
+          </p:txBody>
+        </p:sp>
+        <p:sp>
+          <p:nvSpPr>
+            <p:cNvPr id="52" name="TextBox 51">
+              <a:extLst>
+                <a:ext uri="{FF2B5EF4-FFF2-40B4-BE49-F238E27FC236}">
+                  <a16:creationId xmlns:a16="http://schemas.microsoft.com/office/drawing/2014/main" id="{06B789A9-2BCB-4080-B4D5-B3D0DAD6B8D4}"/>
+                </a:ext>
+              </a:extLst>
+            </p:cNvPr>
+            <p:cNvSpPr txBox="1"/>
+            <p:nvPr/>
+          </p:nvSpPr>
+          <p:spPr>
+            <a:xfrm>
+              <a:off x="3642396" y="4050330"/>
+              <a:ext cx="892184" cy="369332"/>
+            </a:xfrm>
+            <a:prstGeom prst="rect">
+              <a:avLst/>
+            </a:prstGeom>
+            <a:noFill/>
+          </p:spPr>
+          <p:txBody>
+            <a:bodyPr wrap="square" rtlCol="0">
+              <a:spAutoFit/>
+            </a:bodyPr>
+            <a:lstStyle/>
+            <a:p>
+              <a:r>
+                <a:rPr lang="en-US" b="1" i="1" dirty="0">
+                  <a:solidFill>
+                    <a:schemeClr val="accent6">
+                      <a:lumMod val="75000"/>
+                    </a:schemeClr>
+                  </a:solidFill>
+                </a:rPr>
+                <a:t>x</a:t>
+              </a:r>
+              <a:endParaRPr lang="en-CA" b="1" i="1" dirty="0">
+                <a:solidFill>
+                  <a:schemeClr val="accent6">
+                    <a:lumMod val="75000"/>
+                  </a:schemeClr>
+                </a:solidFill>
+              </a:endParaRPr>
+            </a:p>
+          </p:txBody>
+        </p:sp>
+        <p:sp>
+          <p:nvSpPr>
+            <p:cNvPr id="54" name="TextBox 53">
+              <a:extLst>
+                <a:ext uri="{FF2B5EF4-FFF2-40B4-BE49-F238E27FC236}">
+                  <a16:creationId xmlns:a16="http://schemas.microsoft.com/office/drawing/2014/main" id="{9237FAFB-C4E9-432A-A599-50189C05785A}"/>
+                </a:ext>
+              </a:extLst>
+            </p:cNvPr>
+            <p:cNvSpPr txBox="1"/>
+            <p:nvPr/>
+          </p:nvSpPr>
+          <p:spPr>
+            <a:xfrm>
+              <a:off x="2777041" y="3397350"/>
+              <a:ext cx="892184" cy="369332"/>
+            </a:xfrm>
+            <a:prstGeom prst="rect">
+              <a:avLst/>
+            </a:prstGeom>
+            <a:noFill/>
+          </p:spPr>
+          <p:txBody>
+            <a:bodyPr wrap="square" rtlCol="0">
+              <a:spAutoFit/>
+            </a:bodyPr>
+            <a:lstStyle/>
+            <a:p>
+              <a:r>
+                <a:rPr lang="en-US" b="1" i="1" dirty="0">
+                  <a:solidFill>
+                    <a:schemeClr val="accent6">
+                      <a:lumMod val="75000"/>
+                    </a:schemeClr>
+                  </a:solidFill>
+                </a:rPr>
+                <a:t>y</a:t>
+              </a:r>
+              <a:endParaRPr lang="en-CA" b="1" i="1" dirty="0">
+                <a:solidFill>
+                  <a:schemeClr val="accent6">
+                    <a:lumMod val="75000"/>
+                  </a:schemeClr>
+                </a:solidFill>
+              </a:endParaRPr>
+            </a:p>
+          </p:txBody>
+        </p:sp>
+        <p:sp>
+          <p:nvSpPr>
+            <p:cNvPr id="55" name="TextBox 54">
+              <a:extLst>
+                <a:ext uri="{FF2B5EF4-FFF2-40B4-BE49-F238E27FC236}">
+                  <a16:creationId xmlns:a16="http://schemas.microsoft.com/office/drawing/2014/main" id="{6B59B42A-0CC2-4FFF-B452-1325779E4544}"/>
+                </a:ext>
+              </a:extLst>
+            </p:cNvPr>
+            <p:cNvSpPr txBox="1"/>
+            <p:nvPr/>
+          </p:nvSpPr>
+          <p:spPr>
+            <a:xfrm>
+              <a:off x="2543308" y="4497900"/>
+              <a:ext cx="892184" cy="369332"/>
+            </a:xfrm>
+            <a:prstGeom prst="rect">
+              <a:avLst/>
+            </a:prstGeom>
+            <a:noFill/>
+          </p:spPr>
+          <p:txBody>
+            <a:bodyPr wrap="square" rtlCol="0">
+              <a:spAutoFit/>
+            </a:bodyPr>
+            <a:lstStyle/>
+            <a:p>
+              <a:r>
+                <a:rPr lang="en-US" b="1" i="1" dirty="0">
+                  <a:solidFill>
+                    <a:schemeClr val="accent6">
+                      <a:lumMod val="75000"/>
+                    </a:schemeClr>
+                  </a:solidFill>
+                </a:rPr>
+                <a:t>z</a:t>
+              </a:r>
+              <a:endParaRPr lang="en-CA" b="1" i="1" dirty="0">
+                <a:solidFill>
+                  <a:schemeClr val="accent6">
+                    <a:lumMod val="75000"/>
+                  </a:schemeClr>
+                </a:solidFill>
+              </a:endParaRPr>
+            </a:p>
+          </p:txBody>
+        </p:sp>
+      </p:grpSp>
     </p:spTree>
     <p:extLst>
       <p:ext uri="{BB962C8B-B14F-4D97-AF65-F5344CB8AC3E}">
@@ -5702,6 +6014,336 @@
           </a:prstGeom>
         </p:spPr>
       </p:pic>
+      <p:cxnSp>
+        <p:nvCxnSpPr>
+          <p:cNvPr id="5" name="Straight Arrow Connector 4">
+            <a:extLst>
+              <a:ext uri="{FF2B5EF4-FFF2-40B4-BE49-F238E27FC236}">
+                <a16:creationId xmlns:a16="http://schemas.microsoft.com/office/drawing/2014/main" id="{2BF80858-B0B5-43F1-810D-74D41CDE740F}"/>
+              </a:ext>
+            </a:extLst>
+          </p:cNvPr>
+          <p:cNvCxnSpPr>
+            <a:cxnSpLocks/>
+          </p:cNvCxnSpPr>
+          <p:nvPr/>
+        </p:nvCxnSpPr>
+        <p:spPr>
+          <a:xfrm flipV="1">
+            <a:off x="2603798" y="4654545"/>
+            <a:ext cx="11050" cy="706542"/>
+          </a:xfrm>
+          <a:prstGeom prst="straightConnector1">
+            <a:avLst/>
+          </a:prstGeom>
+          <a:ln w="57150">
+            <a:solidFill>
+              <a:schemeClr val="accent6">
+                <a:lumMod val="75000"/>
+              </a:schemeClr>
+            </a:solidFill>
+            <a:tailEnd type="triangle"/>
+          </a:ln>
+        </p:spPr>
+        <p:style>
+          <a:lnRef idx="1">
+            <a:schemeClr val="accent1"/>
+          </a:lnRef>
+          <a:fillRef idx="0">
+            <a:schemeClr val="accent1"/>
+          </a:fillRef>
+          <a:effectRef idx="0">
+            <a:schemeClr val="accent1"/>
+          </a:effectRef>
+          <a:fontRef idx="minor">
+            <a:schemeClr val="tx1"/>
+          </a:fontRef>
+        </p:style>
+      </p:cxnSp>
+      <p:cxnSp>
+        <p:nvCxnSpPr>
+          <p:cNvPr id="6" name="Straight Arrow Connector 5">
+            <a:extLst>
+              <a:ext uri="{FF2B5EF4-FFF2-40B4-BE49-F238E27FC236}">
+                <a16:creationId xmlns:a16="http://schemas.microsoft.com/office/drawing/2014/main" id="{E5F1016B-F8E5-4633-A114-37383DB9B03F}"/>
+              </a:ext>
+            </a:extLst>
+          </p:cNvPr>
+          <p:cNvCxnSpPr>
+            <a:cxnSpLocks/>
+          </p:cNvCxnSpPr>
+          <p:nvPr/>
+        </p:nvCxnSpPr>
+        <p:spPr>
+          <a:xfrm>
+            <a:off x="2580415" y="5375102"/>
+            <a:ext cx="795302" cy="0"/>
+          </a:xfrm>
+          <a:prstGeom prst="straightConnector1">
+            <a:avLst/>
+          </a:prstGeom>
+          <a:ln w="57150">
+            <a:solidFill>
+              <a:schemeClr val="accent6">
+                <a:lumMod val="75000"/>
+              </a:schemeClr>
+            </a:solidFill>
+            <a:tailEnd type="triangle"/>
+          </a:ln>
+        </p:spPr>
+        <p:style>
+          <a:lnRef idx="1">
+            <a:schemeClr val="accent1"/>
+          </a:lnRef>
+          <a:fillRef idx="0">
+            <a:schemeClr val="accent1"/>
+          </a:fillRef>
+          <a:effectRef idx="0">
+            <a:schemeClr val="accent1"/>
+          </a:effectRef>
+          <a:fontRef idx="minor">
+            <a:schemeClr val="tx1"/>
+          </a:fontRef>
+        </p:style>
+      </p:cxnSp>
+      <p:cxnSp>
+        <p:nvCxnSpPr>
+          <p:cNvPr id="7" name="Straight Arrow Connector 6">
+            <a:extLst>
+              <a:ext uri="{FF2B5EF4-FFF2-40B4-BE49-F238E27FC236}">
+                <a16:creationId xmlns:a16="http://schemas.microsoft.com/office/drawing/2014/main" id="{328E6B06-8935-47F4-98E0-065853C77A65}"/>
+              </a:ext>
+            </a:extLst>
+          </p:cNvPr>
+          <p:cNvCxnSpPr>
+            <a:cxnSpLocks/>
+          </p:cNvCxnSpPr>
+          <p:nvPr/>
+        </p:nvCxnSpPr>
+        <p:spPr>
+          <a:xfrm flipH="1">
+            <a:off x="2134323" y="5375102"/>
+            <a:ext cx="480526" cy="588685"/>
+          </a:xfrm>
+          <a:prstGeom prst="straightConnector1">
+            <a:avLst/>
+          </a:prstGeom>
+          <a:ln w="57150">
+            <a:solidFill>
+              <a:schemeClr val="accent6">
+                <a:lumMod val="75000"/>
+              </a:schemeClr>
+            </a:solidFill>
+            <a:tailEnd type="triangle"/>
+          </a:ln>
+        </p:spPr>
+        <p:style>
+          <a:lnRef idx="1">
+            <a:schemeClr val="accent1"/>
+          </a:lnRef>
+          <a:fillRef idx="0">
+            <a:schemeClr val="accent1"/>
+          </a:fillRef>
+          <a:effectRef idx="0">
+            <a:schemeClr val="accent1"/>
+          </a:effectRef>
+          <a:fontRef idx="minor">
+            <a:schemeClr val="tx1"/>
+          </a:fontRef>
+        </p:style>
+      </p:cxnSp>
+      <p:sp>
+        <p:nvSpPr>
+          <p:cNvPr id="8" name="TextBox 7">
+            <a:extLst>
+              <a:ext uri="{FF2B5EF4-FFF2-40B4-BE49-F238E27FC236}">
+                <a16:creationId xmlns:a16="http://schemas.microsoft.com/office/drawing/2014/main" id="{89D4E1FF-1905-419F-84FD-2654202235B0}"/>
+              </a:ext>
+            </a:extLst>
+          </p:cNvPr>
+          <p:cNvSpPr txBox="1"/>
+          <p:nvPr/>
+        </p:nvSpPr>
+        <p:spPr>
+          <a:xfrm>
+            <a:off x="2362323" y="5497380"/>
+            <a:ext cx="892184" cy="369332"/>
+          </a:xfrm>
+          <a:prstGeom prst="rect">
+            <a:avLst/>
+          </a:prstGeom>
+          <a:noFill/>
+        </p:spPr>
+        <p:txBody>
+          <a:bodyPr wrap="square" rtlCol="0">
+            <a:spAutoFit/>
+          </a:bodyPr>
+          <a:lstStyle/>
+          <a:p>
+            <a:r>
+              <a:rPr lang="en-US" b="1" i="1" dirty="0">
+                <a:solidFill>
+                  <a:schemeClr val="accent6">
+                    <a:lumMod val="75000"/>
+                  </a:schemeClr>
+                </a:solidFill>
+              </a:rPr>
+              <a:t>Fibula</a:t>
+            </a:r>
+            <a:endParaRPr lang="en-CA" b="1" i="1" dirty="0">
+              <a:solidFill>
+                <a:schemeClr val="accent6">
+                  <a:lumMod val="75000"/>
+                </a:schemeClr>
+              </a:solidFill>
+            </a:endParaRPr>
+          </a:p>
+        </p:txBody>
+      </p:sp>
+      <p:sp>
+        <p:nvSpPr>
+          <p:cNvPr id="9" name="TextBox 8">
+            <a:extLst>
+              <a:ext uri="{FF2B5EF4-FFF2-40B4-BE49-F238E27FC236}">
+                <a16:creationId xmlns:a16="http://schemas.microsoft.com/office/drawing/2014/main" id="{5ED54DD2-8B22-4BEC-BE32-A5D48A03E50B}"/>
+              </a:ext>
+            </a:extLst>
+          </p:cNvPr>
+          <p:cNvSpPr txBox="1"/>
+          <p:nvPr/>
+        </p:nvSpPr>
+        <p:spPr>
+          <a:xfrm>
+            <a:off x="3140507" y="4964733"/>
+            <a:ext cx="892184" cy="369332"/>
+          </a:xfrm>
+          <a:prstGeom prst="rect">
+            <a:avLst/>
+          </a:prstGeom>
+          <a:noFill/>
+        </p:spPr>
+        <p:txBody>
+          <a:bodyPr wrap="square" rtlCol="0">
+            <a:spAutoFit/>
+          </a:bodyPr>
+          <a:lstStyle/>
+          <a:p>
+            <a:r>
+              <a:rPr lang="en-US" b="1" i="1" dirty="0">
+                <a:solidFill>
+                  <a:schemeClr val="accent6">
+                    <a:lumMod val="75000"/>
+                  </a:schemeClr>
+                </a:solidFill>
+              </a:rPr>
+              <a:t>x</a:t>
+            </a:r>
+            <a:endParaRPr lang="en-CA" b="1" i="1" dirty="0">
+              <a:solidFill>
+                <a:schemeClr val="accent6">
+                  <a:lumMod val="75000"/>
+                </a:schemeClr>
+              </a:solidFill>
+            </a:endParaRPr>
+          </a:p>
+        </p:txBody>
+      </p:sp>
+      <p:sp>
+        <p:nvSpPr>
+          <p:cNvPr id="10" name="TextBox 9">
+            <a:extLst>
+              <a:ext uri="{FF2B5EF4-FFF2-40B4-BE49-F238E27FC236}">
+                <a16:creationId xmlns:a16="http://schemas.microsoft.com/office/drawing/2014/main" id="{B967C052-BC97-4706-B318-230369DB1023}"/>
+              </a:ext>
+            </a:extLst>
+          </p:cNvPr>
+          <p:cNvSpPr txBox="1"/>
+          <p:nvPr/>
+        </p:nvSpPr>
+        <p:spPr>
+          <a:xfrm>
+            <a:off x="2309528" y="4469879"/>
+            <a:ext cx="892184" cy="369332"/>
+          </a:xfrm>
+          <a:prstGeom prst="rect">
+            <a:avLst/>
+          </a:prstGeom>
+          <a:noFill/>
+        </p:spPr>
+        <p:txBody>
+          <a:bodyPr wrap="square" rtlCol="0">
+            <a:spAutoFit/>
+          </a:bodyPr>
+          <a:lstStyle/>
+          <a:p>
+            <a:r>
+              <a:rPr lang="en-US" b="1" i="1" dirty="0">
+                <a:solidFill>
+                  <a:schemeClr val="accent6">
+                    <a:lumMod val="75000"/>
+                  </a:schemeClr>
+                </a:solidFill>
+              </a:rPr>
+              <a:t>y</a:t>
+            </a:r>
+            <a:endParaRPr lang="en-CA" b="1" i="1" dirty="0">
+              <a:solidFill>
+                <a:schemeClr val="accent6">
+                  <a:lumMod val="75000"/>
+                </a:schemeClr>
+              </a:solidFill>
+            </a:endParaRPr>
+          </a:p>
+        </p:txBody>
+      </p:sp>
+      <p:sp>
+        <p:nvSpPr>
+          <p:cNvPr id="11" name="TextBox 10">
+            <a:extLst>
+              <a:ext uri="{FF2B5EF4-FFF2-40B4-BE49-F238E27FC236}">
+                <a16:creationId xmlns:a16="http://schemas.microsoft.com/office/drawing/2014/main" id="{2928FB2F-3B8B-4CBE-8A99-A3DF8CD84CA3}"/>
+              </a:ext>
+            </a:extLst>
+          </p:cNvPr>
+          <p:cNvSpPr txBox="1"/>
+          <p:nvPr/>
+        </p:nvSpPr>
+        <p:spPr>
+          <a:xfrm>
+            <a:off x="2248323" y="5696062"/>
+            <a:ext cx="892184" cy="369332"/>
+          </a:xfrm>
+          <a:prstGeom prst="rect">
+            <a:avLst/>
+          </a:prstGeom>
+          <a:noFill/>
+        </p:spPr>
+        <p:txBody>
+          <a:bodyPr wrap="square" rtlCol="0">
+            <a:spAutoFit/>
+          </a:bodyPr>
+          <a:lstStyle/>
+          <a:p>
+            <a:r>
+              <a:rPr lang="en-US" b="1" i="1" dirty="0">
+                <a:solidFill>
+                  <a:schemeClr val="accent6">
+                    <a:lumMod val="75000"/>
+                  </a:schemeClr>
+                </a:solidFill>
+              </a:rPr>
+              <a:t>z</a:t>
+            </a:r>
+            <a:endParaRPr lang="en-CA" b="1" i="1" dirty="0">
+              <a:solidFill>
+                <a:schemeClr val="accent6">
+                  <a:lumMod val="75000"/>
+                </a:schemeClr>
+              </a:solidFill>
+            </a:endParaRPr>
+          </a:p>
+        </p:txBody>
+      </p:sp>
     </p:spTree>
     <p:extLst>
       <p:ext uri="{BB962C8B-B14F-4D97-AF65-F5344CB8AC3E}">

</xml_diff>

<commit_message>
update documentation with names of variables from the code, delete test script
</commit_message>
<xml_diff>
--- a/Docs/Design.pptx
+++ b/Docs/Design.pptx
@@ -267,7 +267,7 @@
           <a:p>
             <a:fld id="{D70168D3-9BA9-4B67-B593-8F465BBDFFE3}" type="datetimeFigureOut">
               <a:rPr lang="en-CA" smtClean="0"/>
-              <a:t>2020-12-29</a:t>
+              <a:t>2021-01-30</a:t>
             </a:fld>
             <a:endParaRPr lang="en-CA"/>
           </a:p>
@@ -467,7 +467,7 @@
           <a:p>
             <a:fld id="{D70168D3-9BA9-4B67-B593-8F465BBDFFE3}" type="datetimeFigureOut">
               <a:rPr lang="en-CA" smtClean="0"/>
-              <a:t>2020-12-29</a:t>
+              <a:t>2021-01-30</a:t>
             </a:fld>
             <a:endParaRPr lang="en-CA"/>
           </a:p>
@@ -677,7 +677,7 @@
           <a:p>
             <a:fld id="{D70168D3-9BA9-4B67-B593-8F465BBDFFE3}" type="datetimeFigureOut">
               <a:rPr lang="en-CA" smtClean="0"/>
-              <a:t>2020-12-29</a:t>
+              <a:t>2021-01-30</a:t>
             </a:fld>
             <a:endParaRPr lang="en-CA"/>
           </a:p>
@@ -877,7 +877,7 @@
           <a:p>
             <a:fld id="{D70168D3-9BA9-4B67-B593-8F465BBDFFE3}" type="datetimeFigureOut">
               <a:rPr lang="en-CA" smtClean="0"/>
-              <a:t>2020-12-29</a:t>
+              <a:t>2021-01-30</a:t>
             </a:fld>
             <a:endParaRPr lang="en-CA"/>
           </a:p>
@@ -1153,7 +1153,7 @@
           <a:p>
             <a:fld id="{D70168D3-9BA9-4B67-B593-8F465BBDFFE3}" type="datetimeFigureOut">
               <a:rPr lang="en-CA" smtClean="0"/>
-              <a:t>2020-12-29</a:t>
+              <a:t>2021-01-30</a:t>
             </a:fld>
             <a:endParaRPr lang="en-CA"/>
           </a:p>
@@ -1421,7 +1421,7 @@
           <a:p>
             <a:fld id="{D70168D3-9BA9-4B67-B593-8F465BBDFFE3}" type="datetimeFigureOut">
               <a:rPr lang="en-CA" smtClean="0"/>
-              <a:t>2020-12-29</a:t>
+              <a:t>2021-01-30</a:t>
             </a:fld>
             <a:endParaRPr lang="en-CA"/>
           </a:p>
@@ -1836,7 +1836,7 @@
           <a:p>
             <a:fld id="{D70168D3-9BA9-4B67-B593-8F465BBDFFE3}" type="datetimeFigureOut">
               <a:rPr lang="en-CA" smtClean="0"/>
-              <a:t>2020-12-29</a:t>
+              <a:t>2021-01-30</a:t>
             </a:fld>
             <a:endParaRPr lang="en-CA"/>
           </a:p>
@@ -1978,7 +1978,7 @@
           <a:p>
             <a:fld id="{D70168D3-9BA9-4B67-B593-8F465BBDFFE3}" type="datetimeFigureOut">
               <a:rPr lang="en-CA" smtClean="0"/>
-              <a:t>2020-12-29</a:t>
+              <a:t>2021-01-30</a:t>
             </a:fld>
             <a:endParaRPr lang="en-CA"/>
           </a:p>
@@ -2091,7 +2091,7 @@
           <a:p>
             <a:fld id="{D70168D3-9BA9-4B67-B593-8F465BBDFFE3}" type="datetimeFigureOut">
               <a:rPr lang="en-CA" smtClean="0"/>
-              <a:t>2020-12-29</a:t>
+              <a:t>2021-01-30</a:t>
             </a:fld>
             <a:endParaRPr lang="en-CA"/>
           </a:p>
@@ -2404,7 +2404,7 @@
           <a:p>
             <a:fld id="{D70168D3-9BA9-4B67-B593-8F465BBDFFE3}" type="datetimeFigureOut">
               <a:rPr lang="en-CA" smtClean="0"/>
-              <a:t>2020-12-29</a:t>
+              <a:t>2021-01-30</a:t>
             </a:fld>
             <a:endParaRPr lang="en-CA"/>
           </a:p>
@@ -2693,7 +2693,7 @@
           <a:p>
             <a:fld id="{D70168D3-9BA9-4B67-B593-8F465BBDFFE3}" type="datetimeFigureOut">
               <a:rPr lang="en-CA" smtClean="0"/>
-              <a:t>2020-12-29</a:t>
+              <a:t>2021-01-30</a:t>
             </a:fld>
             <a:endParaRPr lang="en-CA"/>
           </a:p>
@@ -2936,7 +2936,7 @@
           <a:p>
             <a:fld id="{D70168D3-9BA9-4B67-B593-8F465BBDFFE3}" type="datetimeFigureOut">
               <a:rPr lang="en-CA" smtClean="0"/>
-              <a:t>2020-12-29</a:t>
+              <a:t>2021-01-30</a:t>
             </a:fld>
             <a:endParaRPr lang="en-CA"/>
           </a:p>
@@ -5764,14 +5764,14 @@
             <a:lstStyle/>
             <a:p>
               <a:r>
-                <a:rPr lang="en-US" b="1" i="1" dirty="0">
+                <a:rPr lang="es-MX" b="1" i="1" dirty="0">
                   <a:solidFill>
                     <a:schemeClr val="accent6">
                       <a:lumMod val="75000"/>
                     </a:schemeClr>
                   </a:solidFill>
                 </a:rPr>
-                <a:t>x</a:t>
+                <a:t>z</a:t>
               </a:r>
               <a:endParaRPr lang="en-CA" b="1" i="1" dirty="0">
                 <a:solidFill>
@@ -5812,14 +5812,14 @@
             <a:lstStyle/>
             <a:p>
               <a:r>
-                <a:rPr lang="en-US" b="1" i="1" dirty="0">
+                <a:rPr lang="es-MX" b="1" i="1" dirty="0">
                   <a:solidFill>
                     <a:schemeClr val="accent6">
                       <a:lumMod val="75000"/>
                     </a:schemeClr>
                   </a:solidFill>
                 </a:rPr>
-                <a:t>y</a:t>
+                <a:t>x</a:t>
               </a:r>
               <a:endParaRPr lang="en-CA" b="1" i="1" dirty="0">
                 <a:solidFill>
@@ -5860,14 +5860,14 @@
             <a:lstStyle/>
             <a:p>
               <a:r>
-                <a:rPr lang="en-US" b="1" i="1" dirty="0">
+                <a:rPr lang="es-MX" b="1" i="1" dirty="0">
                   <a:solidFill>
                     <a:schemeClr val="accent6">
                       <a:lumMod val="75000"/>
                     </a:schemeClr>
                   </a:solidFill>
                 </a:rPr>
-                <a:t>z</a:t>
+                <a:t>y</a:t>
               </a:r>
               <a:endParaRPr lang="en-CA" b="1" i="1" dirty="0">
                 <a:solidFill>
@@ -9379,49 +9379,6 @@
           </a:p>
         </p:txBody>
       </p:sp>
-      <p:cxnSp>
-        <p:nvCxnSpPr>
-          <p:cNvPr id="13" name="Straight Connector 12">
-            <a:extLst>
-              <a:ext uri="{FF2B5EF4-FFF2-40B4-BE49-F238E27FC236}">
-                <a16:creationId xmlns:a16="http://schemas.microsoft.com/office/drawing/2014/main" id="{9E27C5C2-F1E7-480D-ACC7-E1D51A163710}"/>
-              </a:ext>
-            </a:extLst>
-          </p:cNvPr>
-          <p:cNvCxnSpPr>
-            <a:cxnSpLocks/>
-          </p:cNvCxnSpPr>
-          <p:nvPr/>
-        </p:nvCxnSpPr>
-        <p:spPr>
-          <a:xfrm>
-            <a:off x="2793653" y="2009411"/>
-            <a:ext cx="1202752" cy="784091"/>
-          </a:xfrm>
-          <a:prstGeom prst="line">
-            <a:avLst/>
-          </a:prstGeom>
-          <a:ln w="57150">
-            <a:solidFill>
-              <a:srgbClr val="FF0000"/>
-            </a:solidFill>
-          </a:ln>
-        </p:spPr>
-        <p:style>
-          <a:lnRef idx="1">
-            <a:schemeClr val="accent1"/>
-          </a:lnRef>
-          <a:fillRef idx="0">
-            <a:schemeClr val="accent1"/>
-          </a:fillRef>
-          <a:effectRef idx="0">
-            <a:schemeClr val="accent1"/>
-          </a:effectRef>
-          <a:fontRef idx="minor">
-            <a:schemeClr val="tx1"/>
-          </a:fontRef>
-        </p:style>
-      </p:cxnSp>
       <p:sp>
         <p:nvSpPr>
           <p:cNvPr id="16" name="TextBox 15">
@@ -9569,66 +9526,21 @@
           </a:p>
         </p:txBody>
       </p:sp>
-      <p:cxnSp>
-        <p:nvCxnSpPr>
-          <p:cNvPr id="20" name="Straight Connector 19">
-            <a:extLst>
-              <a:ext uri="{FF2B5EF4-FFF2-40B4-BE49-F238E27FC236}">
-                <a16:creationId xmlns:a16="http://schemas.microsoft.com/office/drawing/2014/main" id="{F8D53E9D-162B-4EF1-BC25-707856FDAD9E}"/>
-              </a:ext>
-            </a:extLst>
-          </p:cNvPr>
-          <p:cNvCxnSpPr>
-            <a:cxnSpLocks/>
-          </p:cNvCxnSpPr>
-          <p:nvPr/>
-        </p:nvCxnSpPr>
+      <p:sp>
+        <p:nvSpPr>
+          <p:cNvPr id="23" name="TextBox 22">
+            <a:extLst>
+              <a:ext uri="{FF2B5EF4-FFF2-40B4-BE49-F238E27FC236}">
+                <a16:creationId xmlns:a16="http://schemas.microsoft.com/office/drawing/2014/main" id="{CE2B0556-1863-4227-94C4-E6D3C4CF538A}"/>
+              </a:ext>
+            </a:extLst>
+          </p:cNvPr>
+          <p:cNvSpPr txBox="1"/>
+          <p:nvPr/>
+        </p:nvSpPr>
         <p:spPr>
           <a:xfrm>
-            <a:off x="3996405" y="2793502"/>
-            <a:ext cx="1532186" cy="7825"/>
-          </a:xfrm>
-          <a:prstGeom prst="line">
-            <a:avLst/>
-          </a:prstGeom>
-          <a:ln w="57150">
-            <a:solidFill>
-              <a:schemeClr val="accent5">
-                <a:lumMod val="75000"/>
-              </a:schemeClr>
-            </a:solidFill>
-          </a:ln>
-        </p:spPr>
-        <p:style>
-          <a:lnRef idx="1">
-            <a:schemeClr val="accent1"/>
-          </a:lnRef>
-          <a:fillRef idx="0">
-            <a:schemeClr val="accent1"/>
-          </a:fillRef>
-          <a:effectRef idx="0">
-            <a:schemeClr val="accent1"/>
-          </a:effectRef>
-          <a:fontRef idx="minor">
-            <a:schemeClr val="tx1"/>
-          </a:fontRef>
-        </p:style>
-      </p:cxnSp>
-      <p:sp>
-        <p:nvSpPr>
-          <p:cNvPr id="23" name="TextBox 22">
-            <a:extLst>
-              <a:ext uri="{FF2B5EF4-FFF2-40B4-BE49-F238E27FC236}">
-                <a16:creationId xmlns:a16="http://schemas.microsoft.com/office/drawing/2014/main" id="{CE2B0556-1863-4227-94C4-E6D3C4CF538A}"/>
-              </a:ext>
-            </a:extLst>
-          </p:cNvPr>
-          <p:cNvSpPr txBox="1"/>
-          <p:nvPr/>
-        </p:nvSpPr>
-        <p:spPr>
-          <a:xfrm>
-            <a:off x="4429961" y="2391018"/>
+            <a:off x="4467535" y="2428981"/>
             <a:ext cx="736417" cy="369332"/>
           </a:xfrm>
           <a:prstGeom prst="rect">
@@ -9645,7 +9557,9 @@
             <a:r>
               <a:rPr lang="en-US" sz="900" b="1" dirty="0">
                 <a:solidFill>
-                  <a:srgbClr val="FF0000"/>
+                  <a:schemeClr val="accent1">
+                    <a:lumMod val="75000"/>
+                  </a:schemeClr>
                 </a:solidFill>
               </a:rPr>
               <a:t>Mandible Line </a:t>
@@ -9653,14 +9567,18 @@
             <a:r>
               <a:rPr lang="en-US" sz="900" b="1" dirty="0" smtClean="0">
                 <a:solidFill>
-                  <a:srgbClr val="FF0000"/>
+                  <a:schemeClr val="accent1">
+                    <a:lumMod val="75000"/>
+                  </a:schemeClr>
                 </a:solidFill>
               </a:rPr>
               <a:t>1</a:t>
             </a:r>
             <a:endParaRPr lang="en-CA" sz="900" b="1" dirty="0">
               <a:solidFill>
-                <a:srgbClr val="FF0000"/>
+                <a:schemeClr val="accent1">
+                  <a:lumMod val="75000"/>
+                </a:schemeClr>
               </a:solidFill>
             </a:endParaRPr>
           </a:p>
@@ -10242,49 +10160,6 @@
           </a:p>
         </p:txBody>
       </p:sp>
-      <p:cxnSp>
-        <p:nvCxnSpPr>
-          <p:cNvPr id="54" name="Straight Connector 53">
-            <a:extLst>
-              <a:ext uri="{FF2B5EF4-FFF2-40B4-BE49-F238E27FC236}">
-                <a16:creationId xmlns:a16="http://schemas.microsoft.com/office/drawing/2014/main" id="{B05DEC03-0522-421C-8FEA-33C78AEB367C}"/>
-              </a:ext>
-            </a:extLst>
-          </p:cNvPr>
-          <p:cNvCxnSpPr>
-            <a:cxnSpLocks/>
-          </p:cNvCxnSpPr>
-          <p:nvPr/>
-        </p:nvCxnSpPr>
-        <p:spPr>
-          <a:xfrm>
-            <a:off x="2338692" y="5412172"/>
-            <a:ext cx="1162312" cy="0"/>
-          </a:xfrm>
-          <a:prstGeom prst="line">
-            <a:avLst/>
-          </a:prstGeom>
-          <a:ln w="57150">
-            <a:solidFill>
-              <a:srgbClr val="FF0000"/>
-            </a:solidFill>
-          </a:ln>
-        </p:spPr>
-        <p:style>
-          <a:lnRef idx="1">
-            <a:schemeClr val="accent1"/>
-          </a:lnRef>
-          <a:fillRef idx="0">
-            <a:schemeClr val="accent1"/>
-          </a:fillRef>
-          <a:effectRef idx="0">
-            <a:schemeClr val="accent1"/>
-          </a:effectRef>
-          <a:fontRef idx="minor">
-            <a:schemeClr val="tx1"/>
-          </a:fontRef>
-        </p:style>
-      </p:cxnSp>
       <p:sp>
         <p:nvSpPr>
           <p:cNvPr id="55" name="TextBox 54">
@@ -10440,51 +10315,6 @@
           </a:p>
         </p:txBody>
       </p:sp>
-      <p:cxnSp>
-        <p:nvCxnSpPr>
-          <p:cNvPr id="58" name="Straight Connector 57">
-            <a:extLst>
-              <a:ext uri="{FF2B5EF4-FFF2-40B4-BE49-F238E27FC236}">
-                <a16:creationId xmlns:a16="http://schemas.microsoft.com/office/drawing/2014/main" id="{ADDA1DA4-849B-492B-8C45-249BEBAA3369}"/>
-              </a:ext>
-            </a:extLst>
-          </p:cNvPr>
-          <p:cNvCxnSpPr>
-            <a:cxnSpLocks/>
-          </p:cNvCxnSpPr>
-          <p:nvPr/>
-        </p:nvCxnSpPr>
-        <p:spPr>
-          <a:xfrm>
-            <a:off x="3610556" y="5391049"/>
-            <a:ext cx="1532186" cy="7825"/>
-          </a:xfrm>
-          <a:prstGeom prst="line">
-            <a:avLst/>
-          </a:prstGeom>
-          <a:ln w="57150">
-            <a:solidFill>
-              <a:schemeClr val="accent5">
-                <a:lumMod val="75000"/>
-              </a:schemeClr>
-            </a:solidFill>
-          </a:ln>
-        </p:spPr>
-        <p:style>
-          <a:lnRef idx="1">
-            <a:schemeClr val="accent1"/>
-          </a:lnRef>
-          <a:fillRef idx="0">
-            <a:schemeClr val="accent1"/>
-          </a:fillRef>
-          <a:effectRef idx="0">
-            <a:schemeClr val="accent1"/>
-          </a:effectRef>
-          <a:fontRef idx="minor">
-            <a:schemeClr val="tx1"/>
-          </a:fontRef>
-        </p:style>
-      </p:cxnSp>
       <p:sp>
         <p:nvSpPr>
           <p:cNvPr id="59" name="TextBox 58">
@@ -11177,870 +11007,16 @@
           </a:p>
         </p:txBody>
       </p:sp>
-      <p:cxnSp>
-        <p:nvCxnSpPr>
-          <p:cNvPr id="48" name="Straight Connector 12">
-            <a:extLst>
-              <a:ext uri="{FF2B5EF4-FFF2-40B4-BE49-F238E27FC236}">
-                <a16:creationId xmlns:a16="http://schemas.microsoft.com/office/drawing/2014/main" id="{9E27C5C2-F1E7-480D-ACC7-E1D51A163710}"/>
-              </a:ext>
-            </a:extLst>
-          </p:cNvPr>
-          <p:cNvCxnSpPr>
-            <a:cxnSpLocks/>
-          </p:cNvCxnSpPr>
-          <p:nvPr/>
-        </p:nvCxnSpPr>
+      <p:sp>
+        <p:nvSpPr>
+          <p:cNvPr id="85" name="Rectángulo 84"/>
+          <p:cNvSpPr/>
+          <p:nvPr/>
+        </p:nvSpPr>
         <p:spPr>
           <a:xfrm>
-            <a:off x="8428331" y="1178183"/>
-            <a:ext cx="1202752" cy="784091"/>
-          </a:xfrm>
-          <a:prstGeom prst="line">
-            <a:avLst/>
-          </a:prstGeom>
-          <a:ln w="57150">
-            <a:solidFill>
-              <a:srgbClr val="FF0000"/>
-            </a:solidFill>
-          </a:ln>
-        </p:spPr>
-        <p:style>
-          <a:lnRef idx="1">
-            <a:schemeClr val="accent1"/>
-          </a:lnRef>
-          <a:fillRef idx="0">
-            <a:schemeClr val="accent1"/>
-          </a:fillRef>
-          <a:effectRef idx="0">
-            <a:schemeClr val="accent1"/>
-          </a:effectRef>
-          <a:fontRef idx="minor">
-            <a:schemeClr val="tx1"/>
-          </a:fontRef>
-        </p:style>
-      </p:cxnSp>
-      <p:cxnSp>
-        <p:nvCxnSpPr>
-          <p:cNvPr id="49" name="Straight Connector 53">
-            <a:extLst>
-              <a:ext uri="{FF2B5EF4-FFF2-40B4-BE49-F238E27FC236}">
-                <a16:creationId xmlns:a16="http://schemas.microsoft.com/office/drawing/2014/main" id="{B05DEC03-0522-421C-8FEA-33C78AEB367C}"/>
-              </a:ext>
-            </a:extLst>
-          </p:cNvPr>
-          <p:cNvCxnSpPr>
-            <a:cxnSpLocks/>
-          </p:cNvCxnSpPr>
-          <p:nvPr/>
-        </p:nvCxnSpPr>
-        <p:spPr>
-          <a:xfrm>
-            <a:off x="8428331" y="1178183"/>
-            <a:ext cx="1162312" cy="0"/>
-          </a:xfrm>
-          <a:prstGeom prst="line">
-            <a:avLst/>
-          </a:prstGeom>
-          <a:ln w="57150">
-            <a:solidFill>
-              <a:srgbClr val="FF0000"/>
-            </a:solidFill>
-          </a:ln>
-        </p:spPr>
-        <p:style>
-          <a:lnRef idx="1">
-            <a:schemeClr val="accent1"/>
-          </a:lnRef>
-          <a:fillRef idx="0">
-            <a:schemeClr val="accent1"/>
-          </a:fillRef>
-          <a:effectRef idx="0">
-            <a:schemeClr val="accent1"/>
-          </a:effectRef>
-          <a:fontRef idx="minor">
-            <a:schemeClr val="tx1"/>
-          </a:fontRef>
-        </p:style>
-      </p:cxnSp>
-      <p:sp>
-        <p:nvSpPr>
-          <p:cNvPr id="68" name="TextBox 54">
-            <a:extLst>
-              <a:ext uri="{FF2B5EF4-FFF2-40B4-BE49-F238E27FC236}">
-                <a16:creationId xmlns:a16="http://schemas.microsoft.com/office/drawing/2014/main" id="{3AF7731B-7E2C-4544-A4D6-CE928DE01681}"/>
-              </a:ext>
-            </a:extLst>
-          </p:cNvPr>
-          <p:cNvSpPr txBox="1"/>
-          <p:nvPr/>
-        </p:nvSpPr>
-        <p:spPr>
-          <a:xfrm>
-            <a:off x="10829000" y="767330"/>
-            <a:ext cx="736417" cy="369332"/>
-          </a:xfrm>
-          <a:prstGeom prst="rect">
-            <a:avLst/>
-          </a:prstGeom>
-          <a:noFill/>
-        </p:spPr>
-        <p:txBody>
-          <a:bodyPr wrap="square" rtlCol="0">
-            <a:spAutoFit/>
-          </a:bodyPr>
-          <a:lstStyle/>
-          <a:p>
-            <a:r>
-              <a:rPr lang="en-US" sz="900" b="1" dirty="0">
-                <a:solidFill>
-                  <a:srgbClr val="FF0000"/>
-                </a:solidFill>
-              </a:rPr>
-              <a:t>Bone segment </a:t>
-            </a:r>
-            <a:r>
-              <a:rPr lang="en-US" sz="900" b="1" dirty="0" smtClean="0">
-                <a:solidFill>
-                  <a:srgbClr val="FF0000"/>
-                </a:solidFill>
-              </a:rPr>
-              <a:t>0</a:t>
-            </a:r>
-            <a:endParaRPr lang="en-CA" sz="900" b="1" dirty="0">
-              <a:solidFill>
-                <a:srgbClr val="FF0000"/>
-              </a:solidFill>
-            </a:endParaRPr>
-          </a:p>
-        </p:txBody>
-      </p:sp>
-      <p:sp>
-        <p:nvSpPr>
-          <p:cNvPr id="69" name="TextBox 15">
-            <a:extLst>
-              <a:ext uri="{FF2B5EF4-FFF2-40B4-BE49-F238E27FC236}">
-                <a16:creationId xmlns:a16="http://schemas.microsoft.com/office/drawing/2014/main" id="{B7F75750-FCD3-40D6-8032-B7D7565A8076}"/>
-              </a:ext>
-            </a:extLst>
-          </p:cNvPr>
-          <p:cNvSpPr txBox="1"/>
-          <p:nvPr/>
-        </p:nvSpPr>
-        <p:spPr>
-          <a:xfrm>
-            <a:off x="8661498" y="1657150"/>
-            <a:ext cx="736417" cy="369332"/>
-          </a:xfrm>
-          <a:prstGeom prst="rect">
-            <a:avLst/>
-          </a:prstGeom>
-          <a:noFill/>
-        </p:spPr>
-        <p:txBody>
-          <a:bodyPr wrap="square" rtlCol="0">
-            <a:spAutoFit/>
-          </a:bodyPr>
-          <a:lstStyle/>
-          <a:p>
-            <a:r>
-              <a:rPr lang="en-US" sz="900" b="1" dirty="0" smtClean="0">
-                <a:solidFill>
-                  <a:srgbClr val="FF0000"/>
-                </a:solidFill>
-              </a:rPr>
-              <a:t>Mandible Line 0</a:t>
-            </a:r>
-            <a:endParaRPr lang="en-CA" sz="900" b="1" dirty="0">
-              <a:solidFill>
-                <a:srgbClr val="FF0000"/>
-              </a:solidFill>
-            </a:endParaRPr>
-          </a:p>
-        </p:txBody>
-      </p:sp>
-      <p:sp>
-        <p:nvSpPr>
-          <p:cNvPr id="2" name="Conector 1"/>
-          <p:cNvSpPr/>
-          <p:nvPr/>
-        </p:nvSpPr>
-        <p:spPr>
-          <a:xfrm>
-            <a:off x="2742355" y="1950304"/>
-            <a:ext cx="107181" cy="107181"/>
-          </a:xfrm>
-          <a:prstGeom prst="flowChartConnector">
-            <a:avLst/>
-          </a:prstGeom>
-          <a:solidFill>
-            <a:srgbClr val="FF0000"/>
-          </a:solidFill>
-          <a:ln>
-            <a:solidFill>
-              <a:srgbClr val="FF0000"/>
-            </a:solidFill>
-          </a:ln>
-        </p:spPr>
-        <p:style>
-          <a:lnRef idx="2">
-            <a:schemeClr val="accent1">
-              <a:shade val="50000"/>
-            </a:schemeClr>
-          </a:lnRef>
-          <a:fillRef idx="1">
-            <a:schemeClr val="accent1"/>
-          </a:fillRef>
-          <a:effectRef idx="0">
-            <a:schemeClr val="accent1"/>
-          </a:effectRef>
-          <a:fontRef idx="minor">
-            <a:schemeClr val="lt1"/>
-          </a:fontRef>
-        </p:style>
-        <p:txBody>
-          <a:bodyPr rtlCol="0" anchor="ctr"/>
-          <a:lstStyle/>
-          <a:p>
-            <a:pPr algn="ctr"/>
-            <a:endParaRPr lang="en-US"/>
-          </a:p>
-        </p:txBody>
-      </p:sp>
-      <p:sp>
-        <p:nvSpPr>
-          <p:cNvPr id="71" name="Conector 70"/>
-          <p:cNvSpPr/>
-          <p:nvPr/>
-        </p:nvSpPr>
-        <p:spPr>
-          <a:xfrm>
-            <a:off x="3927192" y="2723682"/>
-            <a:ext cx="107181" cy="107181"/>
-          </a:xfrm>
-          <a:prstGeom prst="flowChartConnector">
-            <a:avLst/>
-          </a:prstGeom>
-          <a:solidFill>
-            <a:srgbClr val="FF0000"/>
-          </a:solidFill>
-          <a:ln>
-            <a:solidFill>
-              <a:srgbClr val="FF0000"/>
-            </a:solidFill>
-          </a:ln>
-        </p:spPr>
-        <p:style>
-          <a:lnRef idx="2">
-            <a:schemeClr val="accent1">
-              <a:shade val="50000"/>
-            </a:schemeClr>
-          </a:lnRef>
-          <a:fillRef idx="1">
-            <a:schemeClr val="accent1"/>
-          </a:fillRef>
-          <a:effectRef idx="0">
-            <a:schemeClr val="accent1"/>
-          </a:effectRef>
-          <a:fontRef idx="minor">
-            <a:schemeClr val="lt1"/>
-          </a:fontRef>
-        </p:style>
-        <p:txBody>
-          <a:bodyPr rtlCol="0" anchor="ctr"/>
-          <a:lstStyle/>
-          <a:p>
-            <a:pPr algn="ctr"/>
-            <a:endParaRPr lang="en-US"/>
-          </a:p>
-        </p:txBody>
-      </p:sp>
-      <p:sp>
-        <p:nvSpPr>
-          <p:cNvPr id="72" name="TextBox 15">
-            <a:extLst>
-              <a:ext uri="{FF2B5EF4-FFF2-40B4-BE49-F238E27FC236}">
-                <a16:creationId xmlns:a16="http://schemas.microsoft.com/office/drawing/2014/main" id="{B7F75750-FCD3-40D6-8032-B7D7565A8076}"/>
-              </a:ext>
-            </a:extLst>
-          </p:cNvPr>
-          <p:cNvSpPr txBox="1"/>
-          <p:nvPr/>
-        </p:nvSpPr>
-        <p:spPr>
-          <a:xfrm>
-            <a:off x="1955662" y="1874952"/>
-            <a:ext cx="868155" cy="230832"/>
-          </a:xfrm>
-          <a:prstGeom prst="rect">
-            <a:avLst/>
-          </a:prstGeom>
-          <a:noFill/>
-        </p:spPr>
-        <p:txBody>
-          <a:bodyPr wrap="square" rtlCol="0">
-            <a:spAutoFit/>
-          </a:bodyPr>
-          <a:lstStyle/>
-          <a:p>
-            <a:r>
-              <a:rPr lang="es-MX" sz="900" dirty="0" smtClean="0">
-                <a:solidFill>
-                  <a:srgbClr val="FF0000"/>
-                </a:solidFill>
-              </a:rPr>
-              <a:t>startPointML0</a:t>
-            </a:r>
-            <a:endParaRPr lang="en-CA" sz="900" dirty="0">
-              <a:solidFill>
-                <a:srgbClr val="FF0000"/>
-              </a:solidFill>
-            </a:endParaRPr>
-          </a:p>
-        </p:txBody>
-      </p:sp>
-      <p:sp>
-        <p:nvSpPr>
-          <p:cNvPr id="73" name="TextBox 15">
-            <a:extLst>
-              <a:ext uri="{FF2B5EF4-FFF2-40B4-BE49-F238E27FC236}">
-                <a16:creationId xmlns:a16="http://schemas.microsoft.com/office/drawing/2014/main" id="{B7F75750-FCD3-40D6-8032-B7D7565A8076}"/>
-              </a:ext>
-            </a:extLst>
-          </p:cNvPr>
-          <p:cNvSpPr txBox="1"/>
-          <p:nvPr/>
-        </p:nvSpPr>
-        <p:spPr>
-          <a:xfrm>
-            <a:off x="3143855" y="2689444"/>
-            <a:ext cx="849863" cy="230832"/>
-          </a:xfrm>
-          <a:prstGeom prst="rect">
-            <a:avLst/>
-          </a:prstGeom>
-          <a:noFill/>
-        </p:spPr>
-        <p:txBody>
-          <a:bodyPr wrap="square" rtlCol="0">
-            <a:spAutoFit/>
-          </a:bodyPr>
-          <a:lstStyle/>
-          <a:p>
-            <a:r>
-              <a:rPr lang="es-MX" sz="900" dirty="0" smtClean="0">
-                <a:solidFill>
-                  <a:srgbClr val="FF0000"/>
-                </a:solidFill>
-              </a:rPr>
-              <a:t>endPointML</a:t>
-            </a:r>
-            <a:r>
-              <a:rPr lang="es-MX" sz="900" dirty="0">
-                <a:solidFill>
-                  <a:srgbClr val="FF0000"/>
-                </a:solidFill>
-              </a:rPr>
-              <a:t>0</a:t>
-            </a:r>
-            <a:endParaRPr lang="en-CA" sz="900" dirty="0">
-              <a:solidFill>
-                <a:srgbClr val="FF0000"/>
-              </a:solidFill>
-            </a:endParaRPr>
-          </a:p>
-        </p:txBody>
-      </p:sp>
-      <p:sp>
-        <p:nvSpPr>
-          <p:cNvPr id="3" name="Arco 2"/>
-          <p:cNvSpPr/>
-          <p:nvPr/>
-        </p:nvSpPr>
-        <p:spPr>
-          <a:xfrm rot="4416478">
-            <a:off x="8631477" y="1081603"/>
-            <a:ext cx="334580" cy="340871"/>
-          </a:xfrm>
-          <a:prstGeom prst="arc">
-            <a:avLst/>
-          </a:prstGeom>
-        </p:spPr>
-        <p:style>
-          <a:lnRef idx="2">
-            <a:schemeClr val="accent1"/>
-          </a:lnRef>
-          <a:fillRef idx="0">
-            <a:schemeClr val="accent1"/>
-          </a:fillRef>
-          <a:effectRef idx="1">
-            <a:schemeClr val="accent1"/>
-          </a:effectRef>
-          <a:fontRef idx="minor">
-            <a:schemeClr val="tx1"/>
-          </a:fontRef>
-        </p:style>
-        <p:txBody>
-          <a:bodyPr rtlCol="0" anchor="ctr"/>
-          <a:lstStyle/>
-          <a:p>
-            <a:pPr algn="ctr"/>
-            <a:endParaRPr lang="en-US"/>
-          </a:p>
-        </p:txBody>
-      </p:sp>
-      <p:sp>
-        <p:nvSpPr>
-          <p:cNvPr id="14" name="CuadroTexto 13"/>
-          <p:cNvSpPr txBox="1"/>
-          <p:nvPr/>
-        </p:nvSpPr>
-        <p:spPr>
-          <a:xfrm>
-            <a:off x="8882367" y="1217530"/>
-            <a:ext cx="1010789" cy="230832"/>
-          </a:xfrm>
-          <a:prstGeom prst="rect">
-            <a:avLst/>
-          </a:prstGeom>
-          <a:noFill/>
-        </p:spPr>
-        <p:txBody>
-          <a:bodyPr wrap="square" rtlCol="0">
-            <a:spAutoFit/>
-          </a:bodyPr>
-          <a:lstStyle/>
-          <a:p>
-            <a:r>
-              <a:rPr lang="es-MX" sz="900" dirty="0" smtClean="0"/>
-              <a:t>rotationAngleZ0</a:t>
-            </a:r>
-            <a:endParaRPr lang="en-US" sz="900" dirty="0"/>
-          </a:p>
-        </p:txBody>
-      </p:sp>
-      <p:cxnSp>
-        <p:nvCxnSpPr>
-          <p:cNvPr id="75" name="Straight Connector 12">
-            <a:extLst>
-              <a:ext uri="{FF2B5EF4-FFF2-40B4-BE49-F238E27FC236}">
-                <a16:creationId xmlns:a16="http://schemas.microsoft.com/office/drawing/2014/main" id="{9E27C5C2-F1E7-480D-ACC7-E1D51A163710}"/>
-              </a:ext>
-            </a:extLst>
-          </p:cNvPr>
-          <p:cNvCxnSpPr>
-            <a:cxnSpLocks/>
-          </p:cNvCxnSpPr>
-          <p:nvPr/>
-        </p:nvCxnSpPr>
-        <p:spPr>
-          <a:xfrm>
-            <a:off x="10250016" y="1140058"/>
-            <a:ext cx="1189612" cy="267919"/>
-          </a:xfrm>
-          <a:prstGeom prst="line">
-            <a:avLst/>
-          </a:prstGeom>
-          <a:ln w="57150">
-            <a:solidFill>
-              <a:srgbClr val="FF0000"/>
-            </a:solidFill>
-          </a:ln>
-        </p:spPr>
-        <p:style>
-          <a:lnRef idx="1">
-            <a:schemeClr val="accent1"/>
-          </a:lnRef>
-          <a:fillRef idx="0">
-            <a:schemeClr val="accent1"/>
-          </a:fillRef>
-          <a:effectRef idx="0">
-            <a:schemeClr val="accent1"/>
-          </a:effectRef>
-          <a:fontRef idx="minor">
-            <a:schemeClr val="tx1"/>
-          </a:fontRef>
-        </p:style>
-      </p:cxnSp>
-      <p:cxnSp>
-        <p:nvCxnSpPr>
-          <p:cNvPr id="76" name="Straight Connector 53">
-            <a:extLst>
-              <a:ext uri="{FF2B5EF4-FFF2-40B4-BE49-F238E27FC236}">
-                <a16:creationId xmlns:a16="http://schemas.microsoft.com/office/drawing/2014/main" id="{B05DEC03-0522-421C-8FEA-33C78AEB367C}"/>
-              </a:ext>
-            </a:extLst>
-          </p:cNvPr>
-          <p:cNvCxnSpPr>
-            <a:cxnSpLocks/>
-          </p:cNvCxnSpPr>
-          <p:nvPr/>
-        </p:nvCxnSpPr>
-        <p:spPr>
-          <a:xfrm>
-            <a:off x="10250016" y="1140058"/>
-            <a:ext cx="1162312" cy="0"/>
-          </a:xfrm>
-          <a:prstGeom prst="line">
-            <a:avLst/>
-          </a:prstGeom>
-          <a:ln w="57150">
-            <a:solidFill>
-              <a:srgbClr val="FF0000"/>
-            </a:solidFill>
-          </a:ln>
-        </p:spPr>
-        <p:style>
-          <a:lnRef idx="1">
-            <a:schemeClr val="accent1"/>
-          </a:lnRef>
-          <a:fillRef idx="0">
-            <a:schemeClr val="accent1"/>
-          </a:fillRef>
-          <a:effectRef idx="0">
-            <a:schemeClr val="accent1"/>
-          </a:effectRef>
-          <a:fontRef idx="minor">
-            <a:schemeClr val="tx1"/>
-          </a:fontRef>
-        </p:style>
-      </p:cxnSp>
-      <p:cxnSp>
-        <p:nvCxnSpPr>
-          <p:cNvPr id="77" name="Straight Arrow Connector 118">
-            <a:extLst>
-              <a:ext uri="{FF2B5EF4-FFF2-40B4-BE49-F238E27FC236}">
-                <a16:creationId xmlns:a16="http://schemas.microsoft.com/office/drawing/2014/main" id="{FC98052C-FA17-4960-BC9F-16495541E170}"/>
-              </a:ext>
-            </a:extLst>
-          </p:cNvPr>
-          <p:cNvCxnSpPr>
-            <a:cxnSpLocks/>
-          </p:cNvCxnSpPr>
-          <p:nvPr/>
-        </p:nvCxnSpPr>
-        <p:spPr>
-          <a:xfrm flipV="1">
-            <a:off x="10285665" y="550625"/>
-            <a:ext cx="124067" cy="569706"/>
-          </a:xfrm>
-          <a:prstGeom prst="straightConnector1">
-            <a:avLst/>
-          </a:prstGeom>
-          <a:ln w="19050">
-            <a:solidFill>
-              <a:schemeClr val="tx1"/>
-            </a:solidFill>
-            <a:tailEnd type="triangle"/>
-          </a:ln>
-        </p:spPr>
-        <p:style>
-          <a:lnRef idx="1">
-            <a:schemeClr val="accent1"/>
-          </a:lnRef>
-          <a:fillRef idx="0">
-            <a:schemeClr val="accent1"/>
-          </a:fillRef>
-          <a:effectRef idx="0">
-            <a:schemeClr val="accent1"/>
-          </a:effectRef>
-          <a:fontRef idx="minor">
-            <a:schemeClr val="tx1"/>
-          </a:fontRef>
-        </p:style>
-      </p:cxnSp>
-      <p:sp>
-        <p:nvSpPr>
-          <p:cNvPr id="78" name="Arco 77"/>
-          <p:cNvSpPr/>
-          <p:nvPr/>
-        </p:nvSpPr>
-        <p:spPr>
-          <a:xfrm rot="4416478">
-            <a:off x="10964040" y="1113810"/>
-            <a:ext cx="241037" cy="148958"/>
-          </a:xfrm>
-          <a:prstGeom prst="arc">
-            <a:avLst/>
-          </a:prstGeom>
-        </p:spPr>
-        <p:style>
-          <a:lnRef idx="2">
-            <a:schemeClr val="accent1"/>
-          </a:lnRef>
-          <a:fillRef idx="0">
-            <a:schemeClr val="accent1"/>
-          </a:fillRef>
-          <a:effectRef idx="1">
-            <a:schemeClr val="accent1"/>
-          </a:effectRef>
-          <a:fontRef idx="minor">
-            <a:schemeClr val="tx1"/>
-          </a:fontRef>
-        </p:style>
-        <p:txBody>
-          <a:bodyPr rtlCol="0" anchor="ctr"/>
-          <a:lstStyle/>
-          <a:p>
-            <a:pPr algn="ctr"/>
-            <a:endParaRPr lang="en-US"/>
-          </a:p>
-        </p:txBody>
-      </p:sp>
-      <p:sp>
-        <p:nvSpPr>
-          <p:cNvPr id="79" name="CuadroTexto 78"/>
-          <p:cNvSpPr txBox="1"/>
-          <p:nvPr/>
-        </p:nvSpPr>
-        <p:spPr>
-          <a:xfrm>
-            <a:off x="11087807" y="1120718"/>
-            <a:ext cx="1028431" cy="230832"/>
-          </a:xfrm>
-          <a:prstGeom prst="rect">
-            <a:avLst/>
-          </a:prstGeom>
-          <a:noFill/>
-        </p:spPr>
-        <p:txBody>
-          <a:bodyPr wrap="square" rtlCol="0">
-            <a:spAutoFit/>
-          </a:bodyPr>
-          <a:lstStyle/>
-          <a:p>
-            <a:r>
-              <a:rPr lang="es-MX" sz="900" dirty="0" smtClean="0"/>
-              <a:t>rotationAngleZ0</a:t>
-            </a:r>
-            <a:endParaRPr lang="en-US" sz="900" dirty="0"/>
-          </a:p>
-        </p:txBody>
-      </p:sp>
-      <p:sp>
-        <p:nvSpPr>
-          <p:cNvPr id="80" name="CuadroTexto 79"/>
-          <p:cNvSpPr txBox="1"/>
-          <p:nvPr/>
-        </p:nvSpPr>
-        <p:spPr>
-          <a:xfrm>
-            <a:off x="10378255" y="473169"/>
-            <a:ext cx="901491" cy="230832"/>
-          </a:xfrm>
-          <a:prstGeom prst="rect">
-            <a:avLst/>
-          </a:prstGeom>
-          <a:noFill/>
-        </p:spPr>
-        <p:txBody>
-          <a:bodyPr wrap="square" rtlCol="0">
-            <a:spAutoFit/>
-          </a:bodyPr>
-          <a:lstStyle/>
-          <a:p>
-            <a:r>
-              <a:rPr lang="es-MX" sz="900" dirty="0" smtClean="0"/>
-              <a:t>rotationAxisZ0</a:t>
-            </a:r>
-            <a:endParaRPr lang="en-US" sz="900" dirty="0"/>
-          </a:p>
-        </p:txBody>
-      </p:sp>
-      <p:sp>
-        <p:nvSpPr>
-          <p:cNvPr id="81" name="TextBox 15">
-            <a:extLst>
-              <a:ext uri="{FF2B5EF4-FFF2-40B4-BE49-F238E27FC236}">
-                <a16:creationId xmlns:a16="http://schemas.microsoft.com/office/drawing/2014/main" id="{B7F75750-FCD3-40D6-8032-B7D7565A8076}"/>
-              </a:ext>
-            </a:extLst>
-          </p:cNvPr>
-          <p:cNvSpPr txBox="1"/>
-          <p:nvPr/>
-        </p:nvSpPr>
-        <p:spPr>
-          <a:xfrm>
-            <a:off x="1513555" y="5277595"/>
-            <a:ext cx="836404" cy="230832"/>
-          </a:xfrm>
-          <a:prstGeom prst="rect">
-            <a:avLst/>
-          </a:prstGeom>
-          <a:noFill/>
-        </p:spPr>
-        <p:txBody>
-          <a:bodyPr wrap="square" rtlCol="0">
-            <a:spAutoFit/>
-          </a:bodyPr>
-          <a:lstStyle/>
-          <a:p>
-            <a:r>
-              <a:rPr lang="es-MX" sz="900" dirty="0" smtClean="0">
-                <a:solidFill>
-                  <a:srgbClr val="FF0000"/>
-                </a:solidFill>
-              </a:rPr>
-              <a:t>startPointBS0</a:t>
-            </a:r>
-            <a:endParaRPr lang="en-CA" sz="900" dirty="0">
-              <a:solidFill>
-                <a:srgbClr val="FF0000"/>
-              </a:solidFill>
-            </a:endParaRPr>
-          </a:p>
-        </p:txBody>
-      </p:sp>
-      <p:sp>
-        <p:nvSpPr>
-          <p:cNvPr id="82" name="TextBox 15">
-            <a:extLst>
-              <a:ext uri="{FF2B5EF4-FFF2-40B4-BE49-F238E27FC236}">
-                <a16:creationId xmlns:a16="http://schemas.microsoft.com/office/drawing/2014/main" id="{B7F75750-FCD3-40D6-8032-B7D7565A8076}"/>
-              </a:ext>
-            </a:extLst>
-          </p:cNvPr>
-          <p:cNvSpPr txBox="1"/>
-          <p:nvPr/>
-        </p:nvSpPr>
-        <p:spPr>
-          <a:xfrm>
-            <a:off x="2742097" y="5385569"/>
-            <a:ext cx="868459" cy="230832"/>
-          </a:xfrm>
-          <a:prstGeom prst="rect">
-            <a:avLst/>
-          </a:prstGeom>
-          <a:noFill/>
-        </p:spPr>
-        <p:txBody>
-          <a:bodyPr wrap="square" rtlCol="0">
-            <a:spAutoFit/>
-          </a:bodyPr>
-          <a:lstStyle/>
-          <a:p>
-            <a:r>
-              <a:rPr lang="es-MX" sz="900" dirty="0" smtClean="0">
-                <a:solidFill>
-                  <a:srgbClr val="FF0000"/>
-                </a:solidFill>
-              </a:rPr>
-              <a:t>endPointBS0</a:t>
-            </a:r>
-            <a:endParaRPr lang="en-CA" sz="900" dirty="0">
-              <a:solidFill>
-                <a:srgbClr val="FF0000"/>
-              </a:solidFill>
-            </a:endParaRPr>
-          </a:p>
-        </p:txBody>
-      </p:sp>
-      <p:sp>
-        <p:nvSpPr>
-          <p:cNvPr id="83" name="Conector 82"/>
-          <p:cNvSpPr/>
-          <p:nvPr/>
-        </p:nvSpPr>
-        <p:spPr>
-          <a:xfrm>
-            <a:off x="2290906" y="5353680"/>
-            <a:ext cx="107181" cy="107181"/>
-          </a:xfrm>
-          <a:prstGeom prst="flowChartConnector">
-            <a:avLst/>
-          </a:prstGeom>
-          <a:solidFill>
-            <a:srgbClr val="FF0000"/>
-          </a:solidFill>
-          <a:ln>
-            <a:solidFill>
-              <a:srgbClr val="FF0000"/>
-            </a:solidFill>
-          </a:ln>
-        </p:spPr>
-        <p:style>
-          <a:lnRef idx="2">
-            <a:schemeClr val="accent1">
-              <a:shade val="50000"/>
-            </a:schemeClr>
-          </a:lnRef>
-          <a:fillRef idx="1">
-            <a:schemeClr val="accent1"/>
-          </a:fillRef>
-          <a:effectRef idx="0">
-            <a:schemeClr val="accent1"/>
-          </a:effectRef>
-          <a:fontRef idx="minor">
-            <a:schemeClr val="lt1"/>
-          </a:fontRef>
-        </p:style>
-        <p:txBody>
-          <a:bodyPr rtlCol="0" anchor="ctr"/>
-          <a:lstStyle/>
-          <a:p>
-            <a:pPr algn="ctr"/>
-            <a:endParaRPr lang="en-US"/>
-          </a:p>
-        </p:txBody>
-      </p:sp>
-      <p:sp>
-        <p:nvSpPr>
-          <p:cNvPr id="84" name="Conector 83"/>
-          <p:cNvSpPr/>
-          <p:nvPr/>
-        </p:nvSpPr>
-        <p:spPr>
-          <a:xfrm>
-            <a:off x="3441166" y="5348324"/>
-            <a:ext cx="107181" cy="107181"/>
-          </a:xfrm>
-          <a:prstGeom prst="flowChartConnector">
-            <a:avLst/>
-          </a:prstGeom>
-          <a:solidFill>
-            <a:srgbClr val="FF0000"/>
-          </a:solidFill>
-          <a:ln>
-            <a:solidFill>
-              <a:srgbClr val="FF0000"/>
-            </a:solidFill>
-          </a:ln>
-        </p:spPr>
-        <p:style>
-          <a:lnRef idx="2">
-            <a:schemeClr val="accent1">
-              <a:shade val="50000"/>
-            </a:schemeClr>
-          </a:lnRef>
-          <a:fillRef idx="1">
-            <a:schemeClr val="accent1"/>
-          </a:fillRef>
-          <a:effectRef idx="0">
-            <a:schemeClr val="accent1"/>
-          </a:effectRef>
-          <a:fontRef idx="minor">
-            <a:schemeClr val="lt1"/>
-          </a:fontRef>
-        </p:style>
-        <p:txBody>
-          <a:bodyPr rtlCol="0" anchor="ctr"/>
-          <a:lstStyle/>
-          <a:p>
-            <a:pPr algn="ctr"/>
-            <a:endParaRPr lang="en-US"/>
-          </a:p>
-        </p:txBody>
-      </p:sp>
-      <p:sp>
-        <p:nvSpPr>
-          <p:cNvPr id="22" name="Rectángulo 21"/>
-          <p:cNvSpPr/>
-          <p:nvPr/>
-        </p:nvSpPr>
-        <p:spPr>
-          <a:xfrm>
-            <a:off x="7511971" y="21078"/>
-            <a:ext cx="3369825" cy="276999"/>
+            <a:off x="6579289" y="287794"/>
+            <a:ext cx="5732462" cy="276999"/>
           </a:xfrm>
           <a:prstGeom prst="rect">
             <a:avLst/>
@@ -12053,55 +11029,8 @@
           <a:lstStyle/>
           <a:p>
             <a:r>
-              <a:rPr lang="en-US" sz="1200" dirty="0" smtClean="0"/>
-              <a:t>rotationAxisZ0: </a:t>
-            </a:r>
-            <a:r>
-              <a:rPr lang="en-US" sz="1200" dirty="0" smtClean="0"/>
-              <a:t>MandibleLine0</a:t>
-            </a:r>
-            <a:r>
-              <a:rPr lang="en-US" sz="1200" dirty="0" smtClean="0">
-                <a:sym typeface="Wingdings 2" panose="05020102010507070707" pitchFamily="18" charset="2"/>
-              </a:rPr>
-              <a:t>BoneSegment0</a:t>
-            </a:r>
-            <a:endParaRPr lang="en-US" sz="1200" dirty="0"/>
-          </a:p>
-        </p:txBody>
-      </p:sp>
-      <p:sp>
-        <p:nvSpPr>
-          <p:cNvPr id="85" name="Rectángulo 84"/>
-          <p:cNvSpPr/>
-          <p:nvPr/>
-        </p:nvSpPr>
-        <p:spPr>
-          <a:xfrm>
-            <a:off x="6910609" y="3863347"/>
-            <a:ext cx="5732462" cy="461665"/>
-          </a:xfrm>
-          <a:prstGeom prst="rect">
-            <a:avLst/>
-          </a:prstGeom>
-        </p:spPr>
-        <p:txBody>
-          <a:bodyPr wrap="square">
-            <a:spAutoFit/>
-          </a:bodyPr>
-          <a:lstStyle/>
-          <a:p>
-            <a:r>
               <a:rPr lang="es-MX" sz="1200" dirty="0" smtClean="0"/>
-              <a:t>mandibleAxis0ToFibulaRotationTransform = </a:t>
-            </a:r>
-            <a:r>
-              <a:rPr lang="es-MX" sz="1200" dirty="0" err="1" smtClean="0"/>
-              <a:t>Concatenate</a:t>
-            </a:r>
-            <a:r>
-              <a:rPr lang="es-MX" sz="1200" dirty="0" smtClean="0"/>
-              <a:t>(</a:t>
+              <a:t>mandibleAxis0ToFibulaRotationTransform: </a:t>
             </a:r>
             <a:r>
               <a:rPr lang="es-MX" sz="1200" dirty="0" err="1" smtClean="0"/>
@@ -12109,207 +11038,21 @@
             </a:r>
             <a:r>
               <a:rPr lang="es-MX" sz="1200" dirty="0" smtClean="0"/>
-              <a:t>(rotationAxisZ0, rotationAngleZ0),</a:t>
-            </a:r>
-            <a:r>
-              <a:rPr lang="es-MX" sz="1200" dirty="0"/>
               <a:t> </a:t>
             </a:r>
             <a:r>
               <a:rPr lang="es-MX" sz="1200" dirty="0" err="1" smtClean="0"/>
-              <a:t>Rotation</a:t>
+              <a:t>from</a:t>
             </a:r>
             <a:r>
               <a:rPr lang="es-MX" sz="1200" dirty="0" smtClean="0"/>
-              <a:t>(rotationAxisX0</a:t>
-            </a:r>
-            <a:r>
-              <a:rPr lang="es-MX" sz="1200" dirty="0"/>
-              <a:t>, </a:t>
-            </a:r>
-            <a:r>
-              <a:rPr lang="es-MX" sz="1200" dirty="0" smtClean="0"/>
-              <a:t>rotationAngleX0)</a:t>
-            </a:r>
-            <a:r>
-              <a:rPr lang="en-US" sz="1200" dirty="0" smtClean="0"/>
-              <a:t>)</a:t>
+              <a:t> mandibleAxis0 to </a:t>
+            </a:r>
+            <a:r>
+              <a:rPr lang="es-MX" sz="1200" dirty="0" err="1" smtClean="0"/>
+              <a:t>Fibula</a:t>
             </a:r>
             <a:endParaRPr lang="en-US" sz="1200" dirty="0"/>
-          </a:p>
-        </p:txBody>
-      </p:sp>
-      <p:sp>
-        <p:nvSpPr>
-          <p:cNvPr id="87" name="TextBox 15">
-            <a:extLst>
-              <a:ext uri="{FF2B5EF4-FFF2-40B4-BE49-F238E27FC236}">
-                <a16:creationId xmlns:a16="http://schemas.microsoft.com/office/drawing/2014/main" id="{B7F75750-FCD3-40D6-8032-B7D7565A8076}"/>
-              </a:ext>
-            </a:extLst>
-          </p:cNvPr>
-          <p:cNvSpPr txBox="1"/>
-          <p:nvPr/>
-        </p:nvSpPr>
-        <p:spPr>
-          <a:xfrm>
-            <a:off x="10678868" y="1343525"/>
-            <a:ext cx="736417" cy="369332"/>
-          </a:xfrm>
-          <a:prstGeom prst="rect">
-            <a:avLst/>
-          </a:prstGeom>
-          <a:noFill/>
-        </p:spPr>
-        <p:txBody>
-          <a:bodyPr wrap="square" rtlCol="0">
-            <a:spAutoFit/>
-          </a:bodyPr>
-          <a:lstStyle/>
-          <a:p>
-            <a:r>
-              <a:rPr lang="en-US" sz="900" b="1" dirty="0" smtClean="0">
-                <a:solidFill>
-                  <a:srgbClr val="FF0000"/>
-                </a:solidFill>
-              </a:rPr>
-              <a:t>Mandible Line 0</a:t>
-            </a:r>
-            <a:endParaRPr lang="en-CA" sz="900" b="1" dirty="0">
-              <a:solidFill>
-                <a:srgbClr val="FF0000"/>
-              </a:solidFill>
-            </a:endParaRPr>
-          </a:p>
-        </p:txBody>
-      </p:sp>
-      <p:sp>
-        <p:nvSpPr>
-          <p:cNvPr id="89" name="TextBox 54">
-            <a:extLst>
-              <a:ext uri="{FF2B5EF4-FFF2-40B4-BE49-F238E27FC236}">
-                <a16:creationId xmlns:a16="http://schemas.microsoft.com/office/drawing/2014/main" id="{3AF7731B-7E2C-4544-A4D6-CE928DE01681}"/>
-              </a:ext>
-            </a:extLst>
-          </p:cNvPr>
-          <p:cNvSpPr txBox="1"/>
-          <p:nvPr/>
-        </p:nvSpPr>
-        <p:spPr>
-          <a:xfrm>
-            <a:off x="8793088" y="831310"/>
-            <a:ext cx="736417" cy="369332"/>
-          </a:xfrm>
-          <a:prstGeom prst="rect">
-            <a:avLst/>
-          </a:prstGeom>
-          <a:noFill/>
-        </p:spPr>
-        <p:txBody>
-          <a:bodyPr wrap="square" rtlCol="0">
-            <a:spAutoFit/>
-          </a:bodyPr>
-          <a:lstStyle/>
-          <a:p>
-            <a:r>
-              <a:rPr lang="en-US" sz="900" b="1" dirty="0">
-                <a:solidFill>
-                  <a:srgbClr val="FF0000"/>
-                </a:solidFill>
-              </a:rPr>
-              <a:t>Bone segment </a:t>
-            </a:r>
-            <a:r>
-              <a:rPr lang="en-US" sz="900" b="1" dirty="0" smtClean="0">
-                <a:solidFill>
-                  <a:srgbClr val="FF0000"/>
-                </a:solidFill>
-              </a:rPr>
-              <a:t>0</a:t>
-            </a:r>
-            <a:endParaRPr lang="en-CA" sz="900" b="1" dirty="0">
-              <a:solidFill>
-                <a:srgbClr val="FF0000"/>
-              </a:solidFill>
-            </a:endParaRPr>
-          </a:p>
-        </p:txBody>
-      </p:sp>
-      <p:sp>
-        <p:nvSpPr>
-          <p:cNvPr id="90" name="Conector 89"/>
-          <p:cNvSpPr/>
-          <p:nvPr/>
-        </p:nvSpPr>
-        <p:spPr>
-          <a:xfrm>
-            <a:off x="8418440" y="1136186"/>
-            <a:ext cx="107181" cy="107181"/>
-          </a:xfrm>
-          <a:prstGeom prst="flowChartConnector">
-            <a:avLst/>
-          </a:prstGeom>
-          <a:solidFill>
-            <a:schemeClr val="tx1"/>
-          </a:solidFill>
-          <a:ln>
-            <a:solidFill>
-              <a:schemeClr val="tx1"/>
-            </a:solidFill>
-          </a:ln>
-        </p:spPr>
-        <p:style>
-          <a:lnRef idx="2">
-            <a:schemeClr val="accent1">
-              <a:shade val="50000"/>
-            </a:schemeClr>
-          </a:lnRef>
-          <a:fillRef idx="1">
-            <a:schemeClr val="accent1"/>
-          </a:fillRef>
-          <a:effectRef idx="0">
-            <a:schemeClr val="accent1"/>
-          </a:effectRef>
-          <a:fontRef idx="minor">
-            <a:schemeClr val="lt1"/>
-          </a:fontRef>
-        </p:style>
-        <p:txBody>
-          <a:bodyPr rtlCol="0" anchor="ctr"/>
-          <a:lstStyle/>
-          <a:p>
-            <a:pPr algn="ctr"/>
-            <a:endParaRPr lang="en-US"/>
-          </a:p>
-        </p:txBody>
-      </p:sp>
-      <p:sp>
-        <p:nvSpPr>
-          <p:cNvPr id="91" name="CuadroTexto 90"/>
-          <p:cNvSpPr txBox="1"/>
-          <p:nvPr/>
-        </p:nvSpPr>
-        <p:spPr>
-          <a:xfrm>
-            <a:off x="7740189" y="926376"/>
-            <a:ext cx="901491" cy="230832"/>
-          </a:xfrm>
-          <a:prstGeom prst="rect">
-            <a:avLst/>
-          </a:prstGeom>
-          <a:noFill/>
-        </p:spPr>
-        <p:txBody>
-          <a:bodyPr wrap="square" rtlCol="0">
-            <a:spAutoFit/>
-          </a:bodyPr>
-          <a:lstStyle/>
-          <a:p>
-            <a:r>
-              <a:rPr lang="es-MX" sz="900" dirty="0" smtClean="0"/>
-              <a:t>rotationAxisZ0</a:t>
-            </a:r>
-            <a:endParaRPr lang="en-US" sz="900" dirty="0"/>
           </a:p>
         </p:txBody>
       </p:sp>
@@ -12359,10 +11102,10 @@
       </p:cxnSp>
       <p:cxnSp>
         <p:nvCxnSpPr>
-          <p:cNvPr id="99" name="Straight Arrow Connector 118">
-            <a:extLst>
-              <a:ext uri="{FF2B5EF4-FFF2-40B4-BE49-F238E27FC236}">
-                <a16:creationId xmlns:a16="http://schemas.microsoft.com/office/drawing/2014/main" id="{FC98052C-FA17-4960-BC9F-16495541E170}"/>
+          <p:cNvPr id="100" name="Straight Arrow Connector 119">
+            <a:extLst>
+              <a:ext uri="{FF2B5EF4-FFF2-40B4-BE49-F238E27FC236}">
+                <a16:creationId xmlns:a16="http://schemas.microsoft.com/office/drawing/2014/main" id="{5BA44D8D-057F-4BEC-898B-87CAA2D783B4}"/>
               </a:ext>
             </a:extLst>
           </p:cNvPr>
@@ -12372,9 +11115,9 @@
           <p:nvPr/>
         </p:nvCxnSpPr>
         <p:spPr>
-          <a:xfrm>
-            <a:off x="2806383" y="1999136"/>
-            <a:ext cx="451780" cy="318096"/>
+          <a:xfrm flipV="1">
+            <a:off x="2792715" y="1541927"/>
+            <a:ext cx="351140" cy="473930"/>
           </a:xfrm>
           <a:prstGeom prst="straightConnector1">
             <a:avLst/>
@@ -12401,12 +11144,472 @@
           </a:fontRef>
         </p:style>
       </p:cxnSp>
+      <p:sp>
+        <p:nvSpPr>
+          <p:cNvPr id="101" name="TextBox 121">
+            <a:extLst>
+              <a:ext uri="{FF2B5EF4-FFF2-40B4-BE49-F238E27FC236}">
+                <a16:creationId xmlns:a16="http://schemas.microsoft.com/office/drawing/2014/main" id="{D4C9D527-4D57-4714-AC9A-80811DEB6CE7}"/>
+              </a:ext>
+            </a:extLst>
+          </p:cNvPr>
+          <p:cNvSpPr txBox="1"/>
+          <p:nvPr/>
+        </p:nvSpPr>
+        <p:spPr>
+          <a:xfrm>
+            <a:off x="3009151" y="2202993"/>
+            <a:ext cx="892184" cy="369332"/>
+          </a:xfrm>
+          <a:prstGeom prst="rect">
+            <a:avLst/>
+          </a:prstGeom>
+          <a:noFill/>
+        </p:spPr>
+        <p:txBody>
+          <a:bodyPr wrap="square" rtlCol="0">
+            <a:spAutoFit/>
+          </a:bodyPr>
+          <a:lstStyle/>
+          <a:p>
+            <a:r>
+              <a:rPr lang="en-US" b="1" i="1" dirty="0">
+                <a:solidFill>
+                  <a:srgbClr val="7030A0"/>
+                </a:solidFill>
+              </a:rPr>
+              <a:t>z</a:t>
+            </a:r>
+            <a:endParaRPr lang="en-CA" b="1" i="1" dirty="0">
+              <a:solidFill>
+                <a:srgbClr val="7030A0"/>
+              </a:solidFill>
+            </a:endParaRPr>
+          </a:p>
+        </p:txBody>
+      </p:sp>
+      <p:sp>
+        <p:nvSpPr>
+          <p:cNvPr id="102" name="TextBox 122">
+            <a:extLst>
+              <a:ext uri="{FF2B5EF4-FFF2-40B4-BE49-F238E27FC236}">
+                <a16:creationId xmlns:a16="http://schemas.microsoft.com/office/drawing/2014/main" id="{EF0B52AD-218E-4C03-8ED3-90B140F96951}"/>
+              </a:ext>
+            </a:extLst>
+          </p:cNvPr>
+          <p:cNvSpPr txBox="1"/>
+          <p:nvPr/>
+        </p:nvSpPr>
+        <p:spPr>
+          <a:xfrm>
+            <a:off x="2628981" y="1129865"/>
+            <a:ext cx="892184" cy="369332"/>
+          </a:xfrm>
+          <a:prstGeom prst="rect">
+            <a:avLst/>
+          </a:prstGeom>
+          <a:noFill/>
+        </p:spPr>
+        <p:txBody>
+          <a:bodyPr wrap="square" rtlCol="0">
+            <a:spAutoFit/>
+          </a:bodyPr>
+          <a:lstStyle/>
+          <a:p>
+            <a:r>
+              <a:rPr lang="en-US" b="1" i="1" dirty="0">
+                <a:solidFill>
+                  <a:srgbClr val="7030A0"/>
+                </a:solidFill>
+              </a:rPr>
+              <a:t>y</a:t>
+            </a:r>
+            <a:endParaRPr lang="en-CA" b="1" i="1" dirty="0">
+              <a:solidFill>
+                <a:srgbClr val="7030A0"/>
+              </a:solidFill>
+            </a:endParaRPr>
+          </a:p>
+        </p:txBody>
+      </p:sp>
+      <p:sp>
+        <p:nvSpPr>
+          <p:cNvPr id="103" name="TextBox 123">
+            <a:extLst>
+              <a:ext uri="{FF2B5EF4-FFF2-40B4-BE49-F238E27FC236}">
+                <a16:creationId xmlns:a16="http://schemas.microsoft.com/office/drawing/2014/main" id="{70229F0B-70DD-4C64-AABA-D33B6AB17DA9}"/>
+              </a:ext>
+            </a:extLst>
+          </p:cNvPr>
+          <p:cNvSpPr txBox="1"/>
+          <p:nvPr/>
+        </p:nvSpPr>
+        <p:spPr>
+          <a:xfrm>
+            <a:off x="3027082" y="1273330"/>
+            <a:ext cx="892184" cy="369332"/>
+          </a:xfrm>
+          <a:prstGeom prst="rect">
+            <a:avLst/>
+          </a:prstGeom>
+          <a:noFill/>
+        </p:spPr>
+        <p:txBody>
+          <a:bodyPr wrap="square" rtlCol="0">
+            <a:spAutoFit/>
+          </a:bodyPr>
+          <a:lstStyle/>
+          <a:p>
+            <a:r>
+              <a:rPr lang="en-US" b="1" i="1" dirty="0">
+                <a:solidFill>
+                  <a:srgbClr val="7030A0"/>
+                </a:solidFill>
+              </a:rPr>
+              <a:t>x</a:t>
+            </a:r>
+            <a:endParaRPr lang="en-CA" b="1" i="1" dirty="0">
+              <a:solidFill>
+                <a:srgbClr val="7030A0"/>
+              </a:solidFill>
+            </a:endParaRPr>
+          </a:p>
+        </p:txBody>
+      </p:sp>
+      <p:sp>
+        <p:nvSpPr>
+          <p:cNvPr id="105" name="TextBox 122">
+            <a:extLst>
+              <a:ext uri="{FF2B5EF4-FFF2-40B4-BE49-F238E27FC236}">
+                <a16:creationId xmlns:a16="http://schemas.microsoft.com/office/drawing/2014/main" id="{EF0B52AD-218E-4C03-8ED3-90B140F96951}"/>
+              </a:ext>
+            </a:extLst>
+          </p:cNvPr>
+          <p:cNvSpPr txBox="1"/>
+          <p:nvPr/>
+        </p:nvSpPr>
+        <p:spPr>
+          <a:xfrm>
+            <a:off x="1981052" y="927738"/>
+            <a:ext cx="1611515" cy="276999"/>
+          </a:xfrm>
+          <a:prstGeom prst="rect">
+            <a:avLst/>
+          </a:prstGeom>
+          <a:noFill/>
+        </p:spPr>
+        <p:txBody>
+          <a:bodyPr wrap="square" rtlCol="0">
+            <a:spAutoFit/>
+          </a:bodyPr>
+          <a:lstStyle/>
+          <a:p>
+            <a:r>
+              <a:rPr lang="es-MX" sz="1200" b="1" i="1" dirty="0" smtClean="0">
+                <a:solidFill>
+                  <a:srgbClr val="7030A0"/>
+                </a:solidFill>
+              </a:rPr>
+              <a:t>mandibleAxis0</a:t>
+            </a:r>
+            <a:endParaRPr lang="en-CA" sz="1200" b="1" i="1" dirty="0">
+              <a:solidFill>
+                <a:srgbClr val="7030A0"/>
+              </a:solidFill>
+            </a:endParaRPr>
+          </a:p>
+        </p:txBody>
+      </p:sp>
+      <p:sp>
+        <p:nvSpPr>
+          <p:cNvPr id="133" name="Rectángulo 132"/>
+          <p:cNvSpPr/>
+          <p:nvPr/>
+        </p:nvSpPr>
+        <p:spPr>
+          <a:xfrm>
+            <a:off x="8780925" y="3220738"/>
+            <a:ext cx="3530826" cy="2492990"/>
+          </a:xfrm>
+          <a:prstGeom prst="rect">
+            <a:avLst/>
+          </a:prstGeom>
+        </p:spPr>
+        <p:txBody>
+          <a:bodyPr wrap="square">
+            <a:spAutoFit/>
+          </a:bodyPr>
+          <a:lstStyle/>
+          <a:p>
+            <a:r>
+              <a:rPr lang="en-US" sz="1200" b="1" u="sng" dirty="0" smtClean="0"/>
+              <a:t>Coordinate </a:t>
+            </a:r>
+            <a:r>
+              <a:rPr lang="en-US" sz="1200" b="1" u="sng" dirty="0"/>
+              <a:t>systems</a:t>
+            </a:r>
+          </a:p>
+          <a:p>
+            <a:endParaRPr lang="es-MX" sz="1200" i="1" dirty="0"/>
+          </a:p>
+          <a:p>
+            <a:r>
+              <a:rPr lang="es-MX" sz="1200" dirty="0" smtClean="0"/>
+              <a:t>mandibleAxis0:</a:t>
+            </a:r>
+            <a:endParaRPr lang="en-US" sz="1200" dirty="0" smtClean="0"/>
+          </a:p>
+          <a:p>
+            <a:pPr marL="171450" indent="-171450">
+              <a:buFontTx/>
+              <a:buChar char="-"/>
+            </a:pPr>
+            <a:r>
+              <a:rPr lang="es-MX" sz="1200" dirty="0" smtClean="0"/>
+              <a:t>   </a:t>
+            </a:r>
+            <a:r>
+              <a:rPr lang="es-MX" sz="1200" dirty="0" err="1" smtClean="0"/>
+              <a:t>Origin</a:t>
+            </a:r>
+            <a:r>
+              <a:rPr lang="es-MX" sz="1200" dirty="0" smtClean="0"/>
+              <a:t>: MandiblePlane0Origin</a:t>
+            </a:r>
+          </a:p>
+          <a:p>
+            <a:pPr marL="171450" indent="-171450">
+              <a:buFontTx/>
+              <a:buChar char="-"/>
+            </a:pPr>
+            <a:r>
+              <a:rPr lang="en-CA" sz="1200" dirty="0" smtClean="0"/>
+              <a:t>   </a:t>
+            </a:r>
+            <a:r>
+              <a:rPr lang="en-CA" sz="1200" dirty="0"/>
+              <a:t>X: </a:t>
+            </a:r>
+            <a:r>
+              <a:rPr lang="en-CA" sz="1200" dirty="0" smtClean="0"/>
+              <a:t>mandiblePlane0(Y) </a:t>
+            </a:r>
+            <a:r>
+              <a:rPr lang="en-US" sz="1200" dirty="0">
+                <a:sym typeface="Wingdings 2" panose="05020102010507070707" pitchFamily="18" charset="2"/>
+              </a:rPr>
+              <a:t></a:t>
+            </a:r>
+            <a:r>
+              <a:rPr lang="en-CA" sz="1200" dirty="0" smtClean="0"/>
+              <a:t> Z</a:t>
+            </a:r>
+            <a:endParaRPr lang="en-CA" sz="1200" dirty="0"/>
+          </a:p>
+          <a:p>
+            <a:pPr marL="171450" indent="-171450">
+              <a:buFontTx/>
+              <a:buChar char="-"/>
+            </a:pPr>
+            <a:r>
+              <a:rPr lang="en-CA" sz="1200" dirty="0" smtClean="0"/>
+              <a:t>   Y: Z </a:t>
+            </a:r>
+            <a:r>
+              <a:rPr lang="en-US" sz="1200" dirty="0" smtClean="0">
+                <a:sym typeface="Wingdings 2" panose="05020102010507070707" pitchFamily="18" charset="2"/>
+              </a:rPr>
+              <a:t> X</a:t>
+            </a:r>
+            <a:endParaRPr lang="en-CA" sz="1200" dirty="0" smtClean="0"/>
+          </a:p>
+          <a:p>
+            <a:pPr marL="171450" indent="-171450">
+              <a:buFontTx/>
+              <a:buChar char="-"/>
+            </a:pPr>
+            <a:r>
+              <a:rPr lang="en-CA" sz="1200" dirty="0" smtClean="0"/>
+              <a:t>   Z: </a:t>
+            </a:r>
+            <a:r>
+              <a:rPr lang="en-US" sz="1200" dirty="0" smtClean="0"/>
+              <a:t>mandibleLine0 direction</a:t>
+            </a:r>
+          </a:p>
+          <a:p>
+            <a:pPr marL="171450" indent="-171450">
+              <a:buFontTx/>
+              <a:buChar char="-"/>
+            </a:pPr>
+            <a:endParaRPr lang="es-MX" sz="1200" dirty="0"/>
+          </a:p>
+          <a:p>
+            <a:r>
+              <a:rPr lang="es-MX" sz="1200" dirty="0" err="1" smtClean="0"/>
+              <a:t>middleAxis</a:t>
+            </a:r>
+            <a:r>
+              <a:rPr lang="es-MX" sz="1200" dirty="0" smtClean="0"/>
+              <a:t>:</a:t>
+            </a:r>
+            <a:endParaRPr lang="en-US" sz="1200" dirty="0"/>
+          </a:p>
+          <a:p>
+            <a:pPr marL="171450" indent="-171450">
+              <a:buFontTx/>
+              <a:buChar char="-"/>
+            </a:pPr>
+            <a:r>
+              <a:rPr lang="es-MX" sz="1200" dirty="0"/>
+              <a:t>   </a:t>
+            </a:r>
+            <a:r>
+              <a:rPr lang="es-MX" sz="1200" dirty="0" err="1"/>
+              <a:t>Origin</a:t>
+            </a:r>
+            <a:r>
+              <a:rPr lang="es-MX" sz="1200" dirty="0"/>
+              <a:t>: </a:t>
+            </a:r>
+            <a:r>
+              <a:rPr lang="es-MX" sz="1200" dirty="0" smtClean="0"/>
+              <a:t>MandiblePlane1Origin</a:t>
+            </a:r>
+            <a:endParaRPr lang="es-MX" sz="1200" dirty="0"/>
+          </a:p>
+          <a:p>
+            <a:pPr marL="171450" indent="-171450">
+              <a:buFontTx/>
+              <a:buChar char="-"/>
+            </a:pPr>
+            <a:r>
+              <a:rPr lang="en-CA" sz="1200" dirty="0"/>
+              <a:t>   X: mandiblePlane0(Y) </a:t>
+            </a:r>
+            <a:r>
+              <a:rPr lang="en-US" sz="1200" dirty="0">
+                <a:sym typeface="Wingdings 2" panose="05020102010507070707" pitchFamily="18" charset="2"/>
+              </a:rPr>
+              <a:t></a:t>
+            </a:r>
+            <a:r>
+              <a:rPr lang="en-CA" sz="1200" dirty="0"/>
+              <a:t> Z</a:t>
+            </a:r>
+          </a:p>
+          <a:p>
+            <a:pPr marL="171450" indent="-171450">
+              <a:buFontTx/>
+              <a:buChar char="-"/>
+            </a:pPr>
+            <a:r>
+              <a:rPr lang="en-CA" sz="1200" dirty="0"/>
+              <a:t>   Y: Z </a:t>
+            </a:r>
+            <a:r>
+              <a:rPr lang="en-US" sz="1200" dirty="0">
+                <a:sym typeface="Wingdings 2" panose="05020102010507070707" pitchFamily="18" charset="2"/>
+              </a:rPr>
+              <a:t> X</a:t>
+            </a:r>
+            <a:endParaRPr lang="en-CA" sz="1200" dirty="0"/>
+          </a:p>
+          <a:p>
+            <a:pPr marL="171450" indent="-171450">
+              <a:buFontTx/>
+              <a:buChar char="-"/>
+            </a:pPr>
+            <a:r>
+              <a:rPr lang="en-CA" sz="1200" dirty="0"/>
+              <a:t>   Z: </a:t>
+            </a:r>
+            <a:r>
+              <a:rPr lang="en-CA" sz="1200" dirty="0" smtClean="0"/>
+              <a:t>(</a:t>
+            </a:r>
+            <a:r>
+              <a:rPr lang="en-US" sz="1200" dirty="0"/>
+              <a:t>m</a:t>
+            </a:r>
+            <a:r>
+              <a:rPr lang="en-US" sz="1200" dirty="0" smtClean="0"/>
+              <a:t>andibleLine0 </a:t>
+            </a:r>
+            <a:r>
+              <a:rPr lang="en-US" sz="1200" dirty="0" smtClean="0"/>
+              <a:t>+ </a:t>
+            </a:r>
+            <a:r>
+              <a:rPr lang="en-US" sz="1200" dirty="0"/>
+              <a:t>m</a:t>
+            </a:r>
+            <a:r>
+              <a:rPr lang="en-US" sz="1200" dirty="0" smtClean="0"/>
+              <a:t>andibleLine1</a:t>
+            </a:r>
+            <a:r>
+              <a:rPr lang="en-US" sz="1200" dirty="0" smtClean="0"/>
+              <a:t>) direction</a:t>
+            </a:r>
+            <a:endParaRPr lang="en-US" sz="1200" dirty="0"/>
+          </a:p>
+        </p:txBody>
+      </p:sp>
+      <p:sp>
+        <p:nvSpPr>
+          <p:cNvPr id="26" name="CuadroTexto 25"/>
+          <p:cNvSpPr txBox="1"/>
+          <p:nvPr/>
+        </p:nvSpPr>
+        <p:spPr>
+          <a:xfrm>
+            <a:off x="6551186" y="878404"/>
+            <a:ext cx="5381734" cy="461665"/>
+          </a:xfrm>
+          <a:prstGeom prst="rect">
+            <a:avLst/>
+          </a:prstGeom>
+          <a:noFill/>
+        </p:spPr>
+        <p:txBody>
+          <a:bodyPr wrap="square" rtlCol="0">
+            <a:spAutoFit/>
+          </a:bodyPr>
+          <a:lstStyle/>
+          <a:p>
+            <a:r>
+              <a:rPr lang="en-US" sz="1200" b="1" dirty="0" err="1"/>
+              <a:t>mandibularPlanesList</a:t>
+            </a:r>
+            <a:r>
+              <a:rPr lang="en-US" sz="1200" dirty="0"/>
+              <a:t> = [MandiblePlane0, MandiblePlane1, </a:t>
+            </a:r>
+            <a:r>
+              <a:rPr lang="en-US" sz="1200" dirty="0" smtClean="0"/>
+              <a:t>…]</a:t>
+            </a:r>
+          </a:p>
+          <a:p>
+            <a:r>
+              <a:rPr lang="en-US" sz="1200" b="1" dirty="0" err="1" smtClean="0"/>
+              <a:t>fibulaPlanesList</a:t>
+            </a:r>
+            <a:r>
+              <a:rPr lang="en-US" sz="1200" dirty="0" smtClean="0"/>
+              <a:t> = [FibulaPlane0A, FibulaPlane0B, FibulaPlane1A, FibulaPlane0B, …]</a:t>
+            </a:r>
+          </a:p>
+        </p:txBody>
+      </p:sp>
       <p:cxnSp>
         <p:nvCxnSpPr>
-          <p:cNvPr id="100" name="Straight Arrow Connector 119">
-            <a:extLst>
-              <a:ext uri="{FF2B5EF4-FFF2-40B4-BE49-F238E27FC236}">
-                <a16:creationId xmlns:a16="http://schemas.microsoft.com/office/drawing/2014/main" id="{5BA44D8D-057F-4BEC-898B-87CAA2D783B4}"/>
+          <p:cNvPr id="68" name="Straight Arrow Connector 118">
+            <a:extLst>
+              <a:ext uri="{FF2B5EF4-FFF2-40B4-BE49-F238E27FC236}">
+                <a16:creationId xmlns:a16="http://schemas.microsoft.com/office/drawing/2014/main" id="{FC98052C-FA17-4960-BC9F-16495541E170}"/>
               </a:ext>
             </a:extLst>
           </p:cNvPr>
@@ -12416,9 +11619,9 @@
           <p:nvPr/>
         </p:nvCxnSpPr>
         <p:spPr>
-          <a:xfrm flipV="1">
-            <a:off x="2792715" y="1541927"/>
-            <a:ext cx="351140" cy="473930"/>
+          <a:xfrm>
+            <a:off x="3987731" y="2792427"/>
+            <a:ext cx="536550" cy="197802"/>
           </a:xfrm>
           <a:prstGeom prst="straightConnector1">
             <a:avLst/>
@@ -12445,223 +11648,12 @@
           </a:fontRef>
         </p:style>
       </p:cxnSp>
-      <p:sp>
-        <p:nvSpPr>
-          <p:cNvPr id="101" name="TextBox 121">
-            <a:extLst>
-              <a:ext uri="{FF2B5EF4-FFF2-40B4-BE49-F238E27FC236}">
-                <a16:creationId xmlns:a16="http://schemas.microsoft.com/office/drawing/2014/main" id="{D4C9D527-4D57-4714-AC9A-80811DEB6CE7}"/>
-              </a:ext>
-            </a:extLst>
-          </p:cNvPr>
-          <p:cNvSpPr txBox="1"/>
-          <p:nvPr/>
-        </p:nvSpPr>
-        <p:spPr>
-          <a:xfrm>
-            <a:off x="3009151" y="2202993"/>
-            <a:ext cx="892184" cy="369332"/>
-          </a:xfrm>
-          <a:prstGeom prst="rect">
-            <a:avLst/>
-          </a:prstGeom>
-          <a:noFill/>
-        </p:spPr>
-        <p:txBody>
-          <a:bodyPr wrap="square" rtlCol="0">
-            <a:spAutoFit/>
-          </a:bodyPr>
-          <a:lstStyle/>
-          <a:p>
-            <a:r>
-              <a:rPr lang="en-US" b="1" i="1" dirty="0">
-                <a:solidFill>
-                  <a:srgbClr val="7030A0"/>
-                </a:solidFill>
-              </a:rPr>
-              <a:t>z</a:t>
-            </a:r>
-            <a:endParaRPr lang="en-CA" b="1" i="1" dirty="0">
-              <a:solidFill>
-                <a:srgbClr val="7030A0"/>
-              </a:solidFill>
-            </a:endParaRPr>
-          </a:p>
-        </p:txBody>
-      </p:sp>
-      <p:sp>
-        <p:nvSpPr>
-          <p:cNvPr id="102" name="TextBox 122">
-            <a:extLst>
-              <a:ext uri="{FF2B5EF4-FFF2-40B4-BE49-F238E27FC236}">
-                <a16:creationId xmlns:a16="http://schemas.microsoft.com/office/drawing/2014/main" id="{EF0B52AD-218E-4C03-8ED3-90B140F96951}"/>
-              </a:ext>
-            </a:extLst>
-          </p:cNvPr>
-          <p:cNvSpPr txBox="1"/>
-          <p:nvPr/>
-        </p:nvSpPr>
-        <p:spPr>
-          <a:xfrm>
-            <a:off x="2628981" y="1129865"/>
-            <a:ext cx="892184" cy="369332"/>
-          </a:xfrm>
-          <a:prstGeom prst="rect">
-            <a:avLst/>
-          </a:prstGeom>
-          <a:noFill/>
-        </p:spPr>
-        <p:txBody>
-          <a:bodyPr wrap="square" rtlCol="0">
-            <a:spAutoFit/>
-          </a:bodyPr>
-          <a:lstStyle/>
-          <a:p>
-            <a:r>
-              <a:rPr lang="en-US" b="1" i="1" dirty="0">
-                <a:solidFill>
-                  <a:srgbClr val="7030A0"/>
-                </a:solidFill>
-              </a:rPr>
-              <a:t>y</a:t>
-            </a:r>
-            <a:endParaRPr lang="en-CA" b="1" i="1" dirty="0">
-              <a:solidFill>
-                <a:srgbClr val="7030A0"/>
-              </a:solidFill>
-            </a:endParaRPr>
-          </a:p>
-        </p:txBody>
-      </p:sp>
-      <p:sp>
-        <p:nvSpPr>
-          <p:cNvPr id="103" name="TextBox 123">
-            <a:extLst>
-              <a:ext uri="{FF2B5EF4-FFF2-40B4-BE49-F238E27FC236}">
-                <a16:creationId xmlns:a16="http://schemas.microsoft.com/office/drawing/2014/main" id="{70229F0B-70DD-4C64-AABA-D33B6AB17DA9}"/>
-              </a:ext>
-            </a:extLst>
-          </p:cNvPr>
-          <p:cNvSpPr txBox="1"/>
-          <p:nvPr/>
-        </p:nvSpPr>
-        <p:spPr>
-          <a:xfrm>
-            <a:off x="3027082" y="1273330"/>
-            <a:ext cx="892184" cy="369332"/>
-          </a:xfrm>
-          <a:prstGeom prst="rect">
-            <a:avLst/>
-          </a:prstGeom>
-          <a:noFill/>
-        </p:spPr>
-        <p:txBody>
-          <a:bodyPr wrap="square" rtlCol="0">
-            <a:spAutoFit/>
-          </a:bodyPr>
-          <a:lstStyle/>
-          <a:p>
-            <a:r>
-              <a:rPr lang="en-US" b="1" i="1" dirty="0">
-                <a:solidFill>
-                  <a:srgbClr val="7030A0"/>
-                </a:solidFill>
-              </a:rPr>
-              <a:t>x</a:t>
-            </a:r>
-            <a:endParaRPr lang="en-CA" b="1" i="1" dirty="0">
-              <a:solidFill>
-                <a:srgbClr val="7030A0"/>
-              </a:solidFill>
-            </a:endParaRPr>
-          </a:p>
-        </p:txBody>
-      </p:sp>
-      <p:sp>
-        <p:nvSpPr>
-          <p:cNvPr id="105" name="TextBox 122">
-            <a:extLst>
-              <a:ext uri="{FF2B5EF4-FFF2-40B4-BE49-F238E27FC236}">
-                <a16:creationId xmlns:a16="http://schemas.microsoft.com/office/drawing/2014/main" id="{EF0B52AD-218E-4C03-8ED3-90B140F96951}"/>
-              </a:ext>
-            </a:extLst>
-          </p:cNvPr>
-          <p:cNvSpPr txBox="1"/>
-          <p:nvPr/>
-        </p:nvSpPr>
-        <p:spPr>
-          <a:xfrm>
-            <a:off x="1981052" y="927738"/>
-            <a:ext cx="1611515" cy="276999"/>
-          </a:xfrm>
-          <a:prstGeom prst="rect">
-            <a:avLst/>
-          </a:prstGeom>
-          <a:noFill/>
-        </p:spPr>
-        <p:txBody>
-          <a:bodyPr wrap="square" rtlCol="0">
-            <a:spAutoFit/>
-          </a:bodyPr>
-          <a:lstStyle/>
-          <a:p>
-            <a:r>
-              <a:rPr lang="es-MX" sz="1200" b="1" i="1" dirty="0" smtClean="0">
-                <a:solidFill>
-                  <a:srgbClr val="7030A0"/>
-                </a:solidFill>
-              </a:rPr>
-              <a:t>mandibleAxis0</a:t>
-            </a:r>
-            <a:endParaRPr lang="en-CA" sz="1200" b="1" i="1" dirty="0">
-              <a:solidFill>
-                <a:srgbClr val="7030A0"/>
-              </a:solidFill>
-            </a:endParaRPr>
-          </a:p>
-        </p:txBody>
-      </p:sp>
-      <p:sp>
-        <p:nvSpPr>
-          <p:cNvPr id="106" name="Rectángulo 105"/>
-          <p:cNvSpPr/>
-          <p:nvPr/>
-        </p:nvSpPr>
-        <p:spPr>
-          <a:xfrm>
-            <a:off x="7511971" y="264201"/>
-            <a:ext cx="3405654" cy="276999"/>
-          </a:xfrm>
-          <a:prstGeom prst="rect">
-            <a:avLst/>
-          </a:prstGeom>
-        </p:spPr>
-        <p:txBody>
-          <a:bodyPr wrap="square">
-            <a:spAutoFit/>
-          </a:bodyPr>
-          <a:lstStyle/>
-          <a:p>
-            <a:r>
-              <a:rPr lang="en-US" sz="1200" dirty="0" smtClean="0"/>
-              <a:t>rotationAxisZ0: MandibleAxis0(Z)</a:t>
-            </a:r>
-            <a:r>
-              <a:rPr lang="en-US" sz="1200" dirty="0" smtClean="0">
-                <a:sym typeface="Wingdings 2" panose="05020102010507070707" pitchFamily="18" charset="2"/>
-              </a:rPr>
-              <a:t>Fibula(Z)</a:t>
-            </a:r>
-            <a:endParaRPr lang="en-US" sz="1200" dirty="0"/>
-          </a:p>
-        </p:txBody>
-      </p:sp>
       <p:cxnSp>
         <p:nvCxnSpPr>
-          <p:cNvPr id="107" name="Straight Arrow Connector 4">
-            <a:extLst>
-              <a:ext uri="{FF2B5EF4-FFF2-40B4-BE49-F238E27FC236}">
-                <a16:creationId xmlns:a16="http://schemas.microsoft.com/office/drawing/2014/main" id="{2BF80858-B0B5-43F1-810D-74D41CDE740F}"/>
+          <p:cNvPr id="69" name="Straight Arrow Connector 119">
+            <a:extLst>
+              <a:ext uri="{FF2B5EF4-FFF2-40B4-BE49-F238E27FC236}">
+                <a16:creationId xmlns:a16="http://schemas.microsoft.com/office/drawing/2014/main" id="{5BA44D8D-057F-4BEC-898B-87CAA2D783B4}"/>
               </a:ext>
             </a:extLst>
           </p:cNvPr>
@@ -12672,15 +11664,15 @@
         </p:nvCxnSpPr>
         <p:spPr>
           <a:xfrm flipV="1">
-            <a:off x="8609153" y="2493209"/>
-            <a:ext cx="11050" cy="706542"/>
+            <a:off x="3985177" y="2351888"/>
+            <a:ext cx="198969" cy="459372"/>
           </a:xfrm>
           <a:prstGeom prst="straightConnector1">
             <a:avLst/>
           </a:prstGeom>
-          <a:ln w="57150">
+          <a:ln w="19050">
             <a:solidFill>
-              <a:schemeClr val="accent2"/>
+              <a:srgbClr val="7030A0"/>
             </a:solidFill>
             <a:tailEnd type="triangle"/>
           </a:ln>
@@ -12702,10 +11694,10 @@
       </p:cxnSp>
       <p:cxnSp>
         <p:nvCxnSpPr>
-          <p:cNvPr id="108" name="Straight Arrow Connector 5">
-            <a:extLst>
-              <a:ext uri="{FF2B5EF4-FFF2-40B4-BE49-F238E27FC236}">
-                <a16:creationId xmlns:a16="http://schemas.microsoft.com/office/drawing/2014/main" id="{E5F1016B-F8E5-4633-A114-37383DB9B03F}"/>
+          <p:cNvPr id="74" name="Straight Arrow Connector 117">
+            <a:extLst>
+              <a:ext uri="{FF2B5EF4-FFF2-40B4-BE49-F238E27FC236}">
+                <a16:creationId xmlns:a16="http://schemas.microsoft.com/office/drawing/2014/main" id="{B81822DE-625D-4F1E-91D1-8BC5ABBA5B41}"/>
               </a:ext>
             </a:extLst>
           </p:cNvPr>
@@ -12715,16 +11707,228 @@
           <p:nvPr/>
         </p:nvCxnSpPr>
         <p:spPr>
-          <a:xfrm>
-            <a:off x="8585770" y="3213766"/>
-            <a:ext cx="795302" cy="0"/>
+          <a:xfrm flipV="1">
+            <a:off x="4004581" y="2277126"/>
+            <a:ext cx="10684" cy="574293"/>
           </a:xfrm>
           <a:prstGeom prst="straightConnector1">
             <a:avLst/>
           </a:prstGeom>
-          <a:ln w="57150">
+          <a:ln w="19050">
             <a:solidFill>
-              <a:schemeClr val="accent2"/>
+              <a:srgbClr val="7030A0"/>
+            </a:solidFill>
+            <a:tailEnd type="triangle"/>
+          </a:ln>
+        </p:spPr>
+        <p:style>
+          <a:lnRef idx="1">
+            <a:schemeClr val="accent1"/>
+          </a:lnRef>
+          <a:fillRef idx="0">
+            <a:schemeClr val="accent1"/>
+          </a:fillRef>
+          <a:effectRef idx="0">
+            <a:schemeClr val="accent1"/>
+          </a:effectRef>
+          <a:fontRef idx="minor">
+            <a:schemeClr val="tx1"/>
+          </a:fontRef>
+        </p:style>
+      </p:cxnSp>
+      <p:sp>
+        <p:nvSpPr>
+          <p:cNvPr id="76" name="TextBox 122">
+            <a:extLst>
+              <a:ext uri="{FF2B5EF4-FFF2-40B4-BE49-F238E27FC236}">
+                <a16:creationId xmlns:a16="http://schemas.microsoft.com/office/drawing/2014/main" id="{EF0B52AD-218E-4C03-8ED3-90B140F96951}"/>
+              </a:ext>
+            </a:extLst>
+          </p:cNvPr>
+          <p:cNvSpPr txBox="1"/>
+          <p:nvPr/>
+        </p:nvSpPr>
+        <p:spPr>
+          <a:xfrm>
+            <a:off x="3776645" y="2036502"/>
+            <a:ext cx="892184" cy="369332"/>
+          </a:xfrm>
+          <a:prstGeom prst="rect">
+            <a:avLst/>
+          </a:prstGeom>
+          <a:noFill/>
+        </p:spPr>
+        <p:txBody>
+          <a:bodyPr wrap="square" rtlCol="0">
+            <a:spAutoFit/>
+          </a:bodyPr>
+          <a:lstStyle/>
+          <a:p>
+            <a:r>
+              <a:rPr lang="en-US" b="1" i="1" dirty="0">
+                <a:solidFill>
+                  <a:srgbClr val="7030A0"/>
+                </a:solidFill>
+              </a:rPr>
+              <a:t>y</a:t>
+            </a:r>
+            <a:endParaRPr lang="en-CA" b="1" i="1" dirty="0">
+              <a:solidFill>
+                <a:srgbClr val="7030A0"/>
+              </a:solidFill>
+            </a:endParaRPr>
+          </a:p>
+        </p:txBody>
+      </p:sp>
+      <p:sp>
+        <p:nvSpPr>
+          <p:cNvPr id="77" name="TextBox 123">
+            <a:extLst>
+              <a:ext uri="{FF2B5EF4-FFF2-40B4-BE49-F238E27FC236}">
+                <a16:creationId xmlns:a16="http://schemas.microsoft.com/office/drawing/2014/main" id="{70229F0B-70DD-4C64-AABA-D33B6AB17DA9}"/>
+              </a:ext>
+            </a:extLst>
+          </p:cNvPr>
+          <p:cNvSpPr txBox="1"/>
+          <p:nvPr/>
+        </p:nvSpPr>
+        <p:spPr>
+          <a:xfrm>
+            <a:off x="4126682" y="2179741"/>
+            <a:ext cx="892184" cy="369332"/>
+          </a:xfrm>
+          <a:prstGeom prst="rect">
+            <a:avLst/>
+          </a:prstGeom>
+          <a:noFill/>
+        </p:spPr>
+        <p:txBody>
+          <a:bodyPr wrap="square" rtlCol="0">
+            <a:spAutoFit/>
+          </a:bodyPr>
+          <a:lstStyle/>
+          <a:p>
+            <a:r>
+              <a:rPr lang="en-US" b="1" i="1" dirty="0">
+                <a:solidFill>
+                  <a:srgbClr val="7030A0"/>
+                </a:solidFill>
+              </a:rPr>
+              <a:t>x</a:t>
+            </a:r>
+            <a:endParaRPr lang="en-CA" b="1" i="1" dirty="0">
+              <a:solidFill>
+                <a:srgbClr val="7030A0"/>
+              </a:solidFill>
+            </a:endParaRPr>
+          </a:p>
+        </p:txBody>
+      </p:sp>
+      <p:sp>
+        <p:nvSpPr>
+          <p:cNvPr id="78" name="TextBox 121">
+            <a:extLst>
+              <a:ext uri="{FF2B5EF4-FFF2-40B4-BE49-F238E27FC236}">
+                <a16:creationId xmlns:a16="http://schemas.microsoft.com/office/drawing/2014/main" id="{D4C9D527-4D57-4714-AC9A-80811DEB6CE7}"/>
+              </a:ext>
+            </a:extLst>
+          </p:cNvPr>
+          <p:cNvSpPr txBox="1"/>
+          <p:nvPr/>
+        </p:nvSpPr>
+        <p:spPr>
+          <a:xfrm>
+            <a:off x="4438867" y="2777272"/>
+            <a:ext cx="235475" cy="369332"/>
+          </a:xfrm>
+          <a:prstGeom prst="rect">
+            <a:avLst/>
+          </a:prstGeom>
+          <a:noFill/>
+        </p:spPr>
+        <p:txBody>
+          <a:bodyPr wrap="square" rtlCol="0">
+            <a:spAutoFit/>
+          </a:bodyPr>
+          <a:lstStyle/>
+          <a:p>
+            <a:r>
+              <a:rPr lang="en-US" b="1" i="1" dirty="0">
+                <a:solidFill>
+                  <a:srgbClr val="7030A0"/>
+                </a:solidFill>
+              </a:rPr>
+              <a:t>z</a:t>
+            </a:r>
+            <a:endParaRPr lang="en-CA" b="1" i="1" dirty="0">
+              <a:solidFill>
+                <a:srgbClr val="7030A0"/>
+              </a:solidFill>
+            </a:endParaRPr>
+          </a:p>
+        </p:txBody>
+      </p:sp>
+      <p:sp>
+        <p:nvSpPr>
+          <p:cNvPr id="79" name="TextBox 122">
+            <a:extLst>
+              <a:ext uri="{FF2B5EF4-FFF2-40B4-BE49-F238E27FC236}">
+                <a16:creationId xmlns:a16="http://schemas.microsoft.com/office/drawing/2014/main" id="{EF0B52AD-218E-4C03-8ED3-90B140F96951}"/>
+              </a:ext>
+            </a:extLst>
+          </p:cNvPr>
+          <p:cNvSpPr txBox="1"/>
+          <p:nvPr/>
+        </p:nvSpPr>
+        <p:spPr>
+          <a:xfrm>
+            <a:off x="3760052" y="1903271"/>
+            <a:ext cx="1611515" cy="276999"/>
+          </a:xfrm>
+          <a:prstGeom prst="rect">
+            <a:avLst/>
+          </a:prstGeom>
+          <a:noFill/>
+        </p:spPr>
+        <p:txBody>
+          <a:bodyPr wrap="square" rtlCol="0">
+            <a:spAutoFit/>
+          </a:bodyPr>
+          <a:lstStyle/>
+          <a:p>
+            <a:r>
+              <a:rPr lang="es-MX" sz="1200" b="1" i="1" dirty="0" err="1" smtClean="0">
+                <a:solidFill>
+                  <a:srgbClr val="7030A0"/>
+                </a:solidFill>
+              </a:rPr>
+              <a:t>middleAxis</a:t>
+            </a:r>
+            <a:endParaRPr lang="en-CA" sz="1200" b="1" i="1" dirty="0">
+              <a:solidFill>
+                <a:srgbClr val="7030A0"/>
+              </a:solidFill>
+            </a:endParaRPr>
+          </a:p>
+        </p:txBody>
+      </p:sp>
+      <p:cxnSp>
+        <p:nvCxnSpPr>
+          <p:cNvPr id="14" name="Conector recto de flecha 13"/>
+          <p:cNvCxnSpPr/>
+          <p:nvPr/>
+        </p:nvCxnSpPr>
+        <p:spPr>
+          <a:xfrm>
+            <a:off x="2823817" y="1990368"/>
+            <a:ext cx="1169901" cy="814492"/>
+          </a:xfrm>
+          <a:prstGeom prst="straightConnector1">
+            <a:avLst/>
+          </a:prstGeom>
+          <a:ln w="38100">
+            <a:solidFill>
+              <a:srgbClr val="FF0000"/>
             </a:solidFill>
             <a:tailEnd type="triangle"/>
           </a:ln>
@@ -12746,10 +11950,10 @@
       </p:cxnSp>
       <p:cxnSp>
         <p:nvCxnSpPr>
-          <p:cNvPr id="109" name="Straight Arrow Connector 6">
-            <a:extLst>
-              <a:ext uri="{FF2B5EF4-FFF2-40B4-BE49-F238E27FC236}">
-                <a16:creationId xmlns:a16="http://schemas.microsoft.com/office/drawing/2014/main" id="{328E6B06-8935-47F4-98E0-065853C77A65}"/>
+          <p:cNvPr id="99" name="Straight Arrow Connector 118">
+            <a:extLst>
+              <a:ext uri="{FF2B5EF4-FFF2-40B4-BE49-F238E27FC236}">
+                <a16:creationId xmlns:a16="http://schemas.microsoft.com/office/drawing/2014/main" id="{FC98052C-FA17-4960-BC9F-16495541E170}"/>
               </a:ext>
             </a:extLst>
           </p:cNvPr>
@@ -12759,190 +11963,14 @@
           <p:nvPr/>
         </p:nvCxnSpPr>
         <p:spPr>
-          <a:xfrm flipV="1">
-            <a:off x="8620204" y="2769109"/>
-            <a:ext cx="409865" cy="444658"/>
+          <a:xfrm>
+            <a:off x="2806383" y="1999136"/>
+            <a:ext cx="451780" cy="318096"/>
           </a:xfrm>
           <a:prstGeom prst="straightConnector1">
             <a:avLst/>
           </a:prstGeom>
-          <a:ln w="57150">
-            <a:solidFill>
-              <a:schemeClr val="accent2"/>
-            </a:solidFill>
-            <a:tailEnd type="triangle"/>
-          </a:ln>
-        </p:spPr>
-        <p:style>
-          <a:lnRef idx="1">
-            <a:schemeClr val="accent1"/>
-          </a:lnRef>
-          <a:fillRef idx="0">
-            <a:schemeClr val="accent1"/>
-          </a:fillRef>
-          <a:effectRef idx="0">
-            <a:schemeClr val="accent1"/>
-          </a:effectRef>
-          <a:fontRef idx="minor">
-            <a:schemeClr val="tx1"/>
-          </a:fontRef>
-        </p:style>
-      </p:cxnSp>
-      <p:sp>
-        <p:nvSpPr>
-          <p:cNvPr id="110" name="TextBox 8">
-            <a:extLst>
-              <a:ext uri="{FF2B5EF4-FFF2-40B4-BE49-F238E27FC236}">
-                <a16:creationId xmlns:a16="http://schemas.microsoft.com/office/drawing/2014/main" id="{5ED54DD2-8B22-4BEC-BE32-A5D48A03E50B}"/>
-              </a:ext>
-            </a:extLst>
-          </p:cNvPr>
-          <p:cNvSpPr txBox="1"/>
-          <p:nvPr/>
-        </p:nvSpPr>
-        <p:spPr>
-          <a:xfrm>
-            <a:off x="9218008" y="2882469"/>
-            <a:ext cx="300021" cy="369332"/>
-          </a:xfrm>
-          <a:prstGeom prst="rect">
-            <a:avLst/>
-          </a:prstGeom>
-          <a:noFill/>
-        </p:spPr>
-        <p:txBody>
-          <a:bodyPr wrap="square" rtlCol="0">
-            <a:spAutoFit/>
-          </a:bodyPr>
-          <a:lstStyle/>
-          <a:p>
-            <a:r>
-              <a:rPr lang="en-US" b="1" i="1" dirty="0">
-                <a:solidFill>
-                  <a:schemeClr val="accent2"/>
-                </a:solidFill>
-              </a:rPr>
-              <a:t>z</a:t>
-            </a:r>
-            <a:endParaRPr lang="en-CA" b="1" i="1" dirty="0">
-              <a:solidFill>
-                <a:schemeClr val="accent2"/>
-              </a:solidFill>
-            </a:endParaRPr>
-          </a:p>
-        </p:txBody>
-      </p:sp>
-      <p:sp>
-        <p:nvSpPr>
-          <p:cNvPr id="111" name="TextBox 9">
-            <a:extLst>
-              <a:ext uri="{FF2B5EF4-FFF2-40B4-BE49-F238E27FC236}">
-                <a16:creationId xmlns:a16="http://schemas.microsoft.com/office/drawing/2014/main" id="{B967C052-BC97-4706-B318-230369DB1023}"/>
-              </a:ext>
-            </a:extLst>
-          </p:cNvPr>
-          <p:cNvSpPr txBox="1"/>
-          <p:nvPr/>
-        </p:nvSpPr>
-        <p:spPr>
-          <a:xfrm>
-            <a:off x="8314883" y="2308543"/>
-            <a:ext cx="264254" cy="369332"/>
-          </a:xfrm>
-          <a:prstGeom prst="rect">
-            <a:avLst/>
-          </a:prstGeom>
-          <a:noFill/>
-        </p:spPr>
-        <p:txBody>
-          <a:bodyPr wrap="square" rtlCol="0">
-            <a:spAutoFit/>
-          </a:bodyPr>
-          <a:lstStyle/>
-          <a:p>
-            <a:r>
-              <a:rPr lang="en-US" b="1" i="1" dirty="0">
-                <a:solidFill>
-                  <a:schemeClr val="accent2"/>
-                </a:solidFill>
-              </a:rPr>
-              <a:t>y</a:t>
-            </a:r>
-            <a:endParaRPr lang="en-CA" b="1" i="1" dirty="0">
-              <a:solidFill>
-                <a:schemeClr val="accent2"/>
-              </a:solidFill>
-            </a:endParaRPr>
-          </a:p>
-        </p:txBody>
-      </p:sp>
-      <p:sp>
-        <p:nvSpPr>
-          <p:cNvPr id="112" name="TextBox 10">
-            <a:extLst>
-              <a:ext uri="{FF2B5EF4-FFF2-40B4-BE49-F238E27FC236}">
-                <a16:creationId xmlns:a16="http://schemas.microsoft.com/office/drawing/2014/main" id="{2928FB2F-3B8B-4CBE-8A99-A3DF8CD84CA3}"/>
-              </a:ext>
-            </a:extLst>
-          </p:cNvPr>
-          <p:cNvSpPr txBox="1"/>
-          <p:nvPr/>
-        </p:nvSpPr>
-        <p:spPr>
-          <a:xfrm>
-            <a:off x="8882714" y="2479553"/>
-            <a:ext cx="278720" cy="369332"/>
-          </a:xfrm>
-          <a:prstGeom prst="rect">
-            <a:avLst/>
-          </a:prstGeom>
-          <a:noFill/>
-        </p:spPr>
-        <p:txBody>
-          <a:bodyPr wrap="square" rtlCol="0">
-            <a:spAutoFit/>
-          </a:bodyPr>
-          <a:lstStyle/>
-          <a:p>
-            <a:r>
-              <a:rPr lang="en-US" b="1" i="1" dirty="0">
-                <a:solidFill>
-                  <a:schemeClr val="accent2"/>
-                </a:solidFill>
-              </a:rPr>
-              <a:t>x</a:t>
-            </a:r>
-            <a:endParaRPr lang="en-CA" b="1" i="1" dirty="0">
-              <a:solidFill>
-                <a:schemeClr val="accent2"/>
-              </a:solidFill>
-            </a:endParaRPr>
-          </a:p>
-        </p:txBody>
-      </p:sp>
-      <p:cxnSp>
-        <p:nvCxnSpPr>
-          <p:cNvPr id="114" name="Straight Arrow Connector 5">
-            <a:extLst>
-              <a:ext uri="{FF2B5EF4-FFF2-40B4-BE49-F238E27FC236}">
-                <a16:creationId xmlns:a16="http://schemas.microsoft.com/office/drawing/2014/main" id="{E5F1016B-F8E5-4633-A114-37383DB9B03F}"/>
-              </a:ext>
-            </a:extLst>
-          </p:cNvPr>
-          <p:cNvCxnSpPr>
-            <a:cxnSpLocks/>
-          </p:cNvCxnSpPr>
-          <p:nvPr/>
-        </p:nvCxnSpPr>
-        <p:spPr>
-          <a:xfrm>
-            <a:off x="8579137" y="3270202"/>
-            <a:ext cx="795302" cy="0"/>
-          </a:xfrm>
-          <a:prstGeom prst="straightConnector1">
-            <a:avLst/>
-          </a:prstGeom>
-          <a:ln w="57150">
+          <a:ln w="19050">
             <a:solidFill>
               <a:srgbClr val="7030A0"/>
             </a:solidFill>
@@ -12966,29 +11994,21 @@
       </p:cxnSp>
       <p:cxnSp>
         <p:nvCxnSpPr>
-          <p:cNvPr id="115" name="Straight Arrow Connector 6">
-            <a:extLst>
-              <a:ext uri="{FF2B5EF4-FFF2-40B4-BE49-F238E27FC236}">
-                <a16:creationId xmlns:a16="http://schemas.microsoft.com/office/drawing/2014/main" id="{328E6B06-8935-47F4-98E0-065853C77A65}"/>
-              </a:ext>
-            </a:extLst>
-          </p:cNvPr>
-          <p:cNvCxnSpPr>
-            <a:cxnSpLocks/>
-          </p:cNvCxnSpPr>
+          <p:cNvPr id="80" name="Conector recto de flecha 79"/>
+          <p:cNvCxnSpPr/>
           <p:nvPr/>
         </p:nvCxnSpPr>
         <p:spPr>
-          <a:xfrm flipV="1">
-            <a:off x="8609471" y="2971322"/>
-            <a:ext cx="551963" cy="292301"/>
+          <a:xfrm>
+            <a:off x="2343232" y="5389361"/>
+            <a:ext cx="1149929" cy="8254"/>
           </a:xfrm>
           <a:prstGeom prst="straightConnector1">
             <a:avLst/>
           </a:prstGeom>
-          <a:ln w="57150">
+          <a:ln w="38100">
             <a:solidFill>
-              <a:srgbClr val="7030A0"/>
+              <a:srgbClr val="FF0000"/>
             </a:solidFill>
             <a:tailEnd type="triangle"/>
           </a:ln>
@@ -13010,30 +12030,19 @@
       </p:cxnSp>
       <p:cxnSp>
         <p:nvCxnSpPr>
-          <p:cNvPr id="116" name="Straight Arrow Connector 4">
-            <a:extLst>
-              <a:ext uri="{FF2B5EF4-FFF2-40B4-BE49-F238E27FC236}">
-                <a16:creationId xmlns:a16="http://schemas.microsoft.com/office/drawing/2014/main" id="{2BF80858-B0B5-43F1-810D-74D41CDE740F}"/>
-              </a:ext>
-            </a:extLst>
-          </p:cNvPr>
-          <p:cNvCxnSpPr>
-            <a:cxnSpLocks/>
-          </p:cNvCxnSpPr>
+          <p:cNvPr id="30" name="Conector recto de flecha 29"/>
+          <p:cNvCxnSpPr/>
           <p:nvPr/>
         </p:nvCxnSpPr>
         <p:spPr>
-          <a:xfrm flipV="1">
-            <a:off x="8606282" y="2616650"/>
-            <a:ext cx="211947" cy="627975"/>
+          <a:xfrm>
+            <a:off x="4015265" y="2777272"/>
+            <a:ext cx="1509235" cy="33988"/>
           </a:xfrm>
           <a:prstGeom prst="straightConnector1">
             <a:avLst/>
           </a:prstGeom>
-          <a:ln w="57150">
-            <a:solidFill>
-              <a:srgbClr val="7030A0"/>
-            </a:solidFill>
+          <a:ln w="38100">
             <a:tailEnd type="triangle"/>
           </a:ln>
         </p:spPr>
@@ -13052,189 +12061,22 @@
           </a:fontRef>
         </p:style>
       </p:cxnSp>
-      <p:sp>
-        <p:nvSpPr>
-          <p:cNvPr id="117" name="TextBox 8">
-            <a:extLst>
-              <a:ext uri="{FF2B5EF4-FFF2-40B4-BE49-F238E27FC236}">
-                <a16:creationId xmlns:a16="http://schemas.microsoft.com/office/drawing/2014/main" id="{5ED54DD2-8B22-4BEC-BE32-A5D48A03E50B}"/>
-              </a:ext>
-            </a:extLst>
-          </p:cNvPr>
-          <p:cNvSpPr txBox="1"/>
-          <p:nvPr/>
-        </p:nvSpPr>
+      <p:cxnSp>
+        <p:nvCxnSpPr>
+          <p:cNvPr id="87" name="Conector recto de flecha 86"/>
+          <p:cNvCxnSpPr/>
+          <p:nvPr/>
+        </p:nvCxnSpPr>
         <p:spPr>
           <a:xfrm>
-            <a:off x="9218008" y="3183979"/>
-            <a:ext cx="300021" cy="369332"/>
-          </a:xfrm>
-          <a:prstGeom prst="rect">
+            <a:off x="3602740" y="5406336"/>
+            <a:ext cx="1584891" cy="974"/>
+          </a:xfrm>
+          <a:prstGeom prst="straightConnector1">
             <a:avLst/>
           </a:prstGeom>
-          <a:noFill/>
-          <a:ln>
-            <a:noFill/>
-          </a:ln>
-        </p:spPr>
-        <p:txBody>
-          <a:bodyPr wrap="square" rtlCol="0">
-            <a:spAutoFit/>
-          </a:bodyPr>
-          <a:lstStyle/>
-          <a:p>
-            <a:r>
-              <a:rPr lang="en-US" b="1" i="1" dirty="0">
-                <a:solidFill>
-                  <a:srgbClr val="7030A0"/>
-                </a:solidFill>
-              </a:rPr>
-              <a:t>z</a:t>
-            </a:r>
-            <a:endParaRPr lang="en-CA" b="1" i="1" dirty="0">
-              <a:solidFill>
-                <a:srgbClr val="7030A0"/>
-              </a:solidFill>
-            </a:endParaRPr>
-          </a:p>
-        </p:txBody>
-      </p:sp>
-      <p:sp>
-        <p:nvSpPr>
-          <p:cNvPr id="43" name="Rectángulo 42"/>
-          <p:cNvSpPr/>
-          <p:nvPr/>
-        </p:nvSpPr>
-        <p:spPr>
-          <a:xfrm>
-            <a:off x="9097984" y="2745125"/>
-            <a:ext cx="290464" cy="369332"/>
-          </a:xfrm>
-          <a:prstGeom prst="rect">
-            <a:avLst/>
-          </a:prstGeom>
-          <a:ln>
-            <a:noFill/>
-          </a:ln>
-        </p:spPr>
-        <p:txBody>
-          <a:bodyPr wrap="none">
-            <a:spAutoFit/>
-          </a:bodyPr>
-          <a:lstStyle/>
-          <a:p>
-            <a:r>
-              <a:rPr lang="en-US" b="1" i="1" dirty="0">
-                <a:solidFill>
-                  <a:srgbClr val="7030A0"/>
-                </a:solidFill>
-              </a:rPr>
-              <a:t>x</a:t>
-            </a:r>
-            <a:endParaRPr lang="en-CA" b="1" i="1" dirty="0">
-              <a:solidFill>
-                <a:srgbClr val="7030A0"/>
-              </a:solidFill>
-            </a:endParaRPr>
-          </a:p>
-        </p:txBody>
-      </p:sp>
-      <p:sp>
-        <p:nvSpPr>
-          <p:cNvPr id="44" name="Rectángulo 43"/>
-          <p:cNvSpPr/>
-          <p:nvPr/>
-        </p:nvSpPr>
-        <p:spPr>
-          <a:xfrm>
-            <a:off x="8666557" y="2309552"/>
-            <a:ext cx="293670" cy="369332"/>
-          </a:xfrm>
-          <a:prstGeom prst="rect">
-            <a:avLst/>
-          </a:prstGeom>
-          <a:ln>
-            <a:noFill/>
-          </a:ln>
-        </p:spPr>
-        <p:txBody>
-          <a:bodyPr wrap="none">
-            <a:spAutoFit/>
-          </a:bodyPr>
-          <a:lstStyle/>
-          <a:p>
-            <a:r>
-              <a:rPr lang="en-US" b="1" i="1" dirty="0">
-                <a:solidFill>
-                  <a:srgbClr val="7030A0"/>
-                </a:solidFill>
-              </a:rPr>
-              <a:t>y</a:t>
-            </a:r>
-            <a:endParaRPr lang="en-CA" b="1" i="1" dirty="0">
-              <a:solidFill>
-                <a:srgbClr val="7030A0"/>
-              </a:solidFill>
-            </a:endParaRPr>
-          </a:p>
-        </p:txBody>
-      </p:sp>
-      <p:sp>
-        <p:nvSpPr>
-          <p:cNvPr id="126" name="Arco 125"/>
-          <p:cNvSpPr/>
-          <p:nvPr/>
-        </p:nvSpPr>
-        <p:spPr>
-          <a:xfrm>
-            <a:off x="8822415" y="2987443"/>
-            <a:ext cx="104775" cy="137097"/>
-          </a:xfrm>
-          <a:prstGeom prst="arc">
-            <a:avLst/>
-          </a:prstGeom>
-        </p:spPr>
-        <p:style>
-          <a:lnRef idx="2">
-            <a:schemeClr val="dk1"/>
-          </a:lnRef>
-          <a:fillRef idx="0">
-            <a:schemeClr val="dk1"/>
-          </a:fillRef>
-          <a:effectRef idx="1">
-            <a:schemeClr val="dk1"/>
-          </a:effectRef>
-          <a:fontRef idx="minor">
-            <a:schemeClr val="tx1"/>
-          </a:fontRef>
-        </p:style>
-        <p:txBody>
-          <a:bodyPr rtlCol="0" anchor="ctr"/>
-          <a:lstStyle/>
-          <a:p>
-            <a:pPr algn="ctr"/>
-            <a:endParaRPr lang="en-US"/>
-          </a:p>
-        </p:txBody>
-      </p:sp>
-      <p:cxnSp>
-        <p:nvCxnSpPr>
-          <p:cNvPr id="130" name="Conector recto 129"/>
-          <p:cNvCxnSpPr/>
-          <p:nvPr/>
-        </p:nvCxnSpPr>
-        <p:spPr>
-          <a:xfrm flipH="1">
-            <a:off x="8927190" y="2479553"/>
-            <a:ext cx="625874" cy="507890"/>
-          </a:xfrm>
-          <a:prstGeom prst="line">
-            <a:avLst/>
-          </a:prstGeom>
-          <a:ln>
-            <a:solidFill>
-              <a:schemeClr val="tx1"/>
-            </a:solidFill>
+          <a:ln w="38100">
+            <a:tailEnd type="triangle"/>
           </a:ln>
         </p:spPr>
         <p:style>
@@ -13252,433 +12094,6 @@
           </a:fontRef>
         </p:style>
       </p:cxnSp>
-      <p:sp>
-        <p:nvSpPr>
-          <p:cNvPr id="131" name="CuadroTexto 130"/>
-          <p:cNvSpPr txBox="1"/>
-          <p:nvPr/>
-        </p:nvSpPr>
-        <p:spPr>
-          <a:xfrm>
-            <a:off x="9011797" y="2278744"/>
-            <a:ext cx="1006860" cy="230832"/>
-          </a:xfrm>
-          <a:prstGeom prst="rect">
-            <a:avLst/>
-          </a:prstGeom>
-          <a:noFill/>
-        </p:spPr>
-        <p:txBody>
-          <a:bodyPr wrap="square" rtlCol="0">
-            <a:spAutoFit/>
-          </a:bodyPr>
-          <a:lstStyle/>
-          <a:p>
-            <a:r>
-              <a:rPr lang="es-MX" sz="900" dirty="0" smtClean="0"/>
-              <a:t>rotationAngleX0</a:t>
-            </a:r>
-            <a:endParaRPr lang="en-US" sz="900" dirty="0"/>
-          </a:p>
-        </p:txBody>
-      </p:sp>
-      <p:sp>
-        <p:nvSpPr>
-          <p:cNvPr id="132" name="Rectángulo 131"/>
-          <p:cNvSpPr/>
-          <p:nvPr/>
-        </p:nvSpPr>
-        <p:spPr>
-          <a:xfrm>
-            <a:off x="9893156" y="2648516"/>
-            <a:ext cx="2223082" cy="461665"/>
-          </a:xfrm>
-          <a:prstGeom prst="rect">
-            <a:avLst/>
-          </a:prstGeom>
-        </p:spPr>
-        <p:txBody>
-          <a:bodyPr wrap="square">
-            <a:spAutoFit/>
-          </a:bodyPr>
-          <a:lstStyle/>
-          <a:p>
-            <a:r>
-              <a:rPr lang="en-US" sz="1200" dirty="0" smtClean="0"/>
-              <a:t>rotationAxisX0: Z (or -Z) (should be checked)</a:t>
-            </a:r>
-            <a:endParaRPr lang="en-US" sz="1200" dirty="0"/>
-          </a:p>
-        </p:txBody>
-      </p:sp>
-      <p:sp>
-        <p:nvSpPr>
-          <p:cNvPr id="133" name="Rectángulo 132"/>
-          <p:cNvSpPr/>
-          <p:nvPr/>
-        </p:nvSpPr>
-        <p:spPr>
-          <a:xfrm>
-            <a:off x="8780925" y="4680209"/>
-            <a:ext cx="3530826" cy="1384995"/>
-          </a:xfrm>
-          <a:prstGeom prst="rect">
-            <a:avLst/>
-          </a:prstGeom>
-        </p:spPr>
-        <p:txBody>
-          <a:bodyPr wrap="square">
-            <a:spAutoFit/>
-          </a:bodyPr>
-          <a:lstStyle/>
-          <a:p>
-            <a:r>
-              <a:rPr lang="en-US" sz="1200" b="1" u="sng" dirty="0" smtClean="0"/>
-              <a:t>Coordinate </a:t>
-            </a:r>
-            <a:r>
-              <a:rPr lang="en-US" sz="1200" b="1" u="sng" dirty="0"/>
-              <a:t>systems</a:t>
-            </a:r>
-          </a:p>
-          <a:p>
-            <a:endParaRPr lang="es-MX" sz="1200" i="1" dirty="0"/>
-          </a:p>
-          <a:p>
-            <a:r>
-              <a:rPr lang="es-MX" sz="1200" dirty="0" smtClean="0"/>
-              <a:t>mandibleAxis0:</a:t>
-            </a:r>
-            <a:endParaRPr lang="en-US" sz="1200" dirty="0" smtClean="0"/>
-          </a:p>
-          <a:p>
-            <a:pPr marL="171450" indent="-171450">
-              <a:buFontTx/>
-              <a:buChar char="-"/>
-            </a:pPr>
-            <a:r>
-              <a:rPr lang="es-MX" sz="1200" dirty="0" smtClean="0"/>
-              <a:t>   </a:t>
-            </a:r>
-            <a:r>
-              <a:rPr lang="es-MX" sz="1200" dirty="0" err="1" smtClean="0"/>
-              <a:t>Origin</a:t>
-            </a:r>
-            <a:r>
-              <a:rPr lang="es-MX" sz="1200" smtClean="0"/>
-              <a:t>: </a:t>
-            </a:r>
-            <a:r>
-              <a:rPr lang="es-MX" sz="1200" smtClean="0"/>
-              <a:t>MandiblePlane0Origin</a:t>
-            </a:r>
-            <a:endParaRPr lang="es-MX" sz="1200" dirty="0" smtClean="0"/>
-          </a:p>
-          <a:p>
-            <a:pPr marL="171450" indent="-171450">
-              <a:buFontTx/>
-              <a:buChar char="-"/>
-            </a:pPr>
-            <a:r>
-              <a:rPr lang="en-CA" sz="1200" dirty="0" smtClean="0"/>
-              <a:t>   </a:t>
-            </a:r>
-            <a:r>
-              <a:rPr lang="en-CA" sz="1200" dirty="0"/>
-              <a:t>X: </a:t>
-            </a:r>
-            <a:r>
-              <a:rPr lang="en-CA" sz="1200" dirty="0" smtClean="0"/>
-              <a:t>mandiblePlane0(Y) </a:t>
-            </a:r>
-            <a:r>
-              <a:rPr lang="en-US" sz="1200" dirty="0">
-                <a:sym typeface="Wingdings 2" panose="05020102010507070707" pitchFamily="18" charset="2"/>
-              </a:rPr>
-              <a:t></a:t>
-            </a:r>
-            <a:r>
-              <a:rPr lang="en-CA" sz="1200" dirty="0" smtClean="0"/>
-              <a:t> Z</a:t>
-            </a:r>
-            <a:endParaRPr lang="en-CA" sz="1200" dirty="0"/>
-          </a:p>
-          <a:p>
-            <a:pPr marL="171450" indent="-171450">
-              <a:buFontTx/>
-              <a:buChar char="-"/>
-            </a:pPr>
-            <a:r>
-              <a:rPr lang="en-CA" sz="1200" dirty="0" smtClean="0"/>
-              <a:t>   Y: Z </a:t>
-            </a:r>
-            <a:r>
-              <a:rPr lang="en-US" sz="1200" dirty="0" smtClean="0">
-                <a:sym typeface="Wingdings 2" panose="05020102010507070707" pitchFamily="18" charset="2"/>
-              </a:rPr>
-              <a:t> X</a:t>
-            </a:r>
-            <a:endParaRPr lang="en-CA" sz="1200" dirty="0" smtClean="0"/>
-          </a:p>
-          <a:p>
-            <a:pPr marL="171450" indent="-171450">
-              <a:buFontTx/>
-              <a:buChar char="-"/>
-            </a:pPr>
-            <a:r>
-              <a:rPr lang="en-CA" sz="1200" dirty="0" smtClean="0"/>
-              <a:t>   Z: </a:t>
-            </a:r>
-            <a:r>
-              <a:rPr lang="en-US" sz="1200" dirty="0" smtClean="0"/>
-              <a:t>mandibleLine0 direction</a:t>
-            </a:r>
-            <a:endParaRPr lang="en-CA" sz="1200" dirty="0"/>
-          </a:p>
-        </p:txBody>
-      </p:sp>
-      <p:sp>
-        <p:nvSpPr>
-          <p:cNvPr id="113" name="TextBox 7">
-            <a:extLst>
-              <a:ext uri="{FF2B5EF4-FFF2-40B4-BE49-F238E27FC236}">
-                <a16:creationId xmlns:a16="http://schemas.microsoft.com/office/drawing/2014/main" id="{89D4E1FF-1905-419F-84FD-2654202235B0}"/>
-              </a:ext>
-            </a:extLst>
-          </p:cNvPr>
-          <p:cNvSpPr txBox="1"/>
-          <p:nvPr/>
-        </p:nvSpPr>
-        <p:spPr>
-          <a:xfrm>
-            <a:off x="7851445" y="3014436"/>
-            <a:ext cx="892184" cy="369332"/>
-          </a:xfrm>
-          <a:prstGeom prst="rect">
-            <a:avLst/>
-          </a:prstGeom>
-          <a:noFill/>
-        </p:spPr>
-        <p:txBody>
-          <a:bodyPr wrap="square" rtlCol="0">
-            <a:spAutoFit/>
-          </a:bodyPr>
-          <a:lstStyle/>
-          <a:p>
-            <a:r>
-              <a:rPr lang="en-US" b="1" i="1" dirty="0">
-                <a:solidFill>
-                  <a:schemeClr val="accent2"/>
-                </a:solidFill>
-              </a:rPr>
-              <a:t>Fibula</a:t>
-            </a:r>
-            <a:endParaRPr lang="en-CA" b="1" i="1" dirty="0">
-              <a:solidFill>
-                <a:schemeClr val="accent2"/>
-              </a:solidFill>
-            </a:endParaRPr>
-          </a:p>
-        </p:txBody>
-      </p:sp>
-      <p:sp>
-        <p:nvSpPr>
-          <p:cNvPr id="118" name="TextBox 122">
-            <a:extLst>
-              <a:ext uri="{FF2B5EF4-FFF2-40B4-BE49-F238E27FC236}">
-                <a16:creationId xmlns:a16="http://schemas.microsoft.com/office/drawing/2014/main" id="{EF0B52AD-218E-4C03-8ED3-90B140F96951}"/>
-              </a:ext>
-            </a:extLst>
-          </p:cNvPr>
-          <p:cNvSpPr txBox="1"/>
-          <p:nvPr/>
-        </p:nvSpPr>
-        <p:spPr>
-          <a:xfrm>
-            <a:off x="8096163" y="3376806"/>
-            <a:ext cx="1948401" cy="276999"/>
-          </a:xfrm>
-          <a:prstGeom prst="rect">
-            <a:avLst/>
-          </a:prstGeom>
-          <a:noFill/>
-        </p:spPr>
-        <p:txBody>
-          <a:bodyPr wrap="square" rtlCol="0">
-            <a:spAutoFit/>
-          </a:bodyPr>
-          <a:lstStyle/>
-          <a:p>
-            <a:r>
-              <a:rPr lang="es-MX" sz="1200" b="1" i="1" dirty="0" smtClean="0">
-                <a:solidFill>
-                  <a:srgbClr val="7030A0"/>
-                </a:solidFill>
-              </a:rPr>
-              <a:t>mandibleAxis0Rotated</a:t>
-            </a:r>
-            <a:endParaRPr lang="en-CA" sz="1200" b="1" i="1" dirty="0">
-              <a:solidFill>
-                <a:srgbClr val="7030A0"/>
-              </a:solidFill>
-            </a:endParaRPr>
-          </a:p>
-        </p:txBody>
-      </p:sp>
-      <p:sp>
-        <p:nvSpPr>
-          <p:cNvPr id="119" name="Rectángulo 118"/>
-          <p:cNvSpPr/>
-          <p:nvPr/>
-        </p:nvSpPr>
-        <p:spPr>
-          <a:xfrm>
-            <a:off x="7068734" y="12915"/>
-            <a:ext cx="498920" cy="369332"/>
-          </a:xfrm>
-          <a:prstGeom prst="rect">
-            <a:avLst/>
-          </a:prstGeom>
-        </p:spPr>
-        <p:txBody>
-          <a:bodyPr wrap="square">
-            <a:spAutoFit/>
-          </a:bodyPr>
-          <a:lstStyle/>
-          <a:p>
-            <a:r>
-              <a:rPr lang="es-MX" b="1" dirty="0"/>
-              <a:t>0</a:t>
-            </a:r>
-            <a:r>
-              <a:rPr lang="es-MX" b="1" dirty="0" smtClean="0"/>
-              <a:t>)</a:t>
-            </a:r>
-            <a:endParaRPr lang="en-US" b="1" dirty="0"/>
-          </a:p>
-        </p:txBody>
-      </p:sp>
-      <p:sp>
-        <p:nvSpPr>
-          <p:cNvPr id="120" name="Rectángulo 119"/>
-          <p:cNvSpPr/>
-          <p:nvPr/>
-        </p:nvSpPr>
-        <p:spPr>
-          <a:xfrm>
-            <a:off x="7099360" y="2154849"/>
-            <a:ext cx="498920" cy="369332"/>
-          </a:xfrm>
-          <a:prstGeom prst="rect">
-            <a:avLst/>
-          </a:prstGeom>
-        </p:spPr>
-        <p:txBody>
-          <a:bodyPr wrap="square">
-            <a:spAutoFit/>
-          </a:bodyPr>
-          <a:lstStyle/>
-          <a:p>
-            <a:r>
-              <a:rPr lang="es-MX" b="1" dirty="0" smtClean="0"/>
-              <a:t>1)</a:t>
-            </a:r>
-            <a:endParaRPr lang="en-US" b="1" dirty="0"/>
-          </a:p>
-        </p:txBody>
-      </p:sp>
-      <p:sp>
-        <p:nvSpPr>
-          <p:cNvPr id="15" name="Rectángulo 14"/>
-          <p:cNvSpPr/>
-          <p:nvPr/>
-        </p:nvSpPr>
-        <p:spPr>
-          <a:xfrm>
-            <a:off x="6910009" y="20847"/>
-            <a:ext cx="5206229" cy="2182146"/>
-          </a:xfrm>
-          <a:prstGeom prst="rect">
-            <a:avLst/>
-          </a:prstGeom>
-          <a:noFill/>
-          <a:ln>
-            <a:solidFill>
-              <a:schemeClr val="tx1"/>
-            </a:solidFill>
-          </a:ln>
-        </p:spPr>
-        <p:style>
-          <a:lnRef idx="2">
-            <a:schemeClr val="accent1">
-              <a:shade val="50000"/>
-            </a:schemeClr>
-          </a:lnRef>
-          <a:fillRef idx="1">
-            <a:schemeClr val="accent1"/>
-          </a:fillRef>
-          <a:effectRef idx="0">
-            <a:schemeClr val="accent1"/>
-          </a:effectRef>
-          <a:fontRef idx="minor">
-            <a:schemeClr val="lt1"/>
-          </a:fontRef>
-        </p:style>
-        <p:txBody>
-          <a:bodyPr rtlCol="0" anchor="ctr"/>
-          <a:lstStyle/>
-          <a:p>
-            <a:pPr algn="ctr"/>
-            <a:endParaRPr lang="en-US"/>
-          </a:p>
-        </p:txBody>
-      </p:sp>
-      <p:sp>
-        <p:nvSpPr>
-          <p:cNvPr id="19" name="Rectángulo 18"/>
-          <p:cNvSpPr/>
-          <p:nvPr/>
-        </p:nvSpPr>
-        <p:spPr>
-          <a:xfrm>
-            <a:off x="6910009" y="2232438"/>
-            <a:ext cx="5206229" cy="2092574"/>
-          </a:xfrm>
-          <a:prstGeom prst="rect">
-            <a:avLst/>
-          </a:prstGeom>
-          <a:noFill/>
-          <a:ln>
-            <a:solidFill>
-              <a:schemeClr val="tx1"/>
-            </a:solidFill>
-          </a:ln>
-        </p:spPr>
-        <p:style>
-          <a:lnRef idx="2">
-            <a:schemeClr val="accent1">
-              <a:shade val="50000"/>
-            </a:schemeClr>
-          </a:lnRef>
-          <a:fillRef idx="1">
-            <a:schemeClr val="accent1"/>
-          </a:fillRef>
-          <a:effectRef idx="0">
-            <a:schemeClr val="accent1"/>
-          </a:effectRef>
-          <a:fontRef idx="minor">
-            <a:schemeClr val="lt1"/>
-          </a:fontRef>
-        </p:style>
-        <p:txBody>
-          <a:bodyPr rtlCol="0" anchor="ctr"/>
-          <a:lstStyle/>
-          <a:p>
-            <a:pPr algn="ctr"/>
-            <a:endParaRPr lang="en-US"/>
-          </a:p>
-        </p:txBody>
-      </p:sp>
     </p:spTree>
     <p:extLst>
       <p:ext uri="{BB962C8B-B14F-4D97-AF65-F5344CB8AC3E}">

</xml_diff>

<commit_message>
update the documentation and coordinate systems definitions in documentation
</commit_message>
<xml_diff>
--- a/Docs/Design.pptx
+++ b/Docs/Design.pptx
@@ -267,7 +267,7 @@
           <a:p>
             <a:fld id="{D70168D3-9BA9-4B67-B593-8F465BBDFFE3}" type="datetimeFigureOut">
               <a:rPr lang="en-CA" smtClean="0"/>
-              <a:t>2021-01-30</a:t>
+              <a:t>2021-02-04</a:t>
             </a:fld>
             <a:endParaRPr lang="en-CA"/>
           </a:p>
@@ -467,7 +467,7 @@
           <a:p>
             <a:fld id="{D70168D3-9BA9-4B67-B593-8F465BBDFFE3}" type="datetimeFigureOut">
               <a:rPr lang="en-CA" smtClean="0"/>
-              <a:t>2021-01-30</a:t>
+              <a:t>2021-02-04</a:t>
             </a:fld>
             <a:endParaRPr lang="en-CA"/>
           </a:p>
@@ -677,7 +677,7 @@
           <a:p>
             <a:fld id="{D70168D3-9BA9-4B67-B593-8F465BBDFFE3}" type="datetimeFigureOut">
               <a:rPr lang="en-CA" smtClean="0"/>
-              <a:t>2021-01-30</a:t>
+              <a:t>2021-02-04</a:t>
             </a:fld>
             <a:endParaRPr lang="en-CA"/>
           </a:p>
@@ -877,7 +877,7 @@
           <a:p>
             <a:fld id="{D70168D3-9BA9-4B67-B593-8F465BBDFFE3}" type="datetimeFigureOut">
               <a:rPr lang="en-CA" smtClean="0"/>
-              <a:t>2021-01-30</a:t>
+              <a:t>2021-02-04</a:t>
             </a:fld>
             <a:endParaRPr lang="en-CA"/>
           </a:p>
@@ -1153,7 +1153,7 @@
           <a:p>
             <a:fld id="{D70168D3-9BA9-4B67-B593-8F465BBDFFE3}" type="datetimeFigureOut">
               <a:rPr lang="en-CA" smtClean="0"/>
-              <a:t>2021-01-30</a:t>
+              <a:t>2021-02-04</a:t>
             </a:fld>
             <a:endParaRPr lang="en-CA"/>
           </a:p>
@@ -1421,7 +1421,7 @@
           <a:p>
             <a:fld id="{D70168D3-9BA9-4B67-B593-8F465BBDFFE3}" type="datetimeFigureOut">
               <a:rPr lang="en-CA" smtClean="0"/>
-              <a:t>2021-01-30</a:t>
+              <a:t>2021-02-04</a:t>
             </a:fld>
             <a:endParaRPr lang="en-CA"/>
           </a:p>
@@ -1836,7 +1836,7 @@
           <a:p>
             <a:fld id="{D70168D3-9BA9-4B67-B593-8F465BBDFFE3}" type="datetimeFigureOut">
               <a:rPr lang="en-CA" smtClean="0"/>
-              <a:t>2021-01-30</a:t>
+              <a:t>2021-02-04</a:t>
             </a:fld>
             <a:endParaRPr lang="en-CA"/>
           </a:p>
@@ -1978,7 +1978,7 @@
           <a:p>
             <a:fld id="{D70168D3-9BA9-4B67-B593-8F465BBDFFE3}" type="datetimeFigureOut">
               <a:rPr lang="en-CA" smtClean="0"/>
-              <a:t>2021-01-30</a:t>
+              <a:t>2021-02-04</a:t>
             </a:fld>
             <a:endParaRPr lang="en-CA"/>
           </a:p>
@@ -2091,7 +2091,7 @@
           <a:p>
             <a:fld id="{D70168D3-9BA9-4B67-B593-8F465BBDFFE3}" type="datetimeFigureOut">
               <a:rPr lang="en-CA" smtClean="0"/>
-              <a:t>2021-01-30</a:t>
+              <a:t>2021-02-04</a:t>
             </a:fld>
             <a:endParaRPr lang="en-CA"/>
           </a:p>
@@ -2404,7 +2404,7 @@
           <a:p>
             <a:fld id="{D70168D3-9BA9-4B67-B593-8F465BBDFFE3}" type="datetimeFigureOut">
               <a:rPr lang="en-CA" smtClean="0"/>
-              <a:t>2021-01-30</a:t>
+              <a:t>2021-02-04</a:t>
             </a:fld>
             <a:endParaRPr lang="en-CA"/>
           </a:p>
@@ -2693,7 +2693,7 @@
           <a:p>
             <a:fld id="{D70168D3-9BA9-4B67-B593-8F465BBDFFE3}" type="datetimeFigureOut">
               <a:rPr lang="en-CA" smtClean="0"/>
-              <a:t>2021-01-30</a:t>
+              <a:t>2021-02-04</a:t>
             </a:fld>
             <a:endParaRPr lang="en-CA"/>
           </a:p>
@@ -2936,7 +2936,7 @@
           <a:p>
             <a:fld id="{D70168D3-9BA9-4B67-B593-8F465BBDFFE3}" type="datetimeFigureOut">
               <a:rPr lang="en-CA" smtClean="0"/>
-              <a:t>2021-01-30</a:t>
+              <a:t>2021-02-04</a:t>
             </a:fld>
             <a:endParaRPr lang="en-CA"/>
           </a:p>
@@ -11486,7 +11486,15 @@
             </a:pPr>
             <a:r>
               <a:rPr lang="en-CA" sz="1200" dirty="0"/>
-              <a:t>   X: mandiblePlane0(Y) </a:t>
+              <a:t>   X: </a:t>
+            </a:r>
+            <a:r>
+              <a:rPr lang="en-CA" sz="1200" dirty="0" smtClean="0"/>
+              <a:t>mandiblePlane1(Y</a:t>
+            </a:r>
+            <a:r>
+              <a:rPr lang="en-CA" sz="1200" dirty="0"/>
+              <a:t>) </a:t>
             </a:r>
             <a:r>
               <a:rPr lang="en-US" sz="1200" dirty="0">
@@ -11535,11 +11543,7 @@
             </a:r>
             <a:r>
               <a:rPr lang="en-US" sz="1200" dirty="0" smtClean="0"/>
-              <a:t>andibleLine0 </a:t>
-            </a:r>
-            <a:r>
-              <a:rPr lang="en-US" sz="1200" dirty="0" smtClean="0"/>
-              <a:t>+ </a:t>
+              <a:t>andibleLine0 + </a:t>
             </a:r>
             <a:r>
               <a:rPr lang="en-US" sz="1200" dirty="0"/>
@@ -11547,11 +11551,7 @@
             </a:r>
             <a:r>
               <a:rPr lang="en-US" sz="1200" dirty="0" smtClean="0"/>
-              <a:t>andibleLine1</a:t>
-            </a:r>
-            <a:r>
-              <a:rPr lang="en-US" sz="1200" dirty="0" smtClean="0"/>
-              <a:t>) direction</a:t>
+              <a:t>andibleLine1) direction</a:t>
             </a:r>
             <a:endParaRPr lang="en-US" sz="1200" dirty="0"/>
           </a:p>
@@ -13408,42 +13408,6 @@
           </a:p>
         </p:txBody>
       </p:sp>
-      <p:cxnSp>
-        <p:nvCxnSpPr>
-          <p:cNvPr id="39" name="Straight Connector 28">
-            <a:extLst>
-              <a:ext uri="{FF2B5EF4-FFF2-40B4-BE49-F238E27FC236}">
-                <a16:creationId xmlns:a16="http://schemas.microsoft.com/office/drawing/2014/main" id="{E3F7311D-43E7-4879-B28D-80D9F570B017}"/>
-              </a:ext>
-            </a:extLst>
-          </p:cNvPr>
-          <p:cNvCxnSpPr/>
-          <p:nvPr/>
-        </p:nvCxnSpPr>
-        <p:spPr>
-          <a:xfrm flipV="1">
-            <a:off x="2216117" y="5353978"/>
-            <a:ext cx="7659403" cy="16288"/>
-          </a:xfrm>
-          <a:prstGeom prst="line">
-            <a:avLst/>
-          </a:prstGeom>
-        </p:spPr>
-        <p:style>
-          <a:lnRef idx="1">
-            <a:schemeClr val="accent1"/>
-          </a:lnRef>
-          <a:fillRef idx="0">
-            <a:schemeClr val="accent1"/>
-          </a:fillRef>
-          <a:effectRef idx="0">
-            <a:schemeClr val="accent1"/>
-          </a:effectRef>
-          <a:fontRef idx="minor">
-            <a:schemeClr val="tx1"/>
-          </a:fontRef>
-        </p:style>
-      </p:cxnSp>
       <p:sp>
         <p:nvSpPr>
           <p:cNvPr id="51" name="TextBox 88">
@@ -13459,7 +13423,7 @@
         <p:spPr>
           <a:xfrm>
             <a:off x="411295" y="148963"/>
-            <a:ext cx="4671315" cy="3046988"/>
+            <a:ext cx="4671315" cy="3693319"/>
           </a:xfrm>
           <a:prstGeom prst="rect">
             <a:avLst/>
@@ -13689,33 +13653,18 @@
               <a:buChar char="-"/>
             </a:pPr>
             <a:r>
+              <a:rPr lang="en-US" sz="1200" dirty="0" smtClean="0"/>
+              <a:t>X</a:t>
+            </a:r>
+            <a:r>
               <a:rPr lang="en-US" sz="1200" dirty="0"/>
-              <a:t>X, Y, Z</a:t>
-            </a:r>
-            <a:r>
-              <a:rPr lang="en-US" sz="1200" dirty="0" smtClean="0"/>
-              <a:t>: </a:t>
-            </a:r>
-            <a:r>
-              <a:rPr lang="es-MX" sz="1200" dirty="0" smtClean="0"/>
-              <a:t>mandibleAxis0ToFibulaRotationTransform(MandiblePlane0)</a:t>
-            </a:r>
-            <a:endParaRPr lang="en-US" sz="1200" dirty="0"/>
-          </a:p>
-          <a:p>
-            <a:r>
-              <a:rPr lang="en-US" sz="1200" dirty="0" smtClean="0"/>
-              <a:t>FibulaPlane0B: </a:t>
-            </a:r>
-            <a:r>
-              <a:rPr lang="en-US" sz="1200" dirty="0"/>
-              <a:t>rotated and translated </a:t>
-            </a:r>
-            <a:r>
-              <a:rPr lang="en-US" sz="1200" dirty="0" smtClean="0"/>
-              <a:t>mandiblePlane1</a:t>
-            </a:r>
-            <a:endParaRPr lang="en-US" sz="1200" i="1" dirty="0"/>
+              <a:t>: orthogonal to Z, approximately orthogonal to </a:t>
+            </a:r>
+            <a:r>
+              <a:rPr lang="en-US" sz="1200" dirty="0" err="1" smtClean="0"/>
+              <a:t>FibulaY</a:t>
+            </a:r>
+            <a:endParaRPr lang="en-US" sz="1200" dirty="0" smtClean="0"/>
           </a:p>
           <a:p>
             <a:pPr marL="285750" indent="-285750">
@@ -13723,22 +13672,14 @@
               <a:buChar char="-"/>
             </a:pPr>
             <a:r>
+              <a:rPr lang="es-MX" sz="1200" dirty="0" smtClean="0"/>
+              <a:t>Y: </a:t>
+            </a:r>
+            <a:r>
               <a:rPr lang="en-US" sz="1200" dirty="0"/>
-              <a:t>Origin: </a:t>
-            </a:r>
-            <a:r>
-              <a:rPr lang="en-US" sz="1200" dirty="0" smtClean="0"/>
-              <a:t>FibulaPlane0BOrigin </a:t>
-            </a:r>
-            <a:r>
-              <a:rPr lang="en-US" sz="1200" dirty="0"/>
-              <a:t>(defined </a:t>
-            </a:r>
-            <a:r>
-              <a:rPr lang="en-US" sz="1200" dirty="0" smtClean="0"/>
-              <a:t>FibulaPlane0AOrigin plus distance between MandiblePlane0 and MandiblePlane1)</a:t>
-            </a:r>
-            <a:endParaRPr lang="en-US" sz="1200" dirty="0"/>
+              <a:t>orthogonal to Z and X</a:t>
+            </a:r>
+            <a:endParaRPr lang="es-MX" sz="1200" dirty="0" smtClean="0"/>
           </a:p>
           <a:p>
             <a:pPr marL="285750" indent="-285750">
@@ -13746,97 +13687,121 @@
               <a:buChar char="-"/>
             </a:pPr>
             <a:r>
+              <a:rPr lang="es-MX" sz="1200" dirty="0" smtClean="0"/>
+              <a:t>Z: </a:t>
+            </a:r>
+            <a:r>
+              <a:rPr lang="es-MX" sz="1200" dirty="0" err="1" smtClean="0"/>
+              <a:t>cutting</a:t>
+            </a:r>
+            <a:r>
+              <a:rPr lang="es-MX" sz="1200" dirty="0" smtClean="0"/>
+              <a:t> </a:t>
+            </a:r>
+            <a:r>
+              <a:rPr lang="es-MX" sz="1200" dirty="0" err="1" smtClean="0"/>
+              <a:t>plane</a:t>
+            </a:r>
+            <a:r>
+              <a:rPr lang="es-MX" sz="1200" dirty="0" smtClean="0"/>
+              <a:t> normal</a:t>
+            </a:r>
+            <a:endParaRPr lang="en-US" sz="1200" dirty="0"/>
+          </a:p>
+          <a:p>
+            <a:r>
+              <a:rPr lang="en-US" sz="1200" dirty="0" smtClean="0"/>
+              <a:t>FibulaPlane0B: </a:t>
+            </a:r>
+            <a:r>
               <a:rPr lang="en-US" sz="1200" dirty="0"/>
-              <a:t>X, Y, Z: </a:t>
-            </a:r>
-            <a:r>
-              <a:rPr lang="es-MX" sz="1200" dirty="0" smtClean="0"/>
-              <a:t>mandibleAxis0ToFibulaRotationTransform(MandiblePlane1)</a:t>
+              <a:t>rotated and translated </a:t>
+            </a:r>
+            <a:r>
+              <a:rPr lang="en-US" sz="1200" dirty="0" smtClean="0"/>
+              <a:t>mandiblePlane1</a:t>
+            </a:r>
+            <a:endParaRPr lang="en-US" sz="1200" i="1" dirty="0"/>
+          </a:p>
+          <a:p>
+            <a:pPr marL="285750" indent="-285750">
+              <a:buFontTx/>
+              <a:buChar char="-"/>
+            </a:pPr>
+            <a:r>
+              <a:rPr lang="en-US" sz="1200" dirty="0"/>
+              <a:t>Origin: </a:t>
+            </a:r>
+            <a:r>
+              <a:rPr lang="en-US" sz="1200" dirty="0" smtClean="0"/>
+              <a:t>FibulaPlane0BOrigin </a:t>
+            </a:r>
+            <a:r>
+              <a:rPr lang="en-US" sz="1200" dirty="0"/>
+              <a:t>(defined </a:t>
+            </a:r>
+            <a:r>
+              <a:rPr lang="en-US" sz="1200" dirty="0" smtClean="0"/>
+              <a:t>FibulaPlane0AOrigin plus distance between MandiblePlane0 and MandiblePlane1)</a:t>
             </a:r>
             <a:endParaRPr lang="en-US" sz="1200" dirty="0"/>
           </a:p>
           <a:p>
+            <a:pPr marL="285750" indent="-285750">
+              <a:buFontTx/>
+              <a:buChar char="-"/>
+            </a:pPr>
+            <a:r>
+              <a:rPr lang="en-US" sz="1200" dirty="0"/>
+              <a:t>X: orthogonal to Z, approximately orthogonal to </a:t>
+            </a:r>
+            <a:r>
+              <a:rPr lang="en-US" sz="1200" dirty="0" err="1" smtClean="0"/>
+              <a:t>FibulaY</a:t>
+            </a:r>
             <a:endParaRPr lang="en-US" sz="1200" dirty="0"/>
           </a:p>
-        </p:txBody>
-      </p:sp>
-      <p:sp>
-        <p:nvSpPr>
-          <p:cNvPr id="2" name="Conector 1"/>
-          <p:cNvSpPr/>
-          <p:nvPr/>
-        </p:nvSpPr>
-        <p:spPr>
-          <a:xfrm>
-            <a:off x="9829455" y="5298061"/>
-            <a:ext cx="97612" cy="97612"/>
-          </a:xfrm>
-          <a:prstGeom prst="flowChartConnector">
-            <a:avLst/>
-          </a:prstGeom>
-        </p:spPr>
-        <p:style>
-          <a:lnRef idx="2">
-            <a:schemeClr val="accent1">
-              <a:shade val="50000"/>
-            </a:schemeClr>
-          </a:lnRef>
-          <a:fillRef idx="1">
-            <a:schemeClr val="accent1"/>
-          </a:fillRef>
-          <a:effectRef idx="0">
-            <a:schemeClr val="accent1"/>
-          </a:effectRef>
-          <a:fontRef idx="minor">
-            <a:schemeClr val="lt1"/>
-          </a:fontRef>
-        </p:style>
-        <p:txBody>
-          <a:bodyPr rtlCol="0" anchor="ctr"/>
-          <a:lstStyle/>
-          <a:p>
-            <a:pPr algn="ctr"/>
-            <a:endParaRPr lang="en-US"/>
-          </a:p>
-        </p:txBody>
-      </p:sp>
-      <p:sp>
-        <p:nvSpPr>
-          <p:cNvPr id="41" name="Conector 40"/>
-          <p:cNvSpPr/>
-          <p:nvPr/>
-        </p:nvSpPr>
-        <p:spPr>
-          <a:xfrm>
-            <a:off x="2160597" y="5320985"/>
-            <a:ext cx="97612" cy="97612"/>
-          </a:xfrm>
-          <a:prstGeom prst="flowChartConnector">
-            <a:avLst/>
-          </a:prstGeom>
-        </p:spPr>
-        <p:style>
-          <a:lnRef idx="2">
-            <a:schemeClr val="accent1">
-              <a:shade val="50000"/>
-            </a:schemeClr>
-          </a:lnRef>
-          <a:fillRef idx="1">
-            <a:schemeClr val="accent1"/>
-          </a:fillRef>
-          <a:effectRef idx="0">
-            <a:schemeClr val="accent1"/>
-          </a:effectRef>
-          <a:fontRef idx="minor">
-            <a:schemeClr val="lt1"/>
-          </a:fontRef>
-        </p:style>
-        <p:txBody>
-          <a:bodyPr rtlCol="0" anchor="ctr"/>
-          <a:lstStyle/>
-          <a:p>
-            <a:pPr algn="ctr"/>
-            <a:endParaRPr lang="en-US"/>
+          <a:p>
+            <a:pPr marL="285750" indent="-285750">
+              <a:buFontTx/>
+              <a:buChar char="-"/>
+            </a:pPr>
+            <a:r>
+              <a:rPr lang="es-MX" sz="1200" dirty="0"/>
+              <a:t>Y: </a:t>
+            </a:r>
+            <a:r>
+              <a:rPr lang="en-US" sz="1200" dirty="0"/>
+              <a:t>orthogonal to Z and X</a:t>
+            </a:r>
+            <a:endParaRPr lang="es-MX" sz="1200" dirty="0"/>
+          </a:p>
+          <a:p>
+            <a:pPr marL="285750" indent="-285750">
+              <a:buFontTx/>
+              <a:buChar char="-"/>
+            </a:pPr>
+            <a:r>
+              <a:rPr lang="es-MX" sz="1200" dirty="0"/>
+              <a:t>Z: </a:t>
+            </a:r>
+            <a:r>
+              <a:rPr lang="es-MX" sz="1200" dirty="0" err="1"/>
+              <a:t>cutting</a:t>
+            </a:r>
+            <a:r>
+              <a:rPr lang="es-MX" sz="1200" dirty="0"/>
+              <a:t> </a:t>
+            </a:r>
+            <a:r>
+              <a:rPr lang="es-MX" sz="1200" dirty="0" err="1"/>
+              <a:t>plane</a:t>
+            </a:r>
+            <a:r>
+              <a:rPr lang="es-MX" sz="1200" dirty="0"/>
+              <a:t> normal</a:t>
+            </a:r>
+            <a:endParaRPr lang="en-US" sz="1200" dirty="0"/>
           </a:p>
         </p:txBody>
       </p:sp>
@@ -14220,6 +14185,39 @@
           </a:p>
         </p:txBody>
       </p:sp>
+      <p:cxnSp>
+        <p:nvCxnSpPr>
+          <p:cNvPr id="44" name="Conector recto de flecha 43"/>
+          <p:cNvCxnSpPr/>
+          <p:nvPr/>
+        </p:nvCxnSpPr>
+        <p:spPr>
+          <a:xfrm flipV="1">
+            <a:off x="2187320" y="5346062"/>
+            <a:ext cx="7774191" cy="16541"/>
+          </a:xfrm>
+          <a:prstGeom prst="straightConnector1">
+            <a:avLst/>
+          </a:prstGeom>
+          <a:ln w="9525">
+            <a:tailEnd type="triangle"/>
+          </a:ln>
+        </p:spPr>
+        <p:style>
+          <a:lnRef idx="1">
+            <a:schemeClr val="accent1"/>
+          </a:lnRef>
+          <a:fillRef idx="0">
+            <a:schemeClr val="accent1"/>
+          </a:fillRef>
+          <a:effectRef idx="0">
+            <a:schemeClr val="accent1"/>
+          </a:effectRef>
+          <a:fontRef idx="minor">
+            <a:schemeClr val="tx1"/>
+          </a:fontRef>
+        </p:style>
+      </p:cxnSp>
     </p:spTree>
     <p:extLst>
       <p:ext uri="{BB962C8B-B14F-4D97-AF65-F5344CB8AC3E}">

</xml_diff>

<commit_message>
update documentation with intersectionAxis definition
</commit_message>
<xml_diff>
--- a/Docs/Design.pptx
+++ b/Docs/Design.pptx
@@ -267,7 +267,7 @@
           <a:p>
             <a:fld id="{D70168D3-9BA9-4B67-B593-8F465BBDFFE3}" type="datetimeFigureOut">
               <a:rPr lang="en-CA" smtClean="0"/>
-              <a:t>2021-02-04</a:t>
+              <a:t>2021-02-05</a:t>
             </a:fld>
             <a:endParaRPr lang="en-CA"/>
           </a:p>
@@ -467,7 +467,7 @@
           <a:p>
             <a:fld id="{D70168D3-9BA9-4B67-B593-8F465BBDFFE3}" type="datetimeFigureOut">
               <a:rPr lang="en-CA" smtClean="0"/>
-              <a:t>2021-02-04</a:t>
+              <a:t>2021-02-05</a:t>
             </a:fld>
             <a:endParaRPr lang="en-CA"/>
           </a:p>
@@ -677,7 +677,7 @@
           <a:p>
             <a:fld id="{D70168D3-9BA9-4B67-B593-8F465BBDFFE3}" type="datetimeFigureOut">
               <a:rPr lang="en-CA" smtClean="0"/>
-              <a:t>2021-02-04</a:t>
+              <a:t>2021-02-05</a:t>
             </a:fld>
             <a:endParaRPr lang="en-CA"/>
           </a:p>
@@ -877,7 +877,7 @@
           <a:p>
             <a:fld id="{D70168D3-9BA9-4B67-B593-8F465BBDFFE3}" type="datetimeFigureOut">
               <a:rPr lang="en-CA" smtClean="0"/>
-              <a:t>2021-02-04</a:t>
+              <a:t>2021-02-05</a:t>
             </a:fld>
             <a:endParaRPr lang="en-CA"/>
           </a:p>
@@ -1153,7 +1153,7 @@
           <a:p>
             <a:fld id="{D70168D3-9BA9-4B67-B593-8F465BBDFFE3}" type="datetimeFigureOut">
               <a:rPr lang="en-CA" smtClean="0"/>
-              <a:t>2021-02-04</a:t>
+              <a:t>2021-02-05</a:t>
             </a:fld>
             <a:endParaRPr lang="en-CA"/>
           </a:p>
@@ -1421,7 +1421,7 @@
           <a:p>
             <a:fld id="{D70168D3-9BA9-4B67-B593-8F465BBDFFE3}" type="datetimeFigureOut">
               <a:rPr lang="en-CA" smtClean="0"/>
-              <a:t>2021-02-04</a:t>
+              <a:t>2021-02-05</a:t>
             </a:fld>
             <a:endParaRPr lang="en-CA"/>
           </a:p>
@@ -1836,7 +1836,7 @@
           <a:p>
             <a:fld id="{D70168D3-9BA9-4B67-B593-8F465BBDFFE3}" type="datetimeFigureOut">
               <a:rPr lang="en-CA" smtClean="0"/>
-              <a:t>2021-02-04</a:t>
+              <a:t>2021-02-05</a:t>
             </a:fld>
             <a:endParaRPr lang="en-CA"/>
           </a:p>
@@ -1978,7 +1978,7 @@
           <a:p>
             <a:fld id="{D70168D3-9BA9-4B67-B593-8F465BBDFFE3}" type="datetimeFigureOut">
               <a:rPr lang="en-CA" smtClean="0"/>
-              <a:t>2021-02-04</a:t>
+              <a:t>2021-02-05</a:t>
             </a:fld>
             <a:endParaRPr lang="en-CA"/>
           </a:p>
@@ -2091,7 +2091,7 @@
           <a:p>
             <a:fld id="{D70168D3-9BA9-4B67-B593-8F465BBDFFE3}" type="datetimeFigureOut">
               <a:rPr lang="en-CA" smtClean="0"/>
-              <a:t>2021-02-04</a:t>
+              <a:t>2021-02-05</a:t>
             </a:fld>
             <a:endParaRPr lang="en-CA"/>
           </a:p>
@@ -2404,7 +2404,7 @@
           <a:p>
             <a:fld id="{D70168D3-9BA9-4B67-B593-8F465BBDFFE3}" type="datetimeFigureOut">
               <a:rPr lang="en-CA" smtClean="0"/>
-              <a:t>2021-02-04</a:t>
+              <a:t>2021-02-05</a:t>
             </a:fld>
             <a:endParaRPr lang="en-CA"/>
           </a:p>
@@ -2693,7 +2693,7 @@
           <a:p>
             <a:fld id="{D70168D3-9BA9-4B67-B593-8F465BBDFFE3}" type="datetimeFigureOut">
               <a:rPr lang="en-CA" smtClean="0"/>
-              <a:t>2021-02-04</a:t>
+              <a:t>2021-02-05</a:t>
             </a:fld>
             <a:endParaRPr lang="en-CA"/>
           </a:p>
@@ -2936,7 +2936,7 @@
           <a:p>
             <a:fld id="{D70168D3-9BA9-4B67-B593-8F465BBDFFE3}" type="datetimeFigureOut">
               <a:rPr lang="en-CA" smtClean="0"/>
-              <a:t>2021-02-04</a:t>
+              <a:t>2021-02-05</a:t>
             </a:fld>
             <a:endParaRPr lang="en-CA"/>
           </a:p>
@@ -7387,20 +7387,24 @@
           </a:p>
           <a:p>
             <a:r>
-              <a:rPr lang="en-US" sz="1200" dirty="0" err="1" smtClean="0"/>
+              <a:rPr lang="en-US" sz="1200" i="1" dirty="0" err="1" smtClean="0"/>
               <a:t>CurvePointAxisAtPoint</a:t>
             </a:r>
             <a:r>
+              <a:rPr lang="en-US" sz="1200" i="1" dirty="0" smtClean="0"/>
+              <a:t>(</a:t>
+            </a:r>
+            <a:r>
+              <a:rPr lang="en-US" sz="1200" i="1" dirty="0" err="1" smtClean="0"/>
+              <a:t>i</a:t>
+            </a:r>
+            <a:r>
+              <a:rPr lang="en-US" sz="1200" i="1" dirty="0" smtClean="0"/>
+              <a:t>)</a:t>
+            </a:r>
+            <a:r>
               <a:rPr lang="en-US" sz="1200" dirty="0" smtClean="0"/>
-              <a:t>(</a:t>
-            </a:r>
-            <a:r>
-              <a:rPr lang="en-US" sz="1200" dirty="0" err="1" smtClean="0"/>
-              <a:t>i</a:t>
-            </a:r>
-            <a:r>
-              <a:rPr lang="en-US" sz="1200" dirty="0" smtClean="0"/>
-              <a:t>): axis given by the function </a:t>
+              <a:t>: axis given by the function </a:t>
             </a:r>
             <a:r>
               <a:rPr lang="en-US" sz="1200" dirty="0" err="1" smtClean="0"/>
@@ -11355,8 +11359,12 @@
           </a:p>
           <a:p>
             <a:r>
+              <a:rPr lang="es-MX" sz="1200" i="1" dirty="0" smtClean="0"/>
+              <a:t>mandibleAxis0</a:t>
+            </a:r>
+            <a:r>
               <a:rPr lang="es-MX" sz="1200" dirty="0" smtClean="0"/>
-              <a:t>mandibleAxis0:</a:t>
+              <a:t>:</a:t>
             </a:r>
             <a:endParaRPr lang="en-US" sz="1200" dirty="0" smtClean="0"/>
           </a:p>
@@ -11447,7 +11455,7 @@
           </a:p>
           <a:p>
             <a:r>
-              <a:rPr lang="es-MX" sz="1200" dirty="0" err="1" smtClean="0"/>
+              <a:rPr lang="es-MX" sz="1200" i="1" dirty="0" err="1" smtClean="0"/>
               <a:t>middleAxis</a:t>
             </a:r>
             <a:r>
@@ -13386,7 +13394,7 @@
         </p:nvSpPr>
         <p:spPr>
           <a:xfrm>
-            <a:off x="7505673" y="4966795"/>
+            <a:off x="8869917" y="4988412"/>
             <a:ext cx="1726695" cy="276999"/>
           </a:xfrm>
           <a:prstGeom prst="rect">
@@ -13619,8 +13627,12 @@
           </a:p>
           <a:p>
             <a:r>
+              <a:rPr lang="en-US" sz="1200" i="1" dirty="0" smtClean="0"/>
+              <a:t>FibulaPlane0A</a:t>
+            </a:r>
+            <a:r>
               <a:rPr lang="en-US" sz="1200" dirty="0" smtClean="0"/>
-              <a:t>FibulaPlane0A: rotated and translated mandiblePlane0</a:t>
+              <a:t>: rotated and translated mandiblePlane0</a:t>
             </a:r>
             <a:endParaRPr lang="en-US" sz="1200" i="1" dirty="0"/>
           </a:p>
@@ -13710,8 +13722,12 @@
           </a:p>
           <a:p>
             <a:r>
+              <a:rPr lang="en-US" sz="1200" i="1" dirty="0" smtClean="0"/>
+              <a:t>FibulaPlane0B</a:t>
+            </a:r>
+            <a:r>
               <a:rPr lang="en-US" sz="1200" dirty="0" smtClean="0"/>
-              <a:t>FibulaPlane0B: </a:t>
+              <a:t>: </a:t>
             </a:r>
             <a:r>
               <a:rPr lang="en-US" sz="1200" dirty="0"/>
@@ -14218,6 +14234,453 @@
           </a:fontRef>
         </p:style>
       </p:cxnSp>
+      <p:grpSp>
+        <p:nvGrpSpPr>
+          <p:cNvPr id="60" name="Group 103">
+            <a:extLst>
+              <a:ext uri="{FF2B5EF4-FFF2-40B4-BE49-F238E27FC236}">
+                <a16:creationId xmlns:a16="http://schemas.microsoft.com/office/drawing/2014/main" id="{99DDFD7A-04FB-4A82-B770-AC19B2570675}"/>
+              </a:ext>
+            </a:extLst>
+          </p:cNvPr>
+          <p:cNvGrpSpPr/>
+          <p:nvPr/>
+        </p:nvGrpSpPr>
+        <p:grpSpPr>
+          <a:xfrm>
+            <a:off x="7096797" y="4449909"/>
+            <a:ext cx="1893010" cy="1271521"/>
+            <a:chOff x="2366479" y="4489228"/>
+            <a:chExt cx="1893010" cy="1271521"/>
+          </a:xfrm>
+        </p:grpSpPr>
+        <p:cxnSp>
+          <p:nvCxnSpPr>
+            <p:cNvPr id="61" name="Straight Arrow Connector 4">
+              <a:extLst>
+                <a:ext uri="{FF2B5EF4-FFF2-40B4-BE49-F238E27FC236}">
+                  <a16:creationId xmlns:a16="http://schemas.microsoft.com/office/drawing/2014/main" id="{2BF80858-B0B5-43F1-810D-74D41CDE740F}"/>
+                </a:ext>
+              </a:extLst>
+            </p:cNvPr>
+            <p:cNvCxnSpPr>
+              <a:cxnSpLocks/>
+            </p:cNvCxnSpPr>
+            <p:nvPr/>
+          </p:nvCxnSpPr>
+          <p:spPr>
+            <a:xfrm flipV="1">
+              <a:off x="2603798" y="4654545"/>
+              <a:ext cx="11050" cy="706542"/>
+            </a:xfrm>
+            <a:prstGeom prst="straightConnector1">
+              <a:avLst/>
+            </a:prstGeom>
+            <a:ln w="28575">
+              <a:solidFill>
+                <a:srgbClr val="92D050"/>
+              </a:solidFill>
+              <a:tailEnd type="triangle"/>
+            </a:ln>
+          </p:spPr>
+          <p:style>
+            <a:lnRef idx="1">
+              <a:schemeClr val="accent1"/>
+            </a:lnRef>
+            <a:fillRef idx="0">
+              <a:schemeClr val="accent1"/>
+            </a:fillRef>
+            <a:effectRef idx="0">
+              <a:schemeClr val="accent1"/>
+            </a:effectRef>
+            <a:fontRef idx="minor">
+              <a:schemeClr val="tx1"/>
+            </a:fontRef>
+          </p:style>
+        </p:cxnSp>
+        <p:cxnSp>
+          <p:nvCxnSpPr>
+            <p:cNvPr id="62" name="Straight Arrow Connector 5">
+              <a:extLst>
+                <a:ext uri="{FF2B5EF4-FFF2-40B4-BE49-F238E27FC236}">
+                  <a16:creationId xmlns:a16="http://schemas.microsoft.com/office/drawing/2014/main" id="{E5F1016B-F8E5-4633-A114-37383DB9B03F}"/>
+                </a:ext>
+              </a:extLst>
+            </p:cNvPr>
+            <p:cNvCxnSpPr>
+              <a:cxnSpLocks/>
+            </p:cNvCxnSpPr>
+            <p:nvPr/>
+          </p:nvCxnSpPr>
+          <p:spPr>
+            <a:xfrm>
+              <a:off x="2580415" y="5375102"/>
+              <a:ext cx="795302" cy="0"/>
+            </a:xfrm>
+            <a:prstGeom prst="straightConnector1">
+              <a:avLst/>
+            </a:prstGeom>
+            <a:ln w="28575">
+              <a:solidFill>
+                <a:srgbClr val="92D050"/>
+              </a:solidFill>
+              <a:tailEnd type="triangle"/>
+            </a:ln>
+          </p:spPr>
+          <p:style>
+            <a:lnRef idx="1">
+              <a:schemeClr val="accent1"/>
+            </a:lnRef>
+            <a:fillRef idx="0">
+              <a:schemeClr val="accent1"/>
+            </a:fillRef>
+            <a:effectRef idx="0">
+              <a:schemeClr val="accent1"/>
+            </a:effectRef>
+            <a:fontRef idx="minor">
+              <a:schemeClr val="tx1"/>
+            </a:fontRef>
+          </p:style>
+        </p:cxnSp>
+        <p:cxnSp>
+          <p:nvCxnSpPr>
+            <p:cNvPr id="63" name="Straight Arrow Connector 6">
+              <a:extLst>
+                <a:ext uri="{FF2B5EF4-FFF2-40B4-BE49-F238E27FC236}">
+                  <a16:creationId xmlns:a16="http://schemas.microsoft.com/office/drawing/2014/main" id="{328E6B06-8935-47F4-98E0-065853C77A65}"/>
+                </a:ext>
+              </a:extLst>
+            </p:cNvPr>
+            <p:cNvCxnSpPr>
+              <a:cxnSpLocks/>
+            </p:cNvCxnSpPr>
+            <p:nvPr/>
+          </p:nvCxnSpPr>
+          <p:spPr>
+            <a:xfrm flipV="1">
+              <a:off x="2614849" y="4811499"/>
+              <a:ext cx="540598" cy="563603"/>
+            </a:xfrm>
+            <a:prstGeom prst="straightConnector1">
+              <a:avLst/>
+            </a:prstGeom>
+            <a:ln w="28575">
+              <a:solidFill>
+                <a:srgbClr val="92D050"/>
+              </a:solidFill>
+              <a:tailEnd type="triangle"/>
+            </a:ln>
+          </p:spPr>
+          <p:style>
+            <a:lnRef idx="1">
+              <a:schemeClr val="accent1"/>
+            </a:lnRef>
+            <a:fillRef idx="0">
+              <a:schemeClr val="accent1"/>
+            </a:fillRef>
+            <a:effectRef idx="0">
+              <a:schemeClr val="accent1"/>
+            </a:effectRef>
+            <a:fontRef idx="minor">
+              <a:schemeClr val="tx1"/>
+            </a:fontRef>
+          </p:style>
+        </p:cxnSp>
+        <p:sp>
+          <p:nvSpPr>
+            <p:cNvPr id="64" name="TextBox 7">
+              <a:extLst>
+                <a:ext uri="{FF2B5EF4-FFF2-40B4-BE49-F238E27FC236}">
+                  <a16:creationId xmlns:a16="http://schemas.microsoft.com/office/drawing/2014/main" id="{89D4E1FF-1905-419F-84FD-2654202235B0}"/>
+                </a:ext>
+              </a:extLst>
+            </p:cNvPr>
+            <p:cNvSpPr txBox="1"/>
+            <p:nvPr/>
+          </p:nvSpPr>
+          <p:spPr>
+            <a:xfrm>
+              <a:off x="2431581" y="5452972"/>
+              <a:ext cx="1827908" cy="307777"/>
+            </a:xfrm>
+            <a:prstGeom prst="rect">
+              <a:avLst/>
+            </a:prstGeom>
+            <a:noFill/>
+          </p:spPr>
+          <p:txBody>
+            <a:bodyPr wrap="square" rtlCol="0">
+              <a:spAutoFit/>
+            </a:bodyPr>
+            <a:lstStyle/>
+            <a:p>
+              <a:r>
+                <a:rPr lang="es-MX" sz="1400" b="1" i="1" dirty="0" err="1" smtClean="0">
+                  <a:solidFill>
+                    <a:srgbClr val="92D050"/>
+                  </a:solidFill>
+                </a:rPr>
+                <a:t>IntersectionAxis</a:t>
+              </a:r>
+              <a:endParaRPr lang="en-CA" sz="1400" b="1" i="1" dirty="0">
+                <a:solidFill>
+                  <a:srgbClr val="92D050"/>
+                </a:solidFill>
+              </a:endParaRPr>
+            </a:p>
+          </p:txBody>
+        </p:sp>
+        <p:sp>
+          <p:nvSpPr>
+            <p:cNvPr id="65" name="TextBox 8">
+              <a:extLst>
+                <a:ext uri="{FF2B5EF4-FFF2-40B4-BE49-F238E27FC236}">
+                  <a16:creationId xmlns:a16="http://schemas.microsoft.com/office/drawing/2014/main" id="{5ED54DD2-8B22-4BEC-BE32-A5D48A03E50B}"/>
+                </a:ext>
+              </a:extLst>
+            </p:cNvPr>
+            <p:cNvSpPr txBox="1"/>
+            <p:nvPr/>
+          </p:nvSpPr>
+          <p:spPr>
+            <a:xfrm>
+              <a:off x="3144810" y="5017529"/>
+              <a:ext cx="892184" cy="369332"/>
+            </a:xfrm>
+            <a:prstGeom prst="rect">
+              <a:avLst/>
+            </a:prstGeom>
+            <a:noFill/>
+          </p:spPr>
+          <p:txBody>
+            <a:bodyPr wrap="square" rtlCol="0">
+              <a:spAutoFit/>
+            </a:bodyPr>
+            <a:lstStyle/>
+            <a:p>
+              <a:r>
+                <a:rPr lang="en-US" b="1" i="1" dirty="0">
+                  <a:solidFill>
+                    <a:srgbClr val="92D050"/>
+                  </a:solidFill>
+                </a:rPr>
+                <a:t>z</a:t>
+              </a:r>
+              <a:endParaRPr lang="en-CA" b="1" i="1" dirty="0">
+                <a:solidFill>
+                  <a:srgbClr val="92D050"/>
+                </a:solidFill>
+              </a:endParaRPr>
+            </a:p>
+          </p:txBody>
+        </p:sp>
+        <p:sp>
+          <p:nvSpPr>
+            <p:cNvPr id="66" name="TextBox 9">
+              <a:extLst>
+                <a:ext uri="{FF2B5EF4-FFF2-40B4-BE49-F238E27FC236}">
+                  <a16:creationId xmlns:a16="http://schemas.microsoft.com/office/drawing/2014/main" id="{B967C052-BC97-4706-B318-230369DB1023}"/>
+                </a:ext>
+              </a:extLst>
+            </p:cNvPr>
+            <p:cNvSpPr txBox="1"/>
+            <p:nvPr/>
+          </p:nvSpPr>
+          <p:spPr>
+            <a:xfrm>
+              <a:off x="2366479" y="4489228"/>
+              <a:ext cx="892184" cy="369332"/>
+            </a:xfrm>
+            <a:prstGeom prst="rect">
+              <a:avLst/>
+            </a:prstGeom>
+            <a:noFill/>
+          </p:spPr>
+          <p:txBody>
+            <a:bodyPr wrap="square" rtlCol="0">
+              <a:spAutoFit/>
+            </a:bodyPr>
+            <a:lstStyle/>
+            <a:p>
+              <a:r>
+                <a:rPr lang="en-US" b="1" i="1" dirty="0">
+                  <a:solidFill>
+                    <a:srgbClr val="92D050"/>
+                  </a:solidFill>
+                </a:rPr>
+                <a:t>y</a:t>
+              </a:r>
+              <a:endParaRPr lang="en-CA" b="1" i="1" dirty="0">
+                <a:solidFill>
+                  <a:srgbClr val="92D050"/>
+                </a:solidFill>
+              </a:endParaRPr>
+            </a:p>
+          </p:txBody>
+        </p:sp>
+        <p:sp>
+          <p:nvSpPr>
+            <p:cNvPr id="67" name="TextBox 10">
+              <a:extLst>
+                <a:ext uri="{FF2B5EF4-FFF2-40B4-BE49-F238E27FC236}">
+                  <a16:creationId xmlns:a16="http://schemas.microsoft.com/office/drawing/2014/main" id="{2928FB2F-3B8B-4CBE-8A99-A3DF8CD84CA3}"/>
+                </a:ext>
+              </a:extLst>
+            </p:cNvPr>
+            <p:cNvSpPr txBox="1"/>
+            <p:nvPr/>
+          </p:nvSpPr>
+          <p:spPr>
+            <a:xfrm>
+              <a:off x="2951295" y="4523342"/>
+              <a:ext cx="892184" cy="369332"/>
+            </a:xfrm>
+            <a:prstGeom prst="rect">
+              <a:avLst/>
+            </a:prstGeom>
+            <a:noFill/>
+          </p:spPr>
+          <p:txBody>
+            <a:bodyPr wrap="square" rtlCol="0">
+              <a:spAutoFit/>
+            </a:bodyPr>
+            <a:lstStyle/>
+            <a:p>
+              <a:r>
+                <a:rPr lang="en-US" b="1" i="1" dirty="0">
+                  <a:solidFill>
+                    <a:srgbClr val="92D050"/>
+                  </a:solidFill>
+                </a:rPr>
+                <a:t>x</a:t>
+              </a:r>
+              <a:endParaRPr lang="en-CA" b="1" i="1" dirty="0">
+                <a:solidFill>
+                  <a:srgbClr val="92D050"/>
+                </a:solidFill>
+              </a:endParaRPr>
+            </a:p>
+          </p:txBody>
+        </p:sp>
+      </p:grpSp>
+      <p:sp>
+        <p:nvSpPr>
+          <p:cNvPr id="2" name="CuadroTexto 1"/>
+          <p:cNvSpPr txBox="1"/>
+          <p:nvPr/>
+        </p:nvSpPr>
+        <p:spPr>
+          <a:xfrm>
+            <a:off x="5834746" y="411480"/>
+            <a:ext cx="5941728" cy="1200329"/>
+          </a:xfrm>
+          <a:prstGeom prst="rect">
+            <a:avLst/>
+          </a:prstGeom>
+          <a:noFill/>
+        </p:spPr>
+        <p:txBody>
+          <a:bodyPr wrap="square" rtlCol="0">
+            <a:spAutoFit/>
+          </a:bodyPr>
+          <a:lstStyle/>
+          <a:p>
+            <a:r>
+              <a:rPr lang="en-US" sz="1200" i="1" dirty="0" err="1" smtClean="0"/>
+              <a:t>IntersectionAxis</a:t>
+            </a:r>
+            <a:r>
+              <a:rPr lang="en-US" sz="1200" dirty="0" smtClean="0"/>
+              <a:t>: Axes where all the </a:t>
+            </a:r>
+            <a:r>
+              <a:rPr lang="en-US" sz="1200" dirty="0" err="1" smtClean="0"/>
+              <a:t>fibulaPlanes</a:t>
+            </a:r>
+            <a:r>
+              <a:rPr lang="en-US" sz="1200" dirty="0" smtClean="0"/>
+              <a:t> are translated to calculate the intersection with the </a:t>
+            </a:r>
+            <a:r>
+              <a:rPr lang="en-US" sz="1200" dirty="0" err="1" smtClean="0"/>
+              <a:t>FibulaModel</a:t>
+            </a:r>
+            <a:endParaRPr lang="en-US" sz="1200" dirty="0"/>
+          </a:p>
+          <a:p>
+            <a:pPr marL="285750" indent="-285750">
+              <a:buFontTx/>
+              <a:buChar char="-"/>
+            </a:pPr>
+            <a:r>
+              <a:rPr lang="en-US" sz="1200" dirty="0"/>
+              <a:t>Origin: </a:t>
+            </a:r>
+            <a:r>
+              <a:rPr lang="en-US" sz="1200" dirty="0" smtClean="0"/>
+              <a:t>GUI defined point over the </a:t>
+            </a:r>
+            <a:r>
+              <a:rPr lang="en-US" sz="1200" dirty="0" err="1" smtClean="0"/>
+              <a:t>FibulaLine</a:t>
+            </a:r>
+            <a:endParaRPr lang="en-US" sz="1200" dirty="0"/>
+          </a:p>
+          <a:p>
+            <a:pPr marL="285750" indent="-285750">
+              <a:buFontTx/>
+              <a:buChar char="-"/>
+            </a:pPr>
+            <a:r>
+              <a:rPr lang="en-US" sz="1200" dirty="0" smtClean="0"/>
+              <a:t>X: same as </a:t>
+            </a:r>
+            <a:r>
+              <a:rPr lang="en-US" sz="1200" dirty="0" err="1" smtClean="0"/>
+              <a:t>FibulaX</a:t>
+            </a:r>
+            <a:endParaRPr lang="en-US" sz="1200" dirty="0" smtClean="0"/>
+          </a:p>
+          <a:p>
+            <a:pPr marL="285750" indent="-285750">
+              <a:buFontTx/>
+              <a:buChar char="-"/>
+            </a:pPr>
+            <a:r>
+              <a:rPr lang="en-US" sz="1200" dirty="0" smtClean="0"/>
+              <a:t>Y: </a:t>
+            </a:r>
+            <a:r>
+              <a:rPr lang="en-US" sz="1200" dirty="0"/>
+              <a:t>same as </a:t>
+            </a:r>
+            <a:r>
+              <a:rPr lang="en-US" sz="1200" dirty="0" err="1" smtClean="0"/>
+              <a:t>FibulaY</a:t>
+            </a:r>
+            <a:endParaRPr lang="en-US" sz="1200" dirty="0"/>
+          </a:p>
+          <a:p>
+            <a:pPr marL="285750" indent="-285750">
+              <a:buFontTx/>
+              <a:buChar char="-"/>
+            </a:pPr>
+            <a:r>
+              <a:rPr lang="en-US" sz="1200" dirty="0" smtClean="0"/>
+              <a:t>Z</a:t>
+            </a:r>
+            <a:r>
+              <a:rPr lang="en-US" sz="1200" dirty="0"/>
+              <a:t>: same as </a:t>
+            </a:r>
+            <a:r>
+              <a:rPr lang="en-US" sz="1200" dirty="0" err="1" smtClean="0"/>
+              <a:t>FibulaZ</a:t>
+            </a:r>
+            <a:endParaRPr lang="en-US" sz="1200" dirty="0"/>
+          </a:p>
+        </p:txBody>
+      </p:sp>
     </p:spTree>
     <p:extLst>
       <p:ext uri="{BB962C8B-B14F-4D97-AF65-F5344CB8AC3E}">

</xml_diff>

<commit_message>
update documentation, give better names to variables
</commit_message>
<xml_diff>
--- a/Docs/Design.pptx
+++ b/Docs/Design.pptx
@@ -12,6 +12,8 @@
     <p:sldId id="260" r:id="rId6"/>
     <p:sldId id="263" r:id="rId7"/>
     <p:sldId id="262" r:id="rId8"/>
+    <p:sldId id="264" r:id="rId9"/>
+    <p:sldId id="266" r:id="rId10"/>
   </p:sldIdLst>
   <p:sldSz cx="12192000" cy="6858000"/>
   <p:notesSz cx="6858000" cy="9144000"/>
@@ -267,7 +269,7 @@
           <a:p>
             <a:fld id="{D70168D3-9BA9-4B67-B593-8F465BBDFFE3}" type="datetimeFigureOut">
               <a:rPr lang="en-CA" smtClean="0"/>
-              <a:t>2021-02-05</a:t>
+              <a:t>2021-02-19</a:t>
             </a:fld>
             <a:endParaRPr lang="en-CA"/>
           </a:p>
@@ -467,7 +469,7 @@
           <a:p>
             <a:fld id="{D70168D3-9BA9-4B67-B593-8F465BBDFFE3}" type="datetimeFigureOut">
               <a:rPr lang="en-CA" smtClean="0"/>
-              <a:t>2021-02-05</a:t>
+              <a:t>2021-02-19</a:t>
             </a:fld>
             <a:endParaRPr lang="en-CA"/>
           </a:p>
@@ -677,7 +679,7 @@
           <a:p>
             <a:fld id="{D70168D3-9BA9-4B67-B593-8F465BBDFFE3}" type="datetimeFigureOut">
               <a:rPr lang="en-CA" smtClean="0"/>
-              <a:t>2021-02-05</a:t>
+              <a:t>2021-02-19</a:t>
             </a:fld>
             <a:endParaRPr lang="en-CA"/>
           </a:p>
@@ -877,7 +879,7 @@
           <a:p>
             <a:fld id="{D70168D3-9BA9-4B67-B593-8F465BBDFFE3}" type="datetimeFigureOut">
               <a:rPr lang="en-CA" smtClean="0"/>
-              <a:t>2021-02-05</a:t>
+              <a:t>2021-02-19</a:t>
             </a:fld>
             <a:endParaRPr lang="en-CA"/>
           </a:p>
@@ -1153,7 +1155,7 @@
           <a:p>
             <a:fld id="{D70168D3-9BA9-4B67-B593-8F465BBDFFE3}" type="datetimeFigureOut">
               <a:rPr lang="en-CA" smtClean="0"/>
-              <a:t>2021-02-05</a:t>
+              <a:t>2021-02-19</a:t>
             </a:fld>
             <a:endParaRPr lang="en-CA"/>
           </a:p>
@@ -1421,7 +1423,7 @@
           <a:p>
             <a:fld id="{D70168D3-9BA9-4B67-B593-8F465BBDFFE3}" type="datetimeFigureOut">
               <a:rPr lang="en-CA" smtClean="0"/>
-              <a:t>2021-02-05</a:t>
+              <a:t>2021-02-19</a:t>
             </a:fld>
             <a:endParaRPr lang="en-CA"/>
           </a:p>
@@ -1836,7 +1838,7 @@
           <a:p>
             <a:fld id="{D70168D3-9BA9-4B67-B593-8F465BBDFFE3}" type="datetimeFigureOut">
               <a:rPr lang="en-CA" smtClean="0"/>
-              <a:t>2021-02-05</a:t>
+              <a:t>2021-02-19</a:t>
             </a:fld>
             <a:endParaRPr lang="en-CA"/>
           </a:p>
@@ -1978,7 +1980,7 @@
           <a:p>
             <a:fld id="{D70168D3-9BA9-4B67-B593-8F465BBDFFE3}" type="datetimeFigureOut">
               <a:rPr lang="en-CA" smtClean="0"/>
-              <a:t>2021-02-05</a:t>
+              <a:t>2021-02-19</a:t>
             </a:fld>
             <a:endParaRPr lang="en-CA"/>
           </a:p>
@@ -2091,7 +2093,7 @@
           <a:p>
             <a:fld id="{D70168D3-9BA9-4B67-B593-8F465BBDFFE3}" type="datetimeFigureOut">
               <a:rPr lang="en-CA" smtClean="0"/>
-              <a:t>2021-02-05</a:t>
+              <a:t>2021-02-19</a:t>
             </a:fld>
             <a:endParaRPr lang="en-CA"/>
           </a:p>
@@ -2404,7 +2406,7 @@
           <a:p>
             <a:fld id="{D70168D3-9BA9-4B67-B593-8F465BBDFFE3}" type="datetimeFigureOut">
               <a:rPr lang="en-CA" smtClean="0"/>
-              <a:t>2021-02-05</a:t>
+              <a:t>2021-02-19</a:t>
             </a:fld>
             <a:endParaRPr lang="en-CA"/>
           </a:p>
@@ -2693,7 +2695,7 @@
           <a:p>
             <a:fld id="{D70168D3-9BA9-4B67-B593-8F465BBDFFE3}" type="datetimeFigureOut">
               <a:rPr lang="en-CA" smtClean="0"/>
-              <a:t>2021-02-05</a:t>
+              <a:t>2021-02-19</a:t>
             </a:fld>
             <a:endParaRPr lang="en-CA"/>
           </a:p>
@@ -2936,7 +2938,7 @@
           <a:p>
             <a:fld id="{D70168D3-9BA9-4B67-B593-8F465BBDFFE3}" type="datetimeFigureOut">
               <a:rPr lang="en-CA" smtClean="0"/>
-              <a:t>2021-02-05</a:t>
+              <a:t>2021-02-19</a:t>
             </a:fld>
             <a:endParaRPr lang="en-CA"/>
           </a:p>
@@ -14785,6 +14787,746 @@
 </p:sld>
 </file>
 
+<file path=ppt/slides/slide8.xml><?xml version="1.0" encoding="utf-8"?>
+<p:sld xmlns:a="http://schemas.openxmlformats.org/drawingml/2006/main" xmlns:r="http://schemas.openxmlformats.org/officeDocument/2006/relationships" xmlns:p="http://schemas.openxmlformats.org/presentationml/2006/main">
+  <p:cSld>
+    <p:bg>
+      <p:bgPr>
+        <a:solidFill>
+          <a:srgbClr val="999BD2"/>
+        </a:solidFill>
+        <a:effectLst/>
+      </p:bgPr>
+    </p:bg>
+    <p:spTree>
+      <p:nvGrpSpPr>
+        <p:cNvPr id="1" name=""/>
+        <p:cNvGrpSpPr/>
+        <p:nvPr/>
+      </p:nvGrpSpPr>
+      <p:grpSpPr>
+        <a:xfrm>
+          <a:off x="0" y="0"/>
+          <a:ext cx="0" cy="0"/>
+          <a:chOff x="0" y="0"/>
+          <a:chExt cx="0" cy="0"/>
+        </a:xfrm>
+      </p:grpSpPr>
+      <p:pic>
+        <p:nvPicPr>
+          <p:cNvPr id="3" name="Imagen 2"/>
+          <p:cNvPicPr>
+            <a:picLocks noChangeAspect="1"/>
+          </p:cNvPicPr>
+          <p:nvPr/>
+        </p:nvPicPr>
+        <p:blipFill>
+          <a:blip r:embed="rId2">
+            <a:extLst>
+              <a:ext uri="{28A0092B-C50C-407E-A947-70E740481C1C}">
+                <a14:useLocalDpi xmlns:a14="http://schemas.microsoft.com/office/drawing/2010/main" val="0"/>
+              </a:ext>
+            </a:extLst>
+          </a:blip>
+          <a:stretch>
+            <a:fillRect/>
+          </a:stretch>
+        </p:blipFill>
+        <p:spPr>
+          <a:xfrm>
+            <a:off x="2346446" y="58000"/>
+            <a:ext cx="7019048" cy="6800000"/>
+          </a:xfrm>
+          <a:prstGeom prst="rect">
+            <a:avLst/>
+          </a:prstGeom>
+        </p:spPr>
+      </p:pic>
+      <p:sp>
+        <p:nvSpPr>
+          <p:cNvPr id="2" name="Título 1"/>
+          <p:cNvSpPr>
+            <a:spLocks noGrp="1"/>
+          </p:cNvSpPr>
+          <p:nvPr>
+            <p:ph type="title"/>
+          </p:nvPr>
+        </p:nvSpPr>
+        <p:spPr>
+          <a:xfrm>
+            <a:off x="49016" y="993775"/>
+            <a:ext cx="2865120" cy="1325563"/>
+          </a:xfrm>
+        </p:spPr>
+        <p:txBody>
+          <a:bodyPr>
+            <a:normAutofit fontScale="90000"/>
+          </a:bodyPr>
+          <a:lstStyle/>
+          <a:p>
+            <a:r>
+              <a:rPr lang="es-MX" dirty="0" err="1" smtClean="0"/>
+              <a:t>Surgical</a:t>
+            </a:r>
+            <a:r>
+              <a:rPr lang="es-MX" dirty="0" smtClean="0"/>
+              <a:t> </a:t>
+            </a:r>
+            <a:r>
+              <a:rPr lang="es-MX" dirty="0" err="1" smtClean="0"/>
+              <a:t>Guide</a:t>
+            </a:r>
+            <a:r>
+              <a:rPr lang="es-MX" dirty="0" smtClean="0"/>
+              <a:t> </a:t>
+            </a:r>
+            <a:r>
+              <a:rPr lang="es-MX" dirty="0" err="1" smtClean="0"/>
+              <a:t>Generation</a:t>
+            </a:r>
+            <a:r>
+              <a:rPr lang="es-MX" dirty="0" smtClean="0"/>
+              <a:t> </a:t>
+            </a:r>
+            <a:r>
+              <a:rPr lang="es-MX" dirty="0" err="1"/>
+              <a:t>p</a:t>
+            </a:r>
+            <a:r>
+              <a:rPr lang="es-MX" dirty="0" err="1" smtClean="0"/>
+              <a:t>arameters</a:t>
+            </a:r>
+            <a:r>
+              <a:rPr lang="es-MX" dirty="0" smtClean="0"/>
+              <a:t> </a:t>
+            </a:r>
+            <a:r>
+              <a:rPr lang="es-MX" dirty="0" err="1" smtClean="0"/>
+              <a:t>definition</a:t>
+            </a:r>
+            <a:endParaRPr lang="en-US" dirty="0"/>
+          </a:p>
+        </p:txBody>
+      </p:sp>
+      <p:cxnSp>
+        <p:nvCxnSpPr>
+          <p:cNvPr id="5" name="Conector recto 4"/>
+          <p:cNvCxnSpPr/>
+          <p:nvPr/>
+        </p:nvCxnSpPr>
+        <p:spPr>
+          <a:xfrm flipV="1">
+            <a:off x="4183380" y="3760470"/>
+            <a:ext cx="1074420" cy="262890"/>
+          </a:xfrm>
+          <a:prstGeom prst="line">
+            <a:avLst/>
+          </a:prstGeom>
+          <a:ln w="57150"/>
+        </p:spPr>
+        <p:style>
+          <a:lnRef idx="1">
+            <a:schemeClr val="accent1"/>
+          </a:lnRef>
+          <a:fillRef idx="0">
+            <a:schemeClr val="accent1"/>
+          </a:fillRef>
+          <a:effectRef idx="0">
+            <a:schemeClr val="accent1"/>
+          </a:effectRef>
+          <a:fontRef idx="minor">
+            <a:schemeClr val="tx1"/>
+          </a:fontRef>
+        </p:style>
+      </p:cxnSp>
+      <p:sp>
+        <p:nvSpPr>
+          <p:cNvPr id="6" name="CuadroTexto 5"/>
+          <p:cNvSpPr txBox="1"/>
+          <p:nvPr/>
+        </p:nvSpPr>
+        <p:spPr>
+          <a:xfrm>
+            <a:off x="4200270" y="3368695"/>
+            <a:ext cx="1057530" cy="523220"/>
+          </a:xfrm>
+          <a:prstGeom prst="rect">
+            <a:avLst/>
+          </a:prstGeom>
+          <a:noFill/>
+        </p:spPr>
+        <p:txBody>
+          <a:bodyPr wrap="square" rtlCol="0">
+            <a:spAutoFit/>
+          </a:bodyPr>
+          <a:lstStyle/>
+          <a:p>
+            <a:r>
+              <a:rPr lang="es-MX" sz="1400" dirty="0" err="1" smtClean="0"/>
+              <a:t>biggerMiterBoxHeight</a:t>
+            </a:r>
+            <a:endParaRPr lang="en-US" sz="1400" dirty="0"/>
+          </a:p>
+        </p:txBody>
+      </p:sp>
+      <p:cxnSp>
+        <p:nvCxnSpPr>
+          <p:cNvPr id="9" name="Conector recto 8"/>
+          <p:cNvCxnSpPr/>
+          <p:nvPr/>
+        </p:nvCxnSpPr>
+        <p:spPr>
+          <a:xfrm flipH="1" flipV="1">
+            <a:off x="5257800" y="3760470"/>
+            <a:ext cx="285750" cy="697230"/>
+          </a:xfrm>
+          <a:prstGeom prst="line">
+            <a:avLst/>
+          </a:prstGeom>
+          <a:ln w="57150"/>
+        </p:spPr>
+        <p:style>
+          <a:lnRef idx="1">
+            <a:schemeClr val="accent2"/>
+          </a:lnRef>
+          <a:fillRef idx="0">
+            <a:schemeClr val="accent2"/>
+          </a:fillRef>
+          <a:effectRef idx="0">
+            <a:schemeClr val="accent2"/>
+          </a:effectRef>
+          <a:fontRef idx="minor">
+            <a:schemeClr val="tx1"/>
+          </a:fontRef>
+        </p:style>
+      </p:cxnSp>
+      <p:sp>
+        <p:nvSpPr>
+          <p:cNvPr id="10" name="CuadroTexto 9"/>
+          <p:cNvSpPr txBox="1"/>
+          <p:nvPr/>
+        </p:nvSpPr>
+        <p:spPr>
+          <a:xfrm>
+            <a:off x="5257800" y="4437400"/>
+            <a:ext cx="1057530" cy="523220"/>
+          </a:xfrm>
+          <a:prstGeom prst="rect">
+            <a:avLst/>
+          </a:prstGeom>
+          <a:noFill/>
+        </p:spPr>
+        <p:txBody>
+          <a:bodyPr wrap="square" rtlCol="0">
+            <a:spAutoFit/>
+          </a:bodyPr>
+          <a:lstStyle/>
+          <a:p>
+            <a:r>
+              <a:rPr lang="es-MX" sz="1400" dirty="0" err="1" smtClean="0"/>
+              <a:t>biggerMiterBoxWidth</a:t>
+            </a:r>
+            <a:endParaRPr lang="en-US" sz="1400" dirty="0"/>
+          </a:p>
+        </p:txBody>
+      </p:sp>
+      <p:cxnSp>
+        <p:nvCxnSpPr>
+          <p:cNvPr id="12" name="Conector recto 11"/>
+          <p:cNvCxnSpPr/>
+          <p:nvPr/>
+        </p:nvCxnSpPr>
+        <p:spPr>
+          <a:xfrm flipH="1">
+            <a:off x="5257800" y="2766060"/>
+            <a:ext cx="834390" cy="994410"/>
+          </a:xfrm>
+          <a:prstGeom prst="line">
+            <a:avLst/>
+          </a:prstGeom>
+          <a:ln w="57150"/>
+        </p:spPr>
+        <p:style>
+          <a:lnRef idx="1">
+            <a:schemeClr val="accent3"/>
+          </a:lnRef>
+          <a:fillRef idx="0">
+            <a:schemeClr val="accent3"/>
+          </a:fillRef>
+          <a:effectRef idx="0">
+            <a:schemeClr val="accent3"/>
+          </a:effectRef>
+          <a:fontRef idx="minor">
+            <a:schemeClr val="tx1"/>
+          </a:fontRef>
+        </p:style>
+      </p:cxnSp>
+      <p:sp>
+        <p:nvSpPr>
+          <p:cNvPr id="13" name="CuadroTexto 12"/>
+          <p:cNvSpPr txBox="1"/>
+          <p:nvPr/>
+        </p:nvSpPr>
+        <p:spPr>
+          <a:xfrm>
+            <a:off x="5563425" y="2319010"/>
+            <a:ext cx="1057530" cy="523220"/>
+          </a:xfrm>
+          <a:prstGeom prst="rect">
+            <a:avLst/>
+          </a:prstGeom>
+          <a:noFill/>
+        </p:spPr>
+        <p:txBody>
+          <a:bodyPr wrap="square" rtlCol="0">
+            <a:spAutoFit/>
+          </a:bodyPr>
+          <a:lstStyle/>
+          <a:p>
+            <a:r>
+              <a:rPr lang="es-MX" sz="1400" dirty="0" err="1" smtClean="0"/>
+              <a:t>biggerMiterBoxLength</a:t>
+            </a:r>
+            <a:endParaRPr lang="en-US" sz="1400" dirty="0"/>
+          </a:p>
+        </p:txBody>
+      </p:sp>
+      <p:cxnSp>
+        <p:nvCxnSpPr>
+          <p:cNvPr id="15" name="Conector recto 14"/>
+          <p:cNvCxnSpPr/>
+          <p:nvPr/>
+        </p:nvCxnSpPr>
+        <p:spPr>
+          <a:xfrm>
+            <a:off x="8128000" y="3314700"/>
+            <a:ext cx="47625" cy="136525"/>
+          </a:xfrm>
+          <a:prstGeom prst="line">
+            <a:avLst/>
+          </a:prstGeom>
+          <a:ln w="28575"/>
+        </p:spPr>
+        <p:style>
+          <a:lnRef idx="1">
+            <a:schemeClr val="accent2"/>
+          </a:lnRef>
+          <a:fillRef idx="0">
+            <a:schemeClr val="accent2"/>
+          </a:fillRef>
+          <a:effectRef idx="0">
+            <a:schemeClr val="accent2"/>
+          </a:effectRef>
+          <a:fontRef idx="minor">
+            <a:schemeClr val="tx1"/>
+          </a:fontRef>
+        </p:style>
+      </p:cxnSp>
+      <p:sp>
+        <p:nvSpPr>
+          <p:cNvPr id="16" name="CuadroTexto 15"/>
+          <p:cNvSpPr txBox="1"/>
+          <p:nvPr/>
+        </p:nvSpPr>
+        <p:spPr>
+          <a:xfrm>
+            <a:off x="7506372" y="3382962"/>
+            <a:ext cx="1415670" cy="307777"/>
+          </a:xfrm>
+          <a:prstGeom prst="rect">
+            <a:avLst/>
+          </a:prstGeom>
+          <a:noFill/>
+        </p:spPr>
+        <p:txBody>
+          <a:bodyPr wrap="square" rtlCol="0">
+            <a:spAutoFit/>
+          </a:bodyPr>
+          <a:lstStyle/>
+          <a:p>
+            <a:r>
+              <a:rPr lang="es-MX" sz="1400" dirty="0" err="1"/>
+              <a:t>m</a:t>
+            </a:r>
+            <a:r>
+              <a:rPr lang="es-MX" sz="1400" dirty="0" err="1" smtClean="0"/>
+              <a:t>iterBoxHeight</a:t>
+            </a:r>
+            <a:endParaRPr lang="en-US" sz="1400" dirty="0"/>
+          </a:p>
+        </p:txBody>
+      </p:sp>
+      <p:cxnSp>
+        <p:nvCxnSpPr>
+          <p:cNvPr id="18" name="Conector recto 17"/>
+          <p:cNvCxnSpPr/>
+          <p:nvPr/>
+        </p:nvCxnSpPr>
+        <p:spPr>
+          <a:xfrm flipH="1">
+            <a:off x="8128001" y="2562225"/>
+            <a:ext cx="632618" cy="752475"/>
+          </a:xfrm>
+          <a:prstGeom prst="line">
+            <a:avLst/>
+          </a:prstGeom>
+          <a:ln w="28575"/>
+        </p:spPr>
+        <p:style>
+          <a:lnRef idx="1">
+            <a:schemeClr val="accent3"/>
+          </a:lnRef>
+          <a:fillRef idx="0">
+            <a:schemeClr val="accent3"/>
+          </a:fillRef>
+          <a:effectRef idx="0">
+            <a:schemeClr val="accent3"/>
+          </a:effectRef>
+          <a:fontRef idx="minor">
+            <a:schemeClr val="tx1"/>
+          </a:fontRef>
+        </p:style>
+      </p:cxnSp>
+      <p:sp>
+        <p:nvSpPr>
+          <p:cNvPr id="20" name="CuadroTexto 19"/>
+          <p:cNvSpPr txBox="1"/>
+          <p:nvPr/>
+        </p:nvSpPr>
+        <p:spPr>
+          <a:xfrm>
+            <a:off x="8062118" y="2254448"/>
+            <a:ext cx="1397001" cy="307777"/>
+          </a:xfrm>
+          <a:prstGeom prst="rect">
+            <a:avLst/>
+          </a:prstGeom>
+          <a:noFill/>
+        </p:spPr>
+        <p:txBody>
+          <a:bodyPr wrap="square" rtlCol="0">
+            <a:spAutoFit/>
+          </a:bodyPr>
+          <a:lstStyle/>
+          <a:p>
+            <a:r>
+              <a:rPr lang="es-MX" sz="1400" dirty="0" err="1" smtClean="0"/>
+              <a:t>miterBoxLength</a:t>
+            </a:r>
+            <a:endParaRPr lang="en-US" sz="1400" dirty="0"/>
+          </a:p>
+        </p:txBody>
+      </p:sp>
+      <p:cxnSp>
+        <p:nvCxnSpPr>
+          <p:cNvPr id="24" name="Conector recto 23"/>
+          <p:cNvCxnSpPr/>
+          <p:nvPr/>
+        </p:nvCxnSpPr>
+        <p:spPr>
+          <a:xfrm>
+            <a:off x="5674995" y="3314700"/>
+            <a:ext cx="121954" cy="222150"/>
+          </a:xfrm>
+          <a:prstGeom prst="line">
+            <a:avLst/>
+          </a:prstGeom>
+          <a:ln w="28575">
+            <a:solidFill>
+              <a:schemeClr val="accent2"/>
+            </a:solidFill>
+          </a:ln>
+        </p:spPr>
+        <p:style>
+          <a:lnRef idx="1">
+            <a:schemeClr val="accent1"/>
+          </a:lnRef>
+          <a:fillRef idx="0">
+            <a:schemeClr val="accent1"/>
+          </a:fillRef>
+          <a:effectRef idx="0">
+            <a:schemeClr val="accent1"/>
+          </a:effectRef>
+          <a:fontRef idx="minor">
+            <a:schemeClr val="tx1"/>
+          </a:fontRef>
+        </p:style>
+      </p:cxnSp>
+      <p:cxnSp>
+        <p:nvCxnSpPr>
+          <p:cNvPr id="29" name="Conector recto de flecha 28"/>
+          <p:cNvCxnSpPr/>
+          <p:nvPr/>
+        </p:nvCxnSpPr>
+        <p:spPr>
+          <a:xfrm flipV="1">
+            <a:off x="5796949" y="2408336"/>
+            <a:ext cx="1297271" cy="960359"/>
+          </a:xfrm>
+          <a:prstGeom prst="straightConnector1">
+            <a:avLst/>
+          </a:prstGeom>
+          <a:ln>
+            <a:solidFill>
+              <a:schemeClr val="tx1"/>
+            </a:solidFill>
+            <a:tailEnd type="triangle"/>
+          </a:ln>
+        </p:spPr>
+        <p:style>
+          <a:lnRef idx="1">
+            <a:schemeClr val="accent1"/>
+          </a:lnRef>
+          <a:fillRef idx="0">
+            <a:schemeClr val="accent1"/>
+          </a:fillRef>
+          <a:effectRef idx="0">
+            <a:schemeClr val="accent1"/>
+          </a:effectRef>
+          <a:fontRef idx="minor">
+            <a:schemeClr val="tx1"/>
+          </a:fontRef>
+        </p:style>
+      </p:cxnSp>
+      <p:sp>
+        <p:nvSpPr>
+          <p:cNvPr id="30" name="CuadroTexto 29"/>
+          <p:cNvSpPr txBox="1"/>
+          <p:nvPr/>
+        </p:nvSpPr>
+        <p:spPr>
+          <a:xfrm>
+            <a:off x="6742909" y="2165121"/>
+            <a:ext cx="1057530" cy="307777"/>
+          </a:xfrm>
+          <a:prstGeom prst="rect">
+            <a:avLst/>
+          </a:prstGeom>
+          <a:noFill/>
+        </p:spPr>
+        <p:txBody>
+          <a:bodyPr wrap="square" rtlCol="0">
+            <a:spAutoFit/>
+          </a:bodyPr>
+          <a:lstStyle/>
+          <a:p>
+            <a:r>
+              <a:rPr lang="es-MX" sz="1400" dirty="0" err="1" smtClean="0"/>
+              <a:t>slotWall</a:t>
+            </a:r>
+            <a:endParaRPr lang="en-US" sz="1400" dirty="0"/>
+          </a:p>
+        </p:txBody>
+      </p:sp>
+    </p:spTree>
+    <p:extLst>
+      <p:ext uri="{BB962C8B-B14F-4D97-AF65-F5344CB8AC3E}">
+        <p14:creationId xmlns:p14="http://schemas.microsoft.com/office/powerpoint/2010/main" val="556235365"/>
+      </p:ext>
+    </p:extLst>
+  </p:cSld>
+  <p:clrMapOvr>
+    <a:masterClrMapping/>
+  </p:clrMapOvr>
+</p:sld>
+</file>
+
+<file path=ppt/slides/slide9.xml><?xml version="1.0" encoding="utf-8"?>
+<p:sld xmlns:a="http://schemas.openxmlformats.org/drawingml/2006/main" xmlns:r="http://schemas.openxmlformats.org/officeDocument/2006/relationships" xmlns:p="http://schemas.openxmlformats.org/presentationml/2006/main">
+  <p:cSld>
+    <p:bg>
+      <p:bgPr>
+        <a:solidFill>
+          <a:srgbClr val="999BD2"/>
+        </a:solidFill>
+        <a:effectLst/>
+      </p:bgPr>
+    </p:bg>
+    <p:spTree>
+      <p:nvGrpSpPr>
+        <p:cNvPr id="1" name=""/>
+        <p:cNvGrpSpPr/>
+        <p:nvPr/>
+      </p:nvGrpSpPr>
+      <p:grpSpPr>
+        <a:xfrm>
+          <a:off x="0" y="0"/>
+          <a:ext cx="0" cy="0"/>
+          <a:chOff x="0" y="0"/>
+          <a:chExt cx="0" cy="0"/>
+        </a:xfrm>
+      </p:grpSpPr>
+      <p:sp>
+        <p:nvSpPr>
+          <p:cNvPr id="19" name="Título 18"/>
+          <p:cNvSpPr txBox="1">
+            <a:spLocks noGrp="1"/>
+          </p:cNvSpPr>
+          <p:nvPr>
+            <p:ph type="title"/>
+          </p:nvPr>
+        </p:nvSpPr>
+        <p:spPr>
+          <a:xfrm>
+            <a:off x="0" y="1422463"/>
+            <a:ext cx="12192000" cy="4524315"/>
+          </a:xfrm>
+          <a:prstGeom prst="rect">
+            <a:avLst/>
+          </a:prstGeom>
+          <a:noFill/>
+        </p:spPr>
+        <p:txBody>
+          <a:bodyPr wrap="square" rtlCol="0">
+            <a:spAutoFit/>
+          </a:bodyPr>
+          <a:lstStyle/>
+          <a:p>
+            <a:r>
+              <a:rPr lang="en-US" sz="3200" dirty="0" err="1"/>
+              <a:t>miterBoxWidth</a:t>
+            </a:r>
+            <a:r>
+              <a:rPr lang="en-US" sz="3200" dirty="0"/>
+              <a:t> = miterBoxSlotWidth+2*</a:t>
+            </a:r>
+            <a:r>
+              <a:rPr lang="en-US" sz="3200" dirty="0" err="1"/>
+              <a:t>clearanceFitPrintingTolerance</a:t>
+            </a:r>
+            <a:r>
+              <a:rPr lang="en-US" sz="3200" dirty="0"/>
+              <a:t/>
+            </a:r>
+            <a:br>
+              <a:rPr lang="en-US" sz="3200" dirty="0"/>
+            </a:br>
+            <a:r>
+              <a:rPr lang="en-US" sz="3200" dirty="0" err="1" smtClean="0"/>
+              <a:t>miterBoxLength</a:t>
+            </a:r>
+            <a:r>
+              <a:rPr lang="en-US" sz="3200" dirty="0"/>
+              <a:t> = </a:t>
+            </a:r>
+            <a:r>
+              <a:rPr lang="en-US" sz="3200" dirty="0" err="1"/>
+              <a:t>miterBoxSlotLength</a:t>
+            </a:r>
+            <a:r>
+              <a:rPr lang="en-US" sz="3200" dirty="0"/>
+              <a:t/>
+            </a:r>
+            <a:br>
+              <a:rPr lang="en-US" sz="3200" dirty="0"/>
+            </a:br>
+            <a:r>
+              <a:rPr lang="en-US" sz="3200" dirty="0" err="1" smtClean="0"/>
+              <a:t>miterBoxHeight</a:t>
+            </a:r>
+            <a:r>
+              <a:rPr lang="en-US" sz="3200" dirty="0"/>
+              <a:t> = </a:t>
+            </a:r>
+            <a:r>
+              <a:rPr lang="en-US" sz="3200" dirty="0" smtClean="0"/>
+              <a:t>70</a:t>
+            </a:r>
+            <a:br>
+              <a:rPr lang="en-US" sz="3200" dirty="0" smtClean="0"/>
+            </a:br>
+            <a:r>
+              <a:rPr lang="en-US" sz="3200" dirty="0" smtClean="0"/>
+              <a:t/>
+            </a:r>
+            <a:br>
+              <a:rPr lang="en-US" sz="3200" dirty="0" smtClean="0"/>
+            </a:br>
+            <a:r>
+              <a:rPr lang="en-US" sz="3200" dirty="0" err="1"/>
+              <a:t>biggerMiterBoxWidth</a:t>
+            </a:r>
+            <a:r>
+              <a:rPr lang="en-US" sz="3200" dirty="0"/>
+              <a:t> = </a:t>
+            </a:r>
+            <a:r>
+              <a:rPr lang="en-US" sz="3200" dirty="0" smtClean="0"/>
+              <a:t>miterBoxSlotWidth+2*clearanceFitPrintingTolerance+2*</a:t>
+            </a:r>
+            <a:r>
+              <a:rPr lang="en-US" sz="3200" dirty="0" err="1" smtClean="0"/>
+              <a:t>slotWall</a:t>
+            </a:r>
+            <a:r>
+              <a:rPr lang="en-US" sz="3200" dirty="0"/>
+              <a:t/>
+            </a:r>
+            <a:br>
+              <a:rPr lang="en-US" sz="3200" dirty="0"/>
+            </a:br>
+            <a:r>
+              <a:rPr lang="en-US" sz="3200" dirty="0" err="1" smtClean="0"/>
+              <a:t>biggerMiterBoxLength</a:t>
+            </a:r>
+            <a:r>
+              <a:rPr lang="en-US" sz="3200" dirty="0"/>
+              <a:t> = miterBoxSlotLength+2*</a:t>
+            </a:r>
+            <a:r>
+              <a:rPr lang="en-US" sz="3200" dirty="0" err="1"/>
+              <a:t>slotWall</a:t>
+            </a:r>
+            <a:r>
+              <a:rPr lang="en-US" sz="3200" dirty="0"/>
+              <a:t/>
+            </a:r>
+            <a:br>
+              <a:rPr lang="en-US" sz="3200" dirty="0"/>
+            </a:br>
+            <a:r>
+              <a:rPr lang="en-US" sz="3200" dirty="0" err="1" smtClean="0"/>
+              <a:t>biggerMiterBoxHeight</a:t>
+            </a:r>
+            <a:r>
+              <a:rPr lang="en-US" sz="3200" dirty="0"/>
+              <a:t> = </a:t>
+            </a:r>
+            <a:r>
+              <a:rPr lang="en-US" sz="3200" dirty="0" err="1" smtClean="0"/>
+              <a:t>miterBoxSlotHeight</a:t>
+            </a:r>
+            <a:r>
+              <a:rPr lang="en-US" sz="3200" dirty="0"/>
+              <a:t/>
+            </a:r>
+            <a:br>
+              <a:rPr lang="en-US" sz="3200" dirty="0"/>
+            </a:br>
+            <a:r>
+              <a:rPr lang="en-US" sz="3200" dirty="0"/>
+              <a:t/>
+            </a:r>
+            <a:br>
+              <a:rPr lang="en-US" sz="3200" dirty="0"/>
+            </a:br>
+            <a:endParaRPr lang="en-US" sz="3200" dirty="0"/>
+          </a:p>
+        </p:txBody>
+      </p:sp>
+    </p:spTree>
+    <p:extLst>
+      <p:ext uri="{BB962C8B-B14F-4D97-AF65-F5344CB8AC3E}">
+        <p14:creationId xmlns:p14="http://schemas.microsoft.com/office/powerpoint/2010/main" val="901838849"/>
+      </p:ext>
+    </p:extLst>
+  </p:cSld>
+  <p:clrMapOvr>
+    <a:masterClrMapping/>
+  </p:clrMapOvr>
+</p:sld>
+</file>
+
 <file path=ppt/theme/theme1.xml><?xml version="1.0" encoding="utf-8"?>
 <a:theme xmlns:a="http://schemas.openxmlformats.org/drawingml/2006/main" name="Office Theme">
   <a:themeElements>

</xml_diff>

<commit_message>
update documentation with explanation of miterBoxDirectionLine
</commit_message>
<xml_diff>
--- a/Docs/Design.pptx
+++ b/Docs/Design.pptx
@@ -14,6 +14,7 @@
     <p:sldId id="262" r:id="rId8"/>
     <p:sldId id="264" r:id="rId9"/>
     <p:sldId id="266" r:id="rId10"/>
+    <p:sldId id="267" r:id="rId11"/>
   </p:sldIdLst>
   <p:sldSz cx="12192000" cy="6858000"/>
   <p:notesSz cx="6858000" cy="9144000"/>
@@ -3413,6 +3414,253 @@
     <p:extLst>
       <p:ext uri="{BB962C8B-B14F-4D97-AF65-F5344CB8AC3E}">
         <p14:creationId xmlns:p14="http://schemas.microsoft.com/office/powerpoint/2010/main" val="3561979809"/>
+      </p:ext>
+    </p:extLst>
+  </p:cSld>
+  <p:clrMapOvr>
+    <a:masterClrMapping/>
+  </p:clrMapOvr>
+</p:sld>
+</file>
+
+<file path=ppt/slides/slide10.xml><?xml version="1.0" encoding="utf-8"?>
+<p:sld xmlns:a="http://schemas.openxmlformats.org/drawingml/2006/main" xmlns:r="http://schemas.openxmlformats.org/officeDocument/2006/relationships" xmlns:p="http://schemas.openxmlformats.org/presentationml/2006/main">
+  <p:cSld>
+    <p:bg>
+      <p:bgPr>
+        <a:solidFill>
+          <a:srgbClr val="999BD2"/>
+        </a:solidFill>
+        <a:effectLst/>
+      </p:bgPr>
+    </p:bg>
+    <p:spTree>
+      <p:nvGrpSpPr>
+        <p:cNvPr id="1" name=""/>
+        <p:cNvGrpSpPr/>
+        <p:nvPr/>
+      </p:nvGrpSpPr>
+      <p:grpSpPr>
+        <a:xfrm>
+          <a:off x="0" y="0"/>
+          <a:ext cx="0" cy="0"/>
+          <a:chOff x="0" y="0"/>
+          <a:chExt cx="0" cy="0"/>
+        </a:xfrm>
+      </p:grpSpPr>
+      <p:pic>
+        <p:nvPicPr>
+          <p:cNvPr id="3" name="Imagen 2"/>
+          <p:cNvPicPr>
+            <a:picLocks noChangeAspect="1"/>
+          </p:cNvPicPr>
+          <p:nvPr/>
+        </p:nvPicPr>
+        <p:blipFill>
+          <a:blip r:embed="rId2">
+            <a:extLst>
+              <a:ext uri="{28A0092B-C50C-407E-A947-70E740481C1C}">
+                <a14:useLocalDpi xmlns:a14="http://schemas.microsoft.com/office/drawing/2010/main" val="0"/>
+              </a:ext>
+            </a:extLst>
+          </a:blip>
+          <a:stretch>
+            <a:fillRect/>
+          </a:stretch>
+        </p:blipFill>
+        <p:spPr>
+          <a:xfrm>
+            <a:off x="2586476" y="100428"/>
+            <a:ext cx="7019048" cy="6657143"/>
+          </a:xfrm>
+          <a:prstGeom prst="rect">
+            <a:avLst/>
+          </a:prstGeom>
+        </p:spPr>
+      </p:pic>
+      <p:sp>
+        <p:nvSpPr>
+          <p:cNvPr id="2" name="Título 1"/>
+          <p:cNvSpPr>
+            <a:spLocks noGrp="1"/>
+          </p:cNvSpPr>
+          <p:nvPr>
+            <p:ph type="title"/>
+          </p:nvPr>
+        </p:nvSpPr>
+        <p:spPr>
+          <a:xfrm>
+            <a:off x="2840990" y="16369"/>
+            <a:ext cx="6503670" cy="1325563"/>
+          </a:xfrm>
+        </p:spPr>
+        <p:txBody>
+          <a:bodyPr>
+            <a:normAutofit/>
+          </a:bodyPr>
+          <a:lstStyle/>
+          <a:p>
+            <a:r>
+              <a:rPr lang="es-MX" sz="3600" dirty="0" err="1" smtClean="0"/>
+              <a:t>miterBoxDirectionLine</a:t>
+            </a:r>
+            <a:r>
+              <a:rPr lang="es-MX" sz="3600" dirty="0" smtClean="0"/>
+              <a:t> defines </a:t>
+            </a:r>
+            <a:r>
+              <a:rPr lang="es-MX" sz="3600" dirty="0" err="1" smtClean="0"/>
+              <a:t>the</a:t>
+            </a:r>
+            <a:r>
+              <a:rPr lang="es-MX" sz="3600" dirty="0" smtClean="0"/>
+              <a:t> </a:t>
+            </a:r>
+            <a:r>
+              <a:rPr lang="es-MX" sz="3600" dirty="0" err="1" smtClean="0"/>
+              <a:t>direction</a:t>
+            </a:r>
+            <a:r>
+              <a:rPr lang="es-MX" sz="3600" dirty="0" smtClean="0"/>
+              <a:t> </a:t>
+            </a:r>
+            <a:r>
+              <a:rPr lang="es-MX" sz="3600" dirty="0" err="1" smtClean="0"/>
+              <a:t>the</a:t>
+            </a:r>
+            <a:r>
+              <a:rPr lang="es-MX" sz="3600" dirty="0" smtClean="0"/>
+              <a:t> </a:t>
+            </a:r>
+            <a:r>
+              <a:rPr lang="es-MX" sz="3600" dirty="0" err="1" smtClean="0"/>
+              <a:t>miterBoxes</a:t>
+            </a:r>
+            <a:r>
+              <a:rPr lang="es-MX" sz="3600" dirty="0" smtClean="0"/>
+              <a:t> </a:t>
+            </a:r>
+            <a:r>
+              <a:rPr lang="es-MX" sz="3600" dirty="0" err="1" smtClean="0"/>
+              <a:t>will</a:t>
+            </a:r>
+            <a:r>
+              <a:rPr lang="es-MX" sz="3600" dirty="0" smtClean="0"/>
+              <a:t> </a:t>
+            </a:r>
+            <a:r>
+              <a:rPr lang="es-MX" sz="3600" dirty="0" err="1" smtClean="0"/>
+              <a:t>have</a:t>
+            </a:r>
+            <a:endParaRPr lang="en-US" sz="3600" dirty="0"/>
+          </a:p>
+        </p:txBody>
+      </p:sp>
+      <p:cxnSp>
+        <p:nvCxnSpPr>
+          <p:cNvPr id="5" name="Conector recto 4"/>
+          <p:cNvCxnSpPr/>
+          <p:nvPr/>
+        </p:nvCxnSpPr>
+        <p:spPr>
+          <a:xfrm>
+            <a:off x="6092825" y="1644650"/>
+            <a:ext cx="1558925" cy="434975"/>
+          </a:xfrm>
+          <a:prstGeom prst="line">
+            <a:avLst/>
+          </a:prstGeom>
+          <a:ln w="38100"/>
+        </p:spPr>
+        <p:style>
+          <a:lnRef idx="1">
+            <a:schemeClr val="accent1"/>
+          </a:lnRef>
+          <a:fillRef idx="0">
+            <a:schemeClr val="accent1"/>
+          </a:fillRef>
+          <a:effectRef idx="0">
+            <a:schemeClr val="accent1"/>
+          </a:effectRef>
+          <a:fontRef idx="minor">
+            <a:schemeClr val="tx1"/>
+          </a:fontRef>
+        </p:style>
+      </p:cxnSp>
+      <p:sp>
+        <p:nvSpPr>
+          <p:cNvPr id="6" name="CuadroTexto 5"/>
+          <p:cNvSpPr txBox="1"/>
+          <p:nvPr/>
+        </p:nvSpPr>
+        <p:spPr>
+          <a:xfrm>
+            <a:off x="6976049" y="1435813"/>
+            <a:ext cx="2000250" cy="461665"/>
+          </a:xfrm>
+          <a:prstGeom prst="rect">
+            <a:avLst/>
+          </a:prstGeom>
+          <a:noFill/>
+        </p:spPr>
+        <p:txBody>
+          <a:bodyPr wrap="square" rtlCol="0">
+            <a:spAutoFit/>
+          </a:bodyPr>
+          <a:lstStyle/>
+          <a:p>
+            <a:r>
+              <a:rPr lang="es-MX" sz="1200" dirty="0" err="1" smtClean="0">
+                <a:solidFill>
+                  <a:schemeClr val="accent1"/>
+                </a:solidFill>
+              </a:rPr>
+              <a:t>Same</a:t>
+            </a:r>
+            <a:r>
+              <a:rPr lang="es-MX" sz="1200" dirty="0" smtClean="0">
+                <a:solidFill>
+                  <a:schemeClr val="accent1"/>
+                </a:solidFill>
+              </a:rPr>
+              <a:t> </a:t>
+            </a:r>
+            <a:r>
+              <a:rPr lang="es-MX" sz="1200" dirty="0" err="1" smtClean="0">
+                <a:solidFill>
+                  <a:schemeClr val="accent1"/>
+                </a:solidFill>
+              </a:rPr>
+              <a:t>direction</a:t>
+            </a:r>
+            <a:r>
+              <a:rPr lang="es-MX" sz="1200" dirty="0" smtClean="0">
+                <a:solidFill>
+                  <a:schemeClr val="accent1"/>
+                </a:solidFill>
+              </a:rPr>
+              <a:t> as </a:t>
+            </a:r>
+            <a:r>
+              <a:rPr lang="es-MX" sz="1200" dirty="0" err="1" smtClean="0">
+                <a:solidFill>
+                  <a:schemeClr val="accent1"/>
+                </a:solidFill>
+              </a:rPr>
+              <a:t>miterBoxDirectionLine</a:t>
+            </a:r>
+            <a:endParaRPr lang="en-US" sz="1200" dirty="0">
+              <a:solidFill>
+                <a:schemeClr val="accent1"/>
+              </a:solidFill>
+            </a:endParaRPr>
+          </a:p>
+        </p:txBody>
+      </p:sp>
+    </p:spTree>
+    <p:extLst>
+      <p:ext uri="{BB962C8B-B14F-4D97-AF65-F5344CB8AC3E}">
+        <p14:creationId xmlns:p14="http://schemas.microsoft.com/office/powerpoint/2010/main" val="2620100076"/>
       </p:ext>
     </p:extLst>
   </p:cSld>

</xml_diff>

<commit_message>
fix wrong name in dimension definition in documentation: miterBoxWidth instead of miterBoxHeight
</commit_message>
<xml_diff>
--- a/Docs/Design.pptx
+++ b/Docs/Design.pptx
@@ -270,7 +270,7 @@
           <a:p>
             <a:fld id="{D70168D3-9BA9-4B67-B593-8F465BBDFFE3}" type="datetimeFigureOut">
               <a:rPr lang="en-CA" smtClean="0"/>
-              <a:t>2021-02-19</a:t>
+              <a:t>2021-02-21</a:t>
             </a:fld>
             <a:endParaRPr lang="en-CA"/>
           </a:p>
@@ -470,7 +470,7 @@
           <a:p>
             <a:fld id="{D70168D3-9BA9-4B67-B593-8F465BBDFFE3}" type="datetimeFigureOut">
               <a:rPr lang="en-CA" smtClean="0"/>
-              <a:t>2021-02-19</a:t>
+              <a:t>2021-02-21</a:t>
             </a:fld>
             <a:endParaRPr lang="en-CA"/>
           </a:p>
@@ -680,7 +680,7 @@
           <a:p>
             <a:fld id="{D70168D3-9BA9-4B67-B593-8F465BBDFFE3}" type="datetimeFigureOut">
               <a:rPr lang="en-CA" smtClean="0"/>
-              <a:t>2021-02-19</a:t>
+              <a:t>2021-02-21</a:t>
             </a:fld>
             <a:endParaRPr lang="en-CA"/>
           </a:p>
@@ -880,7 +880,7 @@
           <a:p>
             <a:fld id="{D70168D3-9BA9-4B67-B593-8F465BBDFFE3}" type="datetimeFigureOut">
               <a:rPr lang="en-CA" smtClean="0"/>
-              <a:t>2021-02-19</a:t>
+              <a:t>2021-02-21</a:t>
             </a:fld>
             <a:endParaRPr lang="en-CA"/>
           </a:p>
@@ -1156,7 +1156,7 @@
           <a:p>
             <a:fld id="{D70168D3-9BA9-4B67-B593-8F465BBDFFE3}" type="datetimeFigureOut">
               <a:rPr lang="en-CA" smtClean="0"/>
-              <a:t>2021-02-19</a:t>
+              <a:t>2021-02-21</a:t>
             </a:fld>
             <a:endParaRPr lang="en-CA"/>
           </a:p>
@@ -1424,7 +1424,7 @@
           <a:p>
             <a:fld id="{D70168D3-9BA9-4B67-B593-8F465BBDFFE3}" type="datetimeFigureOut">
               <a:rPr lang="en-CA" smtClean="0"/>
-              <a:t>2021-02-19</a:t>
+              <a:t>2021-02-21</a:t>
             </a:fld>
             <a:endParaRPr lang="en-CA"/>
           </a:p>
@@ -1839,7 +1839,7 @@
           <a:p>
             <a:fld id="{D70168D3-9BA9-4B67-B593-8F465BBDFFE3}" type="datetimeFigureOut">
               <a:rPr lang="en-CA" smtClean="0"/>
-              <a:t>2021-02-19</a:t>
+              <a:t>2021-02-21</a:t>
             </a:fld>
             <a:endParaRPr lang="en-CA"/>
           </a:p>
@@ -1981,7 +1981,7 @@
           <a:p>
             <a:fld id="{D70168D3-9BA9-4B67-B593-8F465BBDFFE3}" type="datetimeFigureOut">
               <a:rPr lang="en-CA" smtClean="0"/>
-              <a:t>2021-02-19</a:t>
+              <a:t>2021-02-21</a:t>
             </a:fld>
             <a:endParaRPr lang="en-CA"/>
           </a:p>
@@ -2094,7 +2094,7 @@
           <a:p>
             <a:fld id="{D70168D3-9BA9-4B67-B593-8F465BBDFFE3}" type="datetimeFigureOut">
               <a:rPr lang="en-CA" smtClean="0"/>
-              <a:t>2021-02-19</a:t>
+              <a:t>2021-02-21</a:t>
             </a:fld>
             <a:endParaRPr lang="en-CA"/>
           </a:p>
@@ -2407,7 +2407,7 @@
           <a:p>
             <a:fld id="{D70168D3-9BA9-4B67-B593-8F465BBDFFE3}" type="datetimeFigureOut">
               <a:rPr lang="en-CA" smtClean="0"/>
-              <a:t>2021-02-19</a:t>
+              <a:t>2021-02-21</a:t>
             </a:fld>
             <a:endParaRPr lang="en-CA"/>
           </a:p>
@@ -2696,7 +2696,7 @@
           <a:p>
             <a:fld id="{D70168D3-9BA9-4B67-B593-8F465BBDFFE3}" type="datetimeFigureOut">
               <a:rPr lang="en-CA" smtClean="0"/>
-              <a:t>2021-02-19</a:t>
+              <a:t>2021-02-21</a:t>
             </a:fld>
             <a:endParaRPr lang="en-CA"/>
           </a:p>
@@ -2939,7 +2939,7 @@
           <a:p>
             <a:fld id="{D70168D3-9BA9-4B67-B593-8F465BBDFFE3}" type="datetimeFigureOut">
               <a:rPr lang="en-CA" smtClean="0"/>
-              <a:t>2021-02-19</a:t>
+              <a:t>2021-02-21</a:t>
             </a:fld>
             <a:endParaRPr lang="en-CA"/>
           </a:p>
@@ -15394,11 +15394,7 @@
           <a:p>
             <a:r>
               <a:rPr lang="es-MX" sz="1400" dirty="0" err="1"/>
-              <a:t>m</a:t>
-            </a:r>
-            <a:r>
-              <a:rPr lang="es-MX" sz="1400" dirty="0" err="1" smtClean="0"/>
-              <a:t>iterBoxHeight</a:t>
+              <a:t>miterBoxWidth</a:t>
             </a:r>
             <a:endParaRPr lang="en-US" sz="1400" dirty="0"/>
           </a:p>

</xml_diff>

<commit_message>
very small update: change the letters of the axes to other places to make it look better
</commit_message>
<xml_diff>
--- a/Docs/Design.pptx
+++ b/Docs/Design.pptx
@@ -270,7 +270,7 @@
           <a:p>
             <a:fld id="{D70168D3-9BA9-4B67-B593-8F465BBDFFE3}" type="datetimeFigureOut">
               <a:rPr lang="en-CA" smtClean="0"/>
-              <a:t>2021-02-21</a:t>
+              <a:t>2021-03-09</a:t>
             </a:fld>
             <a:endParaRPr lang="en-CA"/>
           </a:p>
@@ -470,7 +470,7 @@
           <a:p>
             <a:fld id="{D70168D3-9BA9-4B67-B593-8F465BBDFFE3}" type="datetimeFigureOut">
               <a:rPr lang="en-CA" smtClean="0"/>
-              <a:t>2021-02-21</a:t>
+              <a:t>2021-03-09</a:t>
             </a:fld>
             <a:endParaRPr lang="en-CA"/>
           </a:p>
@@ -680,7 +680,7 @@
           <a:p>
             <a:fld id="{D70168D3-9BA9-4B67-B593-8F465BBDFFE3}" type="datetimeFigureOut">
               <a:rPr lang="en-CA" smtClean="0"/>
-              <a:t>2021-02-21</a:t>
+              <a:t>2021-03-09</a:t>
             </a:fld>
             <a:endParaRPr lang="en-CA"/>
           </a:p>
@@ -880,7 +880,7 @@
           <a:p>
             <a:fld id="{D70168D3-9BA9-4B67-B593-8F465BBDFFE3}" type="datetimeFigureOut">
               <a:rPr lang="en-CA" smtClean="0"/>
-              <a:t>2021-02-21</a:t>
+              <a:t>2021-03-09</a:t>
             </a:fld>
             <a:endParaRPr lang="en-CA"/>
           </a:p>
@@ -1156,7 +1156,7 @@
           <a:p>
             <a:fld id="{D70168D3-9BA9-4B67-B593-8F465BBDFFE3}" type="datetimeFigureOut">
               <a:rPr lang="en-CA" smtClean="0"/>
-              <a:t>2021-02-21</a:t>
+              <a:t>2021-03-09</a:t>
             </a:fld>
             <a:endParaRPr lang="en-CA"/>
           </a:p>
@@ -1424,7 +1424,7 @@
           <a:p>
             <a:fld id="{D70168D3-9BA9-4B67-B593-8F465BBDFFE3}" type="datetimeFigureOut">
               <a:rPr lang="en-CA" smtClean="0"/>
-              <a:t>2021-02-21</a:t>
+              <a:t>2021-03-09</a:t>
             </a:fld>
             <a:endParaRPr lang="en-CA"/>
           </a:p>
@@ -1839,7 +1839,7 @@
           <a:p>
             <a:fld id="{D70168D3-9BA9-4B67-B593-8F465BBDFFE3}" type="datetimeFigureOut">
               <a:rPr lang="en-CA" smtClean="0"/>
-              <a:t>2021-02-21</a:t>
+              <a:t>2021-03-09</a:t>
             </a:fld>
             <a:endParaRPr lang="en-CA"/>
           </a:p>
@@ -1981,7 +1981,7 @@
           <a:p>
             <a:fld id="{D70168D3-9BA9-4B67-B593-8F465BBDFFE3}" type="datetimeFigureOut">
               <a:rPr lang="en-CA" smtClean="0"/>
-              <a:t>2021-02-21</a:t>
+              <a:t>2021-03-09</a:t>
             </a:fld>
             <a:endParaRPr lang="en-CA"/>
           </a:p>
@@ -2094,7 +2094,7 @@
           <a:p>
             <a:fld id="{D70168D3-9BA9-4B67-B593-8F465BBDFFE3}" type="datetimeFigureOut">
               <a:rPr lang="en-CA" smtClean="0"/>
-              <a:t>2021-02-21</a:t>
+              <a:t>2021-03-09</a:t>
             </a:fld>
             <a:endParaRPr lang="en-CA"/>
           </a:p>
@@ -2407,7 +2407,7 @@
           <a:p>
             <a:fld id="{D70168D3-9BA9-4B67-B593-8F465BBDFFE3}" type="datetimeFigureOut">
               <a:rPr lang="en-CA" smtClean="0"/>
-              <a:t>2021-02-21</a:t>
+              <a:t>2021-03-09</a:t>
             </a:fld>
             <a:endParaRPr lang="en-CA"/>
           </a:p>
@@ -2696,7 +2696,7 @@
           <a:p>
             <a:fld id="{D70168D3-9BA9-4B67-B593-8F465BBDFFE3}" type="datetimeFigureOut">
               <a:rPr lang="en-CA" smtClean="0"/>
-              <a:t>2021-02-21</a:t>
+              <a:t>2021-03-09</a:t>
             </a:fld>
             <a:endParaRPr lang="en-CA"/>
           </a:p>
@@ -2939,7 +2939,7 @@
           <a:p>
             <a:fld id="{D70168D3-9BA9-4B67-B593-8F465BBDFFE3}" type="datetimeFigureOut">
               <a:rPr lang="en-CA" smtClean="0"/>
-              <a:t>2021-02-21</a:t>
+              <a:t>2021-03-09</a:t>
             </a:fld>
             <a:endParaRPr lang="en-CA"/>
           </a:p>
@@ -5613,7 +5613,7 @@
         </p:nvSpPr>
         <p:spPr>
           <a:xfrm>
-            <a:off x="5687485" y="2634338"/>
+            <a:off x="5745673" y="2713003"/>
             <a:ext cx="1032744" cy="369332"/>
           </a:xfrm>
           <a:prstGeom prst="rect">
@@ -5721,7 +5721,7 @@
         </p:nvSpPr>
         <p:spPr>
           <a:xfrm>
-            <a:off x="6847180" y="2778863"/>
+            <a:off x="7109675" y="2966161"/>
             <a:ext cx="1032744" cy="369332"/>
           </a:xfrm>
           <a:prstGeom prst="rect">
@@ -6144,10 +6144,10 @@
         </p:nvGrpSpPr>
         <p:grpSpPr>
           <a:xfrm>
-            <a:off x="3913073" y="1892034"/>
-            <a:ext cx="2854769" cy="1640152"/>
-            <a:chOff x="3913073" y="1892034"/>
-            <a:chExt cx="2854769" cy="1640152"/>
+            <a:off x="4004291" y="1891669"/>
+            <a:ext cx="2763551" cy="1664011"/>
+            <a:chOff x="4004291" y="1891669"/>
+            <a:chExt cx="2763551" cy="1664011"/>
           </a:xfrm>
         </p:grpSpPr>
         <p:cxnSp>
@@ -6350,7 +6350,7 @@
           </p:nvSpPr>
           <p:spPr>
             <a:xfrm>
-              <a:off x="4778428" y="2545014"/>
+              <a:off x="4755124" y="2431375"/>
               <a:ext cx="892184" cy="369332"/>
             </a:xfrm>
             <a:prstGeom prst="rect">
@@ -6398,7 +6398,7 @@
           </p:nvSpPr>
           <p:spPr>
             <a:xfrm>
-              <a:off x="3913073" y="1892034"/>
+              <a:off x="4004291" y="1891669"/>
               <a:ext cx="892184" cy="369332"/>
             </a:xfrm>
             <a:prstGeom prst="rect">
@@ -6446,7 +6446,7 @@
           </p:nvSpPr>
           <p:spPr>
             <a:xfrm>
-              <a:off x="4136949" y="3162854"/>
+              <a:off x="4194052" y="3186348"/>
               <a:ext cx="892184" cy="369332"/>
             </a:xfrm>
             <a:prstGeom prst="rect">
@@ -6495,10 +6495,10 @@
         </p:nvGrpSpPr>
         <p:grpSpPr>
           <a:xfrm>
-            <a:off x="2934362" y="1951792"/>
-            <a:ext cx="2787454" cy="1707321"/>
-            <a:chOff x="-42647" y="-1843269"/>
-            <a:chExt cx="2787454" cy="1707321"/>
+            <a:off x="2934362" y="2111097"/>
+            <a:ext cx="2537772" cy="1433122"/>
+            <a:chOff x="-42647" y="-1683964"/>
+            <a:chExt cx="2537772" cy="1433122"/>
           </a:xfrm>
         </p:grpSpPr>
         <p:sp>
@@ -6559,7 +6559,7 @@
           </p:nvSpPr>
           <p:spPr>
             <a:xfrm>
-              <a:off x="1852623" y="-1045234"/>
+              <a:off x="1602941" y="-1114722"/>
               <a:ext cx="892184" cy="369332"/>
             </a:xfrm>
             <a:prstGeom prst="rect">
@@ -6603,7 +6603,7 @@
           </p:nvSpPr>
           <p:spPr>
             <a:xfrm>
-              <a:off x="1605847" y="-1843269"/>
+              <a:off x="1501804" y="-1683964"/>
               <a:ext cx="892184" cy="369332"/>
             </a:xfrm>
             <a:prstGeom prst="rect">
@@ -6800,8 +6800,8 @@
           </p:nvSpPr>
           <p:spPr>
             <a:xfrm>
-              <a:off x="1159755" y="-505280"/>
-              <a:ext cx="892184" cy="369332"/>
+              <a:off x="932433" y="-620174"/>
+              <a:ext cx="414110" cy="369332"/>
             </a:xfrm>
             <a:prstGeom prst="rect">
               <a:avLst/>

</xml_diff>